<commit_message>
Update Homepage and search Post
</commit_message>
<xml_diff>
--- a/php/tam-v.anh/doc/detail_design/frontend/wireframe/MiniBlog_Wireframe_Ver_0.1.0.pptx
+++ b/php/tam-v.anh/doc/detail_design/frontend/wireframe/MiniBlog_Wireframe_Ver_0.1.0.pptx
@@ -8,9 +8,10 @@
     <p:sldId id="257" r:id="rId2"/>
     <p:sldId id="256" r:id="rId3"/>
     <p:sldId id="258" r:id="rId4"/>
-    <p:sldId id="259" r:id="rId5"/>
-    <p:sldId id="260" r:id="rId6"/>
-    <p:sldId id="261" r:id="rId7"/>
+    <p:sldId id="262" r:id="rId5"/>
+    <p:sldId id="259" r:id="rId6"/>
+    <p:sldId id="260" r:id="rId7"/>
+    <p:sldId id="261" r:id="rId8"/>
   </p:sldIdLst>
   <p:sldSz cx="9144000" cy="6858000" type="screen4x3"/>
   <p:notesSz cx="6858000" cy="9144000"/>
@@ -7133,7 +7134,7 @@
         </p:nvCxnSpPr>
         <p:spPr>
           <a:xfrm>
-            <a:off x="1206520" y="2226110"/>
+            <a:off x="1206520" y="2556310"/>
             <a:ext cx="557784" cy="0"/>
           </a:xfrm>
           <a:prstGeom prst="straightConnector1">
@@ -7170,7 +7171,7 @@
         </p:nvSpPr>
         <p:spPr>
           <a:xfrm>
-            <a:off x="1764304" y="2080967"/>
+            <a:off x="1764304" y="2411167"/>
             <a:ext cx="598646" cy="290286"/>
           </a:xfrm>
           <a:prstGeom prst="rect">
@@ -7213,7 +7214,7 @@
         </p:nvSpPr>
         <p:spPr>
           <a:xfrm>
-            <a:off x="1481901" y="2487909"/>
+            <a:off x="1481901" y="2818109"/>
             <a:ext cx="1059204" cy="307777"/>
           </a:xfrm>
           <a:prstGeom prst="rect">
@@ -7282,7 +7283,7 @@
         </p:nvCxnSpPr>
         <p:spPr>
           <a:xfrm>
-            <a:off x="1206520" y="4969840"/>
+            <a:off x="1206520" y="5300040"/>
             <a:ext cx="557784" cy="0"/>
           </a:xfrm>
           <a:prstGeom prst="straightConnector1">
@@ -7319,7 +7320,7 @@
         </p:nvSpPr>
         <p:spPr>
           <a:xfrm>
-            <a:off x="1764304" y="4824697"/>
+            <a:off x="1764304" y="5154897"/>
             <a:ext cx="598646" cy="290286"/>
           </a:xfrm>
           <a:prstGeom prst="rect">
@@ -7362,7 +7363,7 @@
         </p:nvSpPr>
         <p:spPr>
           <a:xfrm>
-            <a:off x="1676232" y="5114983"/>
+            <a:off x="1676232" y="5445183"/>
             <a:ext cx="1072967" cy="307777"/>
           </a:xfrm>
           <a:prstGeom prst="rect">
@@ -7582,7 +7583,7 @@
         </p:nvSpPr>
         <p:spPr>
           <a:xfrm>
-            <a:off x="2917269" y="1441760"/>
+            <a:off x="2917269" y="1416360"/>
             <a:ext cx="612993" cy="307777"/>
           </a:xfrm>
           <a:prstGeom prst="rect">
@@ -7982,7 +7983,7 @@
         </p:nvCxnSpPr>
         <p:spPr>
           <a:xfrm>
-            <a:off x="2362950" y="2226110"/>
+            <a:off x="2362950" y="2556310"/>
             <a:ext cx="1035812" cy="0"/>
           </a:xfrm>
           <a:prstGeom prst="straightConnector1">
@@ -8019,7 +8020,7 @@
         </p:nvSpPr>
         <p:spPr>
           <a:xfrm>
-            <a:off x="3412719" y="2080967"/>
+            <a:off x="3412719" y="2411167"/>
             <a:ext cx="598646" cy="290286"/>
           </a:xfrm>
           <a:prstGeom prst="rect">
@@ -8062,7 +8063,7 @@
         </p:nvSpPr>
         <p:spPr>
           <a:xfrm>
-            <a:off x="3409312" y="2371253"/>
+            <a:off x="3409312" y="2676053"/>
             <a:ext cx="1634632" cy="307777"/>
           </a:xfrm>
           <a:prstGeom prst="rect">
@@ -8092,7 +8093,7 @@
         </p:nvCxnSpPr>
         <p:spPr>
           <a:xfrm flipV="1">
-            <a:off x="2792009" y="2831251"/>
+            <a:off x="2792009" y="3161451"/>
             <a:ext cx="606753" cy="1"/>
           </a:xfrm>
           <a:prstGeom prst="straightConnector1">
@@ -8129,7 +8130,7 @@
         </p:nvSpPr>
         <p:spPr>
           <a:xfrm>
-            <a:off x="3412719" y="2679030"/>
+            <a:off x="3412719" y="3009230"/>
             <a:ext cx="598646" cy="290286"/>
           </a:xfrm>
           <a:prstGeom prst="rect">
@@ -8172,7 +8173,7 @@
         </p:nvSpPr>
         <p:spPr>
           <a:xfrm>
-            <a:off x="3362124" y="2972855"/>
+            <a:off x="3362124" y="3303055"/>
             <a:ext cx="1468596" cy="307777"/>
           </a:xfrm>
           <a:prstGeom prst="rect">
@@ -8202,7 +8203,7 @@
         </p:nvCxnSpPr>
         <p:spPr>
           <a:xfrm>
-            <a:off x="2792009" y="2241381"/>
+            <a:off x="2792009" y="2571581"/>
             <a:ext cx="0" cy="2130396"/>
           </a:xfrm>
           <a:prstGeom prst="line">
@@ -8238,7 +8239,7 @@
         </p:nvCxnSpPr>
         <p:spPr>
           <a:xfrm flipV="1">
-            <a:off x="2792009" y="3446093"/>
+            <a:off x="2792009" y="3776293"/>
             <a:ext cx="606753" cy="1"/>
           </a:xfrm>
           <a:prstGeom prst="straightConnector1">
@@ -8275,7 +8276,7 @@
         </p:nvSpPr>
         <p:spPr>
           <a:xfrm>
-            <a:off x="3412719" y="3293872"/>
+            <a:off x="3412719" y="3624072"/>
             <a:ext cx="598646" cy="290286"/>
           </a:xfrm>
           <a:prstGeom prst="rect">
@@ -8318,7 +8319,7 @@
         </p:nvSpPr>
         <p:spPr>
           <a:xfrm>
-            <a:off x="3357319" y="3587697"/>
+            <a:off x="3357319" y="3917897"/>
             <a:ext cx="1199292" cy="307777"/>
           </a:xfrm>
           <a:prstGeom prst="rect">
@@ -8350,7 +8351,7 @@
         </p:nvCxnSpPr>
         <p:spPr>
           <a:xfrm flipV="1">
-            <a:off x="4034120" y="3419888"/>
+            <a:off x="4034120" y="3750088"/>
             <a:ext cx="1359915" cy="7080"/>
           </a:xfrm>
           <a:prstGeom prst="straightConnector1">
@@ -8387,7 +8388,7 @@
         </p:nvSpPr>
         <p:spPr>
           <a:xfrm>
-            <a:off x="5394035" y="3274745"/>
+            <a:off x="5394035" y="3604945"/>
             <a:ext cx="598646" cy="290286"/>
           </a:xfrm>
           <a:prstGeom prst="rect">
@@ -8430,7 +8431,7 @@
         </p:nvSpPr>
         <p:spPr>
           <a:xfrm>
-            <a:off x="6135425" y="3254569"/>
+            <a:off x="6135425" y="3584769"/>
             <a:ext cx="477201" cy="307777"/>
           </a:xfrm>
           <a:prstGeom prst="rect">
@@ -8460,7 +8461,7 @@
         </p:nvCxnSpPr>
         <p:spPr>
           <a:xfrm>
-            <a:off x="4830720" y="3419888"/>
+            <a:off x="4830720" y="3750088"/>
             <a:ext cx="0" cy="951889"/>
           </a:xfrm>
           <a:prstGeom prst="line">
@@ -8491,14 +8492,12 @@
       <p:cxnSp>
         <p:nvCxnSpPr>
           <p:cNvPr id="97" name="Straight Arrow Connector 96"/>
-          <p:cNvCxnSpPr>
-            <a:endCxn id="98" idx="1"/>
-          </p:cNvCxnSpPr>
+          <p:cNvCxnSpPr/>
           <p:nvPr/>
         </p:nvCxnSpPr>
         <p:spPr>
           <a:xfrm>
-            <a:off x="4830720" y="3865640"/>
+            <a:off x="4830720" y="4195840"/>
             <a:ext cx="573936" cy="0"/>
           </a:xfrm>
           <a:prstGeom prst="straightConnector1">
@@ -8578,7 +8577,7 @@
         </p:nvSpPr>
         <p:spPr>
           <a:xfrm>
-            <a:off x="6170236" y="3700321"/>
+            <a:off x="6170236" y="4030521"/>
             <a:ext cx="467997" cy="307777"/>
           </a:xfrm>
           <a:prstGeom prst="rect">
@@ -8610,7 +8609,7 @@
         </p:nvCxnSpPr>
         <p:spPr>
           <a:xfrm>
-            <a:off x="4837980" y="4284130"/>
+            <a:off x="4837980" y="4614330"/>
             <a:ext cx="573936" cy="0"/>
           </a:xfrm>
           <a:prstGeom prst="straightConnector1">
@@ -8647,7 +8646,7 @@
         </p:nvSpPr>
         <p:spPr>
           <a:xfrm>
-            <a:off x="5411916" y="4138987"/>
+            <a:off x="5411916" y="4469187"/>
             <a:ext cx="598646" cy="290286"/>
           </a:xfrm>
           <a:prstGeom prst="rect">
@@ -8690,7 +8689,7 @@
         </p:nvSpPr>
         <p:spPr>
           <a:xfrm>
-            <a:off x="6177496" y="4118811"/>
+            <a:off x="6177496" y="4449011"/>
             <a:ext cx="664452" cy="307777"/>
           </a:xfrm>
           <a:prstGeom prst="rect">
@@ -8720,7 +8719,7 @@
         </p:nvCxnSpPr>
         <p:spPr>
           <a:xfrm>
-            <a:off x="2362892" y="4969840"/>
+            <a:off x="2362892" y="5300040"/>
             <a:ext cx="557784" cy="0"/>
           </a:xfrm>
           <a:prstGeom prst="straightConnector1">
@@ -8757,7 +8756,7 @@
         </p:nvSpPr>
         <p:spPr>
           <a:xfrm>
-            <a:off x="2920676" y="4824697"/>
+            <a:off x="2920676" y="5154897"/>
             <a:ext cx="598646" cy="290286"/>
           </a:xfrm>
           <a:prstGeom prst="rect">
@@ -8800,7 +8799,7 @@
         </p:nvSpPr>
         <p:spPr>
           <a:xfrm>
-            <a:off x="2832604" y="5114983"/>
+            <a:off x="2832604" y="5445183"/>
             <a:ext cx="1608133" cy="307777"/>
           </a:xfrm>
           <a:prstGeom prst="rect">
@@ -8830,7 +8829,7 @@
         </p:nvCxnSpPr>
         <p:spPr>
           <a:xfrm flipV="1">
-            <a:off x="2800697" y="4279700"/>
+            <a:off x="2800697" y="4609900"/>
             <a:ext cx="606753" cy="1"/>
           </a:xfrm>
           <a:prstGeom prst="straightConnector1">
@@ -8867,7 +8866,7 @@
         </p:nvSpPr>
         <p:spPr>
           <a:xfrm>
-            <a:off x="3421407" y="4127479"/>
+            <a:off x="3421407" y="4457679"/>
             <a:ext cx="598646" cy="290286"/>
           </a:xfrm>
           <a:prstGeom prst="rect">
@@ -8910,7 +8909,7 @@
         </p:nvSpPr>
         <p:spPr>
           <a:xfrm>
-            <a:off x="3370812" y="4421304"/>
+            <a:off x="3370812" y="4751504"/>
             <a:ext cx="688472" cy="307777"/>
           </a:xfrm>
           <a:prstGeom prst="rect">
@@ -8927,6 +8926,152 @@
             <a:r>
               <a:rPr kumimoji="1" lang="en-US" altLang="ja-JP" sz="1400"/>
               <a:t>Logout</a:t>
+            </a:r>
+            <a:endParaRPr kumimoji="1" lang="ja-JP" altLang="en-US" sz="1400"/>
+          </a:p>
+        </p:txBody>
+      </p:sp>
+      <p:cxnSp>
+        <p:nvCxnSpPr>
+          <p:cNvPr id="65" name="Straight Connector 64"/>
+          <p:cNvCxnSpPr/>
+          <p:nvPr/>
+        </p:nvCxnSpPr>
+        <p:spPr>
+          <a:xfrm>
+            <a:off x="2519116" y="1303874"/>
+            <a:ext cx="20482" cy="671359"/>
+          </a:xfrm>
+          <a:prstGeom prst="line">
+            <a:avLst/>
+          </a:prstGeom>
+          <a:ln>
+            <a:solidFill>
+              <a:schemeClr val="tx1"/>
+            </a:solidFill>
+          </a:ln>
+          <a:effectLst/>
+        </p:spPr>
+        <p:style>
+          <a:lnRef idx="2">
+            <a:schemeClr val="accent1"/>
+          </a:lnRef>
+          <a:fillRef idx="0">
+            <a:schemeClr val="accent1"/>
+          </a:fillRef>
+          <a:effectRef idx="1">
+            <a:schemeClr val="accent1"/>
+          </a:effectRef>
+          <a:fontRef idx="minor">
+            <a:schemeClr val="tx1"/>
+          </a:fontRef>
+        </p:style>
+      </p:cxnSp>
+      <p:cxnSp>
+        <p:nvCxnSpPr>
+          <p:cNvPr id="66" name="Straight Arrow Connector 65"/>
+          <p:cNvCxnSpPr/>
+          <p:nvPr/>
+        </p:nvCxnSpPr>
+        <p:spPr>
+          <a:xfrm>
+            <a:off x="2513117" y="1874194"/>
+            <a:ext cx="404152" cy="0"/>
+          </a:xfrm>
+          <a:prstGeom prst="straightConnector1">
+            <a:avLst/>
+          </a:prstGeom>
+          <a:ln>
+            <a:solidFill>
+              <a:schemeClr val="tx1"/>
+            </a:solidFill>
+            <a:tailEnd type="arrow"/>
+          </a:ln>
+          <a:effectLst/>
+        </p:spPr>
+        <p:style>
+          <a:lnRef idx="2">
+            <a:schemeClr val="accent1"/>
+          </a:lnRef>
+          <a:fillRef idx="0">
+            <a:schemeClr val="accent1"/>
+          </a:fillRef>
+          <a:effectRef idx="1">
+            <a:schemeClr val="accent1"/>
+          </a:effectRef>
+          <a:fontRef idx="minor">
+            <a:schemeClr val="tx1"/>
+          </a:fontRef>
+        </p:style>
+      </p:cxnSp>
+      <p:sp useBgFill="1">
+        <p:nvSpPr>
+          <p:cNvPr id="67" name="Rectangle 66"/>
+          <p:cNvSpPr/>
+          <p:nvPr/>
+        </p:nvSpPr>
+        <p:spPr>
+          <a:xfrm>
+            <a:off x="2931616" y="1716351"/>
+            <a:ext cx="598646" cy="290286"/>
+          </a:xfrm>
+          <a:prstGeom prst="rect">
+            <a:avLst/>
+          </a:prstGeom>
+          <a:ln/>
+        </p:spPr>
+        <p:style>
+          <a:lnRef idx="2">
+            <a:schemeClr val="dk1"/>
+          </a:lnRef>
+          <a:fillRef idx="1">
+            <a:schemeClr val="lt1"/>
+          </a:fillRef>
+          <a:effectRef idx="0">
+            <a:schemeClr val="dk1"/>
+          </a:effectRef>
+          <a:fontRef idx="minor">
+            <a:schemeClr val="dk1"/>
+          </a:fontRef>
+        </p:style>
+        <p:txBody>
+          <a:bodyPr rtlCol="0" anchor="ctr"/>
+          <a:lstStyle/>
+          <a:p>
+            <a:pPr algn="ctr"/>
+            <a:r>
+              <a:rPr kumimoji="1" lang="en-US" altLang="ja-JP" sz="1400"/>
+              <a:t>S-3-6</a:t>
+            </a:r>
+            <a:endParaRPr kumimoji="1" lang="ja-JP" altLang="en-US" sz="1400"/>
+          </a:p>
+        </p:txBody>
+      </p:sp>
+      <p:sp>
+        <p:nvSpPr>
+          <p:cNvPr id="68" name="TextBox 67"/>
+          <p:cNvSpPr txBox="1"/>
+          <p:nvPr/>
+        </p:nvSpPr>
+        <p:spPr>
+          <a:xfrm>
+            <a:off x="2879055" y="2006637"/>
+            <a:ext cx="675323" cy="307777"/>
+          </a:xfrm>
+          <a:prstGeom prst="rect">
+            <a:avLst/>
+          </a:prstGeom>
+          <a:noFill/>
+        </p:spPr>
+        <p:txBody>
+          <a:bodyPr wrap="none" rtlCol="0">
+            <a:spAutoFit/>
+          </a:bodyPr>
+          <a:lstStyle/>
+          <a:p>
+            <a:r>
+              <a:rPr kumimoji="1" lang="en-US" altLang="ja-JP" sz="1400"/>
+              <a:t>Search</a:t>
             </a:r>
             <a:endParaRPr kumimoji="1" lang="ja-JP" altLang="en-US" sz="1400"/>
           </a:p>
@@ -9008,7 +9153,7 @@
         <p:spPr>
           <a:xfrm>
             <a:off x="193525" y="0"/>
-            <a:ext cx="1219918" cy="369332"/>
+            <a:ext cx="1738389" cy="369332"/>
           </a:xfrm>
           <a:prstGeom prst="rect">
             <a:avLst/>
@@ -9023,7 +9168,11 @@
           <a:p>
             <a:r>
               <a:rPr kumimoji="1" lang="en-US" altLang="ja-JP"/>
-              <a:t>S-2-1 Login</a:t>
+              <a:t>S-1-1 </a:t>
+            </a:r>
+            <a:r>
+              <a:rPr kumimoji="1" lang="en-US" altLang="ja-JP"/>
+              <a:t>Homepage</a:t>
             </a:r>
             <a:endParaRPr kumimoji="1" lang="ja-JP" altLang="en-US"/>
           </a:p>
@@ -9309,14 +9458,14 @@
             <a:r>
               <a:rPr kumimoji="1" lang="en-US" altLang="ja-JP" sz="1000">
                 <a:solidFill>
-                  <a:srgbClr val="FF0000"/>
+                  <a:schemeClr val="bg1"/>
                 </a:solidFill>
               </a:rPr>
               <a:t>Login</a:t>
             </a:r>
             <a:endParaRPr kumimoji="1" lang="ja-JP" altLang="en-US" sz="1000">
               <a:solidFill>
-                <a:srgbClr val="FF0000"/>
+                <a:schemeClr val="bg1"/>
               </a:solidFill>
             </a:endParaRPr>
           </a:p>
@@ -9369,6 +9518,1142 @@
         <p:spPr>
           <a:xfrm>
             <a:off x="384739" y="1668018"/>
+            <a:ext cx="514130" cy="253916"/>
+          </a:xfrm>
+          <a:prstGeom prst="rect">
+            <a:avLst/>
+          </a:prstGeom>
+          <a:noFill/>
+        </p:spPr>
+        <p:txBody>
+          <a:bodyPr wrap="none" rtlCol="0">
+            <a:spAutoFit/>
+          </a:bodyPr>
+          <a:lstStyle/>
+          <a:p>
+            <a:r>
+              <a:rPr kumimoji="1" lang="en-US" altLang="ja-JP" sz="1050">
+                <a:solidFill>
+                  <a:schemeClr val="tx2">
+                    <a:lumMod val="20000"/>
+                    <a:lumOff val="80000"/>
+                  </a:schemeClr>
+                </a:solidFill>
+              </a:rPr>
+              <a:t>Home</a:t>
+            </a:r>
+            <a:r>
+              <a:rPr kumimoji="1" lang="en-US" altLang="ja-JP" sz="1050"/>
+              <a:t> </a:t>
+            </a:r>
+            <a:endParaRPr kumimoji="1" lang="ja-JP" altLang="en-US" sz="1050"/>
+          </a:p>
+        </p:txBody>
+      </p:sp>
+      <p:graphicFrame>
+        <p:nvGraphicFramePr>
+          <p:cNvPr id="25" name="Table 24"/>
+          <p:cNvGraphicFramePr>
+            <a:graphicFrameLocks noGrp="1"/>
+          </p:cNvGraphicFramePr>
+          <p:nvPr>
+            <p:extLst>
+              <p:ext uri="{D42A27DB-BD31-4B8C-83A1-F6EECF244321}">
+                <p14:modId xmlns:p14="http://schemas.microsoft.com/office/powerpoint/2010/main" val="3839537198"/>
+              </p:ext>
+            </p:extLst>
+          </p:nvPr>
+        </p:nvGraphicFramePr>
+        <p:xfrm>
+          <a:off x="4478866" y="876073"/>
+          <a:ext cx="4461935" cy="1962492"/>
+        </p:xfrm>
+        <a:graphic>
+          <a:graphicData uri="http://schemas.openxmlformats.org/drawingml/2006/table">
+            <a:tbl>
+              <a:tblPr firstRow="1" bandRow="1">
+                <a:tableStyleId>{5202B0CA-FC54-4496-8BCA-5EF66A818D29}</a:tableStyleId>
+              </a:tblPr>
+              <a:tblGrid>
+                <a:gridCol w="406401"/>
+                <a:gridCol w="1049866"/>
+                <a:gridCol w="1220894"/>
+                <a:gridCol w="1259840"/>
+                <a:gridCol w="524934"/>
+              </a:tblGrid>
+              <a:tr h="327082">
+                <a:tc>
+                  <a:txBody>
+                    <a:bodyPr/>
+                    <a:lstStyle/>
+                    <a:p>
+                      <a:r>
+                        <a:rPr kumimoji="1" lang="en-US" altLang="ja-JP" sz="1000"/>
+                        <a:t>No</a:t>
+                      </a:r>
+                      <a:endParaRPr kumimoji="1" lang="ja-JP" altLang="en-US" sz="1000"/>
+                    </a:p>
+                  </a:txBody>
+                  <a:tcPr/>
+                </a:tc>
+                <a:tc>
+                  <a:txBody>
+                    <a:bodyPr/>
+                    <a:lstStyle/>
+                    <a:p>
+                      <a:r>
+                        <a:rPr kumimoji="1" lang="en-US" altLang="ja-JP" sz="1000"/>
+                        <a:t>Content</a:t>
+                      </a:r>
+                      <a:endParaRPr kumimoji="1" lang="ja-JP" altLang="en-US" sz="1000"/>
+                    </a:p>
+                  </a:txBody>
+                  <a:tcPr/>
+                </a:tc>
+                <a:tc>
+                  <a:txBody>
+                    <a:bodyPr/>
+                    <a:lstStyle/>
+                    <a:p>
+                      <a:r>
+                        <a:rPr kumimoji="1" lang="en-US" altLang="ja-JP" sz="1000"/>
+                        <a:t>Function</a:t>
+                      </a:r>
+                      <a:endParaRPr kumimoji="1" lang="ja-JP" altLang="en-US" sz="1000"/>
+                    </a:p>
+                  </a:txBody>
+                  <a:tcPr/>
+                </a:tc>
+                <a:tc>
+                  <a:txBody>
+                    <a:bodyPr/>
+                    <a:lstStyle/>
+                    <a:p>
+                      <a:r>
+                        <a:rPr kumimoji="1" lang="en-US" altLang="ja-JP" sz="1000"/>
+                        <a:t>Detail/option</a:t>
+                      </a:r>
+                      <a:endParaRPr kumimoji="1" lang="ja-JP" altLang="en-US" sz="1000"/>
+                    </a:p>
+                  </a:txBody>
+                  <a:tcPr/>
+                </a:tc>
+                <a:tc>
+                  <a:txBody>
+                    <a:bodyPr/>
+                    <a:lstStyle/>
+                    <a:p>
+                      <a:r>
+                        <a:rPr kumimoji="1" lang="en-US" altLang="ja-JP" sz="1000"/>
+                        <a:t>Goto</a:t>
+                      </a:r>
+                      <a:endParaRPr kumimoji="1" lang="ja-JP" altLang="en-US" sz="1000"/>
+                    </a:p>
+                  </a:txBody>
+                  <a:tcPr/>
+                </a:tc>
+              </a:tr>
+              <a:tr h="327082">
+                <a:tc>
+                  <a:txBody>
+                    <a:bodyPr/>
+                    <a:lstStyle/>
+                    <a:p>
+                      <a:r>
+                        <a:rPr kumimoji="1" lang="en-US" altLang="ja-JP" sz="1000"/>
+                        <a:t>1</a:t>
+                      </a:r>
+                      <a:endParaRPr kumimoji="1" lang="ja-JP" altLang="en-US" sz="1000"/>
+                    </a:p>
+                  </a:txBody>
+                  <a:tcPr/>
+                </a:tc>
+                <a:tc>
+                  <a:txBody>
+                    <a:bodyPr/>
+                    <a:lstStyle/>
+                    <a:p>
+                      <a:r>
+                        <a:rPr kumimoji="1" lang="en-US" altLang="ja-JP" sz="1000"/>
+                        <a:t>Blog</a:t>
+                      </a:r>
+                      <a:endParaRPr kumimoji="1" lang="ja-JP" altLang="en-US" sz="1000"/>
+                    </a:p>
+                  </a:txBody>
+                  <a:tcPr/>
+                </a:tc>
+                <a:tc>
+                  <a:txBody>
+                    <a:bodyPr/>
+                    <a:lstStyle/>
+                    <a:p>
+                      <a:endParaRPr kumimoji="1" lang="ja-JP" altLang="en-US" sz="1000"/>
+                    </a:p>
+                  </a:txBody>
+                  <a:tcPr/>
+                </a:tc>
+                <a:tc>
+                  <a:txBody>
+                    <a:bodyPr/>
+                    <a:lstStyle/>
+                    <a:p>
+                      <a:r>
+                        <a:rPr kumimoji="1" lang="en-US" altLang="ja-JP" sz="1000"/>
+                        <a:t>Show all Post</a:t>
+                      </a:r>
+                      <a:endParaRPr kumimoji="1" lang="ja-JP" altLang="en-US" sz="1000"/>
+                    </a:p>
+                  </a:txBody>
+                  <a:tcPr/>
+                </a:tc>
+                <a:tc>
+                  <a:txBody>
+                    <a:bodyPr/>
+                    <a:lstStyle/>
+                    <a:p>
+                      <a:r>
+                        <a:rPr kumimoji="1" lang="vi-VN" altLang="ja-JP" sz="1000"/>
+                        <a:t>S-3-1</a:t>
+                      </a:r>
+                      <a:endParaRPr kumimoji="1" lang="ja-JP" altLang="en-US" sz="1000"/>
+                    </a:p>
+                  </a:txBody>
+                  <a:tcPr/>
+                </a:tc>
+              </a:tr>
+              <a:tr h="327082">
+                <a:tc>
+                  <a:txBody>
+                    <a:bodyPr/>
+                    <a:lstStyle/>
+                    <a:p>
+                      <a:r>
+                        <a:rPr kumimoji="1" lang="en-US" altLang="ja-JP" sz="1000"/>
+                        <a:t>2</a:t>
+                      </a:r>
+                      <a:endParaRPr kumimoji="1" lang="ja-JP" altLang="en-US" sz="1000"/>
+                    </a:p>
+                  </a:txBody>
+                  <a:tcPr/>
+                </a:tc>
+                <a:tc>
+                  <a:txBody>
+                    <a:bodyPr/>
+                    <a:lstStyle/>
+                    <a:p>
+                      <a:r>
+                        <a:rPr kumimoji="1" lang="en-US" altLang="ja-JP" sz="1000"/>
+                        <a:t>Sitemap</a:t>
+                      </a:r>
+                      <a:endParaRPr kumimoji="1" lang="ja-JP" altLang="en-US" sz="1000"/>
+                    </a:p>
+                  </a:txBody>
+                  <a:tcPr/>
+                </a:tc>
+                <a:tc>
+                  <a:txBody>
+                    <a:bodyPr/>
+                    <a:lstStyle/>
+                    <a:p>
+                      <a:endParaRPr kumimoji="1" lang="ja-JP" altLang="en-US" sz="1000"/>
+                    </a:p>
+                  </a:txBody>
+                  <a:tcPr/>
+                </a:tc>
+                <a:tc>
+                  <a:txBody>
+                    <a:bodyPr/>
+                    <a:lstStyle/>
+                    <a:p>
+                      <a:r>
+                        <a:rPr kumimoji="1" lang="en-US" altLang="ja-JP" sz="1000"/>
+                        <a:t>Show sitemap</a:t>
+                      </a:r>
+                      <a:endParaRPr kumimoji="1" lang="ja-JP" altLang="en-US" sz="1000"/>
+                    </a:p>
+                  </a:txBody>
+                  <a:tcPr/>
+                </a:tc>
+                <a:tc>
+                  <a:txBody>
+                    <a:bodyPr/>
+                    <a:lstStyle/>
+                    <a:p>
+                      <a:r>
+                        <a:rPr kumimoji="1" lang="vi-VN" altLang="ja-JP" sz="1000"/>
+                        <a:t>S-6-1</a:t>
+                      </a:r>
+                      <a:endParaRPr kumimoji="1" lang="ja-JP" altLang="en-US" sz="1000"/>
+                    </a:p>
+                  </a:txBody>
+                  <a:tcPr/>
+                </a:tc>
+              </a:tr>
+              <a:tr h="327082">
+                <a:tc>
+                  <a:txBody>
+                    <a:bodyPr/>
+                    <a:lstStyle/>
+                    <a:p>
+                      <a:r>
+                        <a:rPr kumimoji="1" lang="en-US" altLang="ja-JP" sz="1000"/>
+                        <a:t>3</a:t>
+                      </a:r>
+                      <a:endParaRPr kumimoji="1" lang="ja-JP" altLang="en-US" sz="1000"/>
+                    </a:p>
+                  </a:txBody>
+                  <a:tcPr/>
+                </a:tc>
+                <a:tc>
+                  <a:txBody>
+                    <a:bodyPr/>
+                    <a:lstStyle/>
+                    <a:p>
+                      <a:r>
+                        <a:rPr kumimoji="1" lang="en-US" altLang="ja-JP" sz="1000"/>
+                        <a:t>Login</a:t>
+                      </a:r>
+                      <a:endParaRPr kumimoji="1" lang="ja-JP" altLang="en-US" sz="1000"/>
+                    </a:p>
+                  </a:txBody>
+                  <a:tcPr/>
+                </a:tc>
+                <a:tc>
+                  <a:txBody>
+                    <a:bodyPr/>
+                    <a:lstStyle/>
+                    <a:p>
+                      <a:endParaRPr kumimoji="1" lang="ja-JP" altLang="en-US" sz="1000"/>
+                    </a:p>
+                  </a:txBody>
+                  <a:tcPr/>
+                </a:tc>
+                <a:tc>
+                  <a:txBody>
+                    <a:bodyPr/>
+                    <a:lstStyle/>
+                    <a:p>
+                      <a:r>
+                        <a:rPr kumimoji="1" lang="en-US" altLang="ja-JP" sz="1000"/>
+                        <a:t>Go to page login</a:t>
+                      </a:r>
+                      <a:endParaRPr kumimoji="1" lang="ja-JP" altLang="en-US" sz="1000"/>
+                    </a:p>
+                  </a:txBody>
+                  <a:tcPr/>
+                </a:tc>
+                <a:tc>
+                  <a:txBody>
+                    <a:bodyPr/>
+                    <a:lstStyle/>
+                    <a:p>
+                      <a:r>
+                        <a:rPr kumimoji="1" lang="vi-VN" altLang="ja-JP" sz="1000"/>
+                        <a:t>S-2-1</a:t>
+                      </a:r>
+                      <a:endParaRPr kumimoji="1" lang="ja-JP" altLang="en-US" sz="1000"/>
+                    </a:p>
+                  </a:txBody>
+                  <a:tcPr/>
+                </a:tc>
+              </a:tr>
+              <a:tr h="327082">
+                <a:tc>
+                  <a:txBody>
+                    <a:bodyPr/>
+                    <a:lstStyle/>
+                    <a:p>
+                      <a:r>
+                        <a:rPr kumimoji="1" lang="en-US" altLang="ja-JP" sz="1000"/>
+                        <a:t>4</a:t>
+                      </a:r>
+                      <a:endParaRPr kumimoji="1" lang="ja-JP" altLang="en-US" sz="1000"/>
+                    </a:p>
+                  </a:txBody>
+                  <a:tcPr/>
+                </a:tc>
+                <a:tc>
+                  <a:txBody>
+                    <a:bodyPr/>
+                    <a:lstStyle/>
+                    <a:p>
+                      <a:r>
+                        <a:rPr kumimoji="1" lang="en-US" altLang="ja-JP" sz="1000"/>
+                        <a:t>Search</a:t>
+                      </a:r>
+                      <a:endParaRPr kumimoji="1" lang="ja-JP" altLang="en-US" sz="1000"/>
+                    </a:p>
+                  </a:txBody>
+                  <a:tcPr/>
+                </a:tc>
+                <a:tc>
+                  <a:txBody>
+                    <a:bodyPr/>
+                    <a:lstStyle/>
+                    <a:p>
+                      <a:endParaRPr kumimoji="1" lang="ja-JP" altLang="en-US" sz="1000"/>
+                    </a:p>
+                  </a:txBody>
+                  <a:tcPr/>
+                </a:tc>
+                <a:tc>
+                  <a:txBody>
+                    <a:bodyPr/>
+                    <a:lstStyle/>
+                    <a:p>
+                      <a:r>
+                        <a:rPr kumimoji="1" lang="en-US" altLang="ja-JP" sz="1000"/>
+                        <a:t>Search</a:t>
+                      </a:r>
+                      <a:r>
+                        <a:rPr kumimoji="1" lang="en-US" altLang="ja-JP" sz="1000" baseline="0"/>
+                        <a:t> all user</a:t>
+                      </a:r>
+                      <a:endParaRPr kumimoji="1" lang="ja-JP" altLang="en-US" sz="1000"/>
+                    </a:p>
+                  </a:txBody>
+                  <a:tcPr/>
+                </a:tc>
+                <a:tc>
+                  <a:txBody>
+                    <a:bodyPr/>
+                    <a:lstStyle/>
+                    <a:p>
+                      <a:r>
+                        <a:rPr kumimoji="1" lang="vi-VN" altLang="ja-JP" sz="1000"/>
+                        <a:t>S-5-2</a:t>
+                      </a:r>
+                      <a:endParaRPr kumimoji="1" lang="ja-JP" altLang="en-US" sz="1000"/>
+                    </a:p>
+                  </a:txBody>
+                  <a:tcPr/>
+                </a:tc>
+              </a:tr>
+              <a:tr h="327082">
+                <a:tc>
+                  <a:txBody>
+                    <a:bodyPr/>
+                    <a:lstStyle/>
+                    <a:p>
+                      <a:r>
+                        <a:rPr kumimoji="1" lang="en-US" altLang="ja-JP" sz="1000"/>
+                        <a:t>5</a:t>
+                      </a:r>
+                      <a:endParaRPr kumimoji="1" lang="ja-JP" altLang="en-US" sz="1000"/>
+                    </a:p>
+                  </a:txBody>
+                  <a:tcPr/>
+                </a:tc>
+                <a:tc>
+                  <a:txBody>
+                    <a:bodyPr/>
+                    <a:lstStyle/>
+                    <a:p>
+                      <a:r>
+                        <a:rPr kumimoji="1" lang="en-US" altLang="ja-JP" sz="1000"/>
+                        <a:t>10 </a:t>
+                      </a:r>
+                      <a:r>
+                        <a:rPr kumimoji="1" lang="en-US" altLang="ja-JP" sz="1000"/>
+                        <a:t>newest Post</a:t>
+                      </a:r>
+                      <a:endParaRPr kumimoji="1" lang="ja-JP" altLang="en-US" sz="1000"/>
+                    </a:p>
+                  </a:txBody>
+                  <a:tcPr/>
+                </a:tc>
+                <a:tc>
+                  <a:txBody>
+                    <a:bodyPr/>
+                    <a:lstStyle/>
+                    <a:p>
+                      <a:endParaRPr kumimoji="1" lang="ja-JP" altLang="en-US" sz="1000"/>
+                    </a:p>
+                  </a:txBody>
+                  <a:tcPr/>
+                </a:tc>
+                <a:tc>
+                  <a:txBody>
+                    <a:bodyPr/>
+                    <a:lstStyle/>
+                    <a:p>
+                      <a:endParaRPr kumimoji="1" lang="ja-JP" altLang="en-US" sz="1000"/>
+                    </a:p>
+                  </a:txBody>
+                  <a:tcPr/>
+                </a:tc>
+                <a:tc>
+                  <a:txBody>
+                    <a:bodyPr/>
+                    <a:lstStyle/>
+                    <a:p>
+                      <a:endParaRPr kumimoji="1" lang="ja-JP" altLang="en-US" sz="1000"/>
+                    </a:p>
+                  </a:txBody>
+                  <a:tcPr/>
+                </a:tc>
+              </a:tr>
+            </a:tbl>
+          </a:graphicData>
+        </a:graphic>
+      </p:graphicFrame>
+      <p:sp>
+        <p:nvSpPr>
+          <p:cNvPr id="85" name="TextBox 84"/>
+          <p:cNvSpPr txBox="1"/>
+          <p:nvPr/>
+        </p:nvSpPr>
+        <p:spPr>
+          <a:xfrm>
+            <a:off x="3039533" y="1421797"/>
+            <a:ext cx="327433" cy="246221"/>
+          </a:xfrm>
+          <a:prstGeom prst="rect">
+            <a:avLst/>
+          </a:prstGeom>
+          <a:noFill/>
+        </p:spPr>
+        <p:txBody>
+          <a:bodyPr wrap="none" rtlCol="0">
+            <a:spAutoFit/>
+          </a:bodyPr>
+          <a:lstStyle/>
+          <a:p>
+            <a:r>
+              <a:rPr kumimoji="1" lang="en-US" altLang="ja-JP" sz="1000">
+                <a:solidFill>
+                  <a:srgbClr val="FF0000"/>
+                </a:solidFill>
+              </a:rPr>
+              <a:t>(4)</a:t>
+            </a:r>
+            <a:endParaRPr kumimoji="1" lang="ja-JP" altLang="en-US" sz="1000">
+              <a:solidFill>
+                <a:srgbClr val="FF0000"/>
+              </a:solidFill>
+            </a:endParaRPr>
+          </a:p>
+        </p:txBody>
+      </p:sp>
+      <p:sp>
+        <p:nvSpPr>
+          <p:cNvPr id="5" name="TextBox 4"/>
+          <p:cNvSpPr txBox="1"/>
+          <p:nvPr/>
+        </p:nvSpPr>
+        <p:spPr>
+          <a:xfrm>
+            <a:off x="477876" y="2184400"/>
+            <a:ext cx="1138352" cy="276999"/>
+          </a:xfrm>
+          <a:prstGeom prst="rect">
+            <a:avLst/>
+          </a:prstGeom>
+          <a:noFill/>
+        </p:spPr>
+        <p:txBody>
+          <a:bodyPr wrap="none" rtlCol="0">
+            <a:spAutoFit/>
+          </a:bodyPr>
+          <a:lstStyle/>
+          <a:p>
+            <a:r>
+              <a:rPr kumimoji="1" lang="en-US" altLang="ja-JP" sz="1200"/>
+              <a:t>10 newest Post </a:t>
+            </a:r>
+            <a:endParaRPr kumimoji="1" lang="ja-JP" altLang="en-US" sz="1200"/>
+          </a:p>
+        </p:txBody>
+      </p:sp>
+      <p:sp>
+        <p:nvSpPr>
+          <p:cNvPr id="26" name="TextBox 25"/>
+          <p:cNvSpPr txBox="1"/>
+          <p:nvPr/>
+        </p:nvSpPr>
+        <p:spPr>
+          <a:xfrm>
+            <a:off x="2836333" y="774097"/>
+            <a:ext cx="327433" cy="246221"/>
+          </a:xfrm>
+          <a:prstGeom prst="rect">
+            <a:avLst/>
+          </a:prstGeom>
+          <a:noFill/>
+        </p:spPr>
+        <p:txBody>
+          <a:bodyPr wrap="none" rtlCol="0">
+            <a:spAutoFit/>
+          </a:bodyPr>
+          <a:lstStyle/>
+          <a:p>
+            <a:r>
+              <a:rPr kumimoji="1" lang="en-US" altLang="ja-JP" sz="1000">
+                <a:solidFill>
+                  <a:srgbClr val="FF0000"/>
+                </a:solidFill>
+              </a:rPr>
+              <a:t>(1)</a:t>
+            </a:r>
+            <a:endParaRPr kumimoji="1" lang="ja-JP" altLang="en-US" sz="1000">
+              <a:solidFill>
+                <a:srgbClr val="FF0000"/>
+              </a:solidFill>
+            </a:endParaRPr>
+          </a:p>
+        </p:txBody>
+      </p:sp>
+      <p:sp>
+        <p:nvSpPr>
+          <p:cNvPr id="27" name="TextBox 26"/>
+          <p:cNvSpPr txBox="1"/>
+          <p:nvPr/>
+        </p:nvSpPr>
+        <p:spPr>
+          <a:xfrm>
+            <a:off x="3255433" y="774097"/>
+            <a:ext cx="327433" cy="246221"/>
+          </a:xfrm>
+          <a:prstGeom prst="rect">
+            <a:avLst/>
+          </a:prstGeom>
+          <a:noFill/>
+        </p:spPr>
+        <p:txBody>
+          <a:bodyPr wrap="none" rtlCol="0">
+            <a:spAutoFit/>
+          </a:bodyPr>
+          <a:lstStyle/>
+          <a:p>
+            <a:r>
+              <a:rPr kumimoji="1" lang="en-US" altLang="ja-JP" sz="1000">
+                <a:solidFill>
+                  <a:srgbClr val="FF0000"/>
+                </a:solidFill>
+              </a:rPr>
+              <a:t>(2)</a:t>
+            </a:r>
+            <a:endParaRPr kumimoji="1" lang="ja-JP" altLang="en-US" sz="1000">
+              <a:solidFill>
+                <a:srgbClr val="FF0000"/>
+              </a:solidFill>
+            </a:endParaRPr>
+          </a:p>
+        </p:txBody>
+      </p:sp>
+      <p:sp>
+        <p:nvSpPr>
+          <p:cNvPr id="28" name="TextBox 27"/>
+          <p:cNvSpPr txBox="1"/>
+          <p:nvPr/>
+        </p:nvSpPr>
+        <p:spPr>
+          <a:xfrm>
+            <a:off x="3712633" y="774097"/>
+            <a:ext cx="327433" cy="246221"/>
+          </a:xfrm>
+          <a:prstGeom prst="rect">
+            <a:avLst/>
+          </a:prstGeom>
+          <a:noFill/>
+        </p:spPr>
+        <p:txBody>
+          <a:bodyPr wrap="none" rtlCol="0">
+            <a:spAutoFit/>
+          </a:bodyPr>
+          <a:lstStyle/>
+          <a:p>
+            <a:r>
+              <a:rPr kumimoji="1" lang="en-US" altLang="ja-JP" sz="1000">
+                <a:solidFill>
+                  <a:srgbClr val="FF0000"/>
+                </a:solidFill>
+              </a:rPr>
+              <a:t>(3)</a:t>
+            </a:r>
+            <a:endParaRPr kumimoji="1" lang="ja-JP" altLang="en-US" sz="1000">
+              <a:solidFill>
+                <a:srgbClr val="FF0000"/>
+              </a:solidFill>
+            </a:endParaRPr>
+          </a:p>
+        </p:txBody>
+      </p:sp>
+      <p:sp>
+        <p:nvSpPr>
+          <p:cNvPr id="29" name="TextBox 28"/>
+          <p:cNvSpPr txBox="1"/>
+          <p:nvPr/>
+        </p:nvSpPr>
+        <p:spPr>
+          <a:xfrm>
+            <a:off x="1768197" y="2184400"/>
+            <a:ext cx="327433" cy="246221"/>
+          </a:xfrm>
+          <a:prstGeom prst="rect">
+            <a:avLst/>
+          </a:prstGeom>
+          <a:noFill/>
+        </p:spPr>
+        <p:txBody>
+          <a:bodyPr wrap="none" rtlCol="0">
+            <a:spAutoFit/>
+          </a:bodyPr>
+          <a:lstStyle/>
+          <a:p>
+            <a:r>
+              <a:rPr kumimoji="1" lang="en-US" altLang="ja-JP" sz="1000">
+                <a:solidFill>
+                  <a:srgbClr val="FF0000"/>
+                </a:solidFill>
+              </a:rPr>
+              <a:t>(5)</a:t>
+            </a:r>
+            <a:endParaRPr kumimoji="1" lang="ja-JP" altLang="en-US" sz="1000">
+              <a:solidFill>
+                <a:srgbClr val="FF0000"/>
+              </a:solidFill>
+            </a:endParaRPr>
+          </a:p>
+        </p:txBody>
+      </p:sp>
+    </p:spTree>
+    <p:extLst>
+      <p:ext uri="{BB962C8B-B14F-4D97-AF65-F5344CB8AC3E}">
+        <p14:creationId xmlns:p14="http://schemas.microsoft.com/office/powerpoint/2010/main" val="2944998633"/>
+      </p:ext>
+    </p:extLst>
+  </p:cSld>
+  <p:clrMapOvr>
+    <a:masterClrMapping/>
+  </p:clrMapOvr>
+  <p:timing>
+    <p:tnLst>
+      <p:par>
+        <p:cTn xmlns:p14="http://schemas.microsoft.com/office/powerpoint/2010/main" id="1" dur="indefinite" restart="never" nodeType="tmRoot"/>
+      </p:par>
+    </p:tnLst>
+  </p:timing>
+</p:sld>
+</file>
+
+<file path=ppt/slides/slide4.xml><?xml version="1.0" encoding="utf-8"?>
+<p:sld xmlns:a="http://schemas.openxmlformats.org/drawingml/2006/main" xmlns:r="http://schemas.openxmlformats.org/officeDocument/2006/relationships" xmlns:p="http://schemas.openxmlformats.org/presentationml/2006/main">
+  <p:cSld>
+    <p:spTree>
+      <p:nvGrpSpPr>
+        <p:cNvPr id="1" name=""/>
+        <p:cNvGrpSpPr/>
+        <p:nvPr/>
+      </p:nvGrpSpPr>
+      <p:grpSpPr>
+        <a:xfrm>
+          <a:off x="0" y="0"/>
+          <a:ext cx="0" cy="0"/>
+          <a:chOff x="0" y="0"/>
+          <a:chExt cx="0" cy="0"/>
+        </a:xfrm>
+      </p:grpSpPr>
+      <p:cxnSp>
+        <p:nvCxnSpPr>
+          <p:cNvPr id="65" name="Straight Connector 64"/>
+          <p:cNvCxnSpPr/>
+          <p:nvPr/>
+        </p:nvCxnSpPr>
+        <p:spPr>
+          <a:xfrm>
+            <a:off x="0" y="399143"/>
+            <a:ext cx="9144000" cy="0"/>
+          </a:xfrm>
+          <a:prstGeom prst="line">
+            <a:avLst/>
+          </a:prstGeom>
+        </p:spPr>
+        <p:style>
+          <a:lnRef idx="2">
+            <a:schemeClr val="accent1"/>
+          </a:lnRef>
+          <a:fillRef idx="0">
+            <a:schemeClr val="accent1"/>
+          </a:fillRef>
+          <a:effectRef idx="1">
+            <a:schemeClr val="accent1"/>
+          </a:effectRef>
+          <a:fontRef idx="minor">
+            <a:schemeClr val="tx1"/>
+          </a:fontRef>
+        </p:style>
+      </p:cxnSp>
+      <p:sp>
+        <p:nvSpPr>
+          <p:cNvPr id="66" name="TextBox 65"/>
+          <p:cNvSpPr txBox="1"/>
+          <p:nvPr/>
+        </p:nvSpPr>
+        <p:spPr>
+          <a:xfrm>
+            <a:off x="193525" y="0"/>
+            <a:ext cx="1219918" cy="369332"/>
+          </a:xfrm>
+          <a:prstGeom prst="rect">
+            <a:avLst/>
+          </a:prstGeom>
+          <a:noFill/>
+        </p:spPr>
+        <p:txBody>
+          <a:bodyPr wrap="none" rtlCol="0">
+            <a:spAutoFit/>
+          </a:bodyPr>
+          <a:lstStyle/>
+          <a:p>
+            <a:r>
+              <a:rPr kumimoji="1" lang="en-US" altLang="ja-JP"/>
+              <a:t>S-2-1 Login</a:t>
+            </a:r>
+            <a:endParaRPr kumimoji="1" lang="ja-JP" altLang="en-US"/>
+          </a:p>
+        </p:txBody>
+      </p:sp>
+      <p:sp useBgFill="1">
+        <p:nvSpPr>
+          <p:cNvPr id="2" name="Rectangle 1"/>
+          <p:cNvSpPr/>
+          <p:nvPr/>
+        </p:nvSpPr>
+        <p:spPr>
+          <a:xfrm>
+            <a:off x="387048" y="762000"/>
+            <a:ext cx="3967238" cy="3716867"/>
+          </a:xfrm>
+          <a:prstGeom prst="rect">
+            <a:avLst/>
+          </a:prstGeom>
+          <a:ln>
+            <a:solidFill>
+              <a:schemeClr val="tx1"/>
+            </a:solidFill>
+          </a:ln>
+          <a:effectLst/>
+        </p:spPr>
+        <p:style>
+          <a:lnRef idx="1">
+            <a:schemeClr val="accent1"/>
+          </a:lnRef>
+          <a:fillRef idx="3">
+            <a:schemeClr val="accent1"/>
+          </a:fillRef>
+          <a:effectRef idx="2">
+            <a:schemeClr val="accent1"/>
+          </a:effectRef>
+          <a:fontRef idx="minor">
+            <a:schemeClr val="lt1"/>
+          </a:fontRef>
+        </p:style>
+        <p:txBody>
+          <a:bodyPr rtlCol="0" anchor="ctr"/>
+          <a:lstStyle/>
+          <a:p>
+            <a:pPr algn="ctr"/>
+            <a:endParaRPr kumimoji="1" lang="ja-JP" altLang="en-US">
+              <a:solidFill>
+                <a:srgbClr val="FF0000"/>
+              </a:solidFill>
+            </a:endParaRPr>
+          </a:p>
+        </p:txBody>
+      </p:sp>
+      <p:sp>
+        <p:nvSpPr>
+          <p:cNvPr id="3" name="Rectangle 2"/>
+          <p:cNvSpPr/>
+          <p:nvPr/>
+        </p:nvSpPr>
+        <p:spPr>
+          <a:xfrm>
+            <a:off x="387048" y="876073"/>
+            <a:ext cx="1196687" cy="400110"/>
+          </a:xfrm>
+          <a:prstGeom prst="rect">
+            <a:avLst/>
+          </a:prstGeom>
+          <a:noFill/>
+        </p:spPr>
+        <p:txBody>
+          <a:bodyPr wrap="none" lIns="91440" tIns="45720" rIns="91440" bIns="45720">
+            <a:spAutoFit/>
+          </a:bodyPr>
+          <a:lstStyle/>
+          <a:p>
+            <a:pPr algn="ctr"/>
+            <a:r>
+              <a:rPr lang="en-US" altLang="ja-JP" sz="2000" b="1" cap="none" spc="0">
+                <a:ln w="12700">
+                  <a:solidFill>
+                    <a:schemeClr val="tx2">
+                      <a:satMod val="155000"/>
+                    </a:schemeClr>
+                  </a:solidFill>
+                  <a:prstDash val="solid"/>
+                </a:ln>
+                <a:solidFill>
+                  <a:schemeClr val="bg2">
+                    <a:tint val="85000"/>
+                    <a:satMod val="155000"/>
+                  </a:schemeClr>
+                </a:solidFill>
+                <a:effectLst>
+                  <a:outerShdw blurRad="41275" dist="20320" dir="1800000" algn="tl" rotWithShape="0">
+                    <a:srgbClr val="000000">
+                      <a:alpha val="40000"/>
+                    </a:srgbClr>
+                  </a:outerShdw>
+                </a:effectLst>
+              </a:rPr>
+              <a:t>Mini Blog</a:t>
+            </a:r>
+          </a:p>
+        </p:txBody>
+      </p:sp>
+      <p:sp>
+        <p:nvSpPr>
+          <p:cNvPr id="4" name="Rectangle 3"/>
+          <p:cNvSpPr/>
+          <p:nvPr/>
+        </p:nvSpPr>
+        <p:spPr>
+          <a:xfrm>
+            <a:off x="401506" y="737671"/>
+            <a:ext cx="837263" cy="246221"/>
+          </a:xfrm>
+          <a:prstGeom prst="rect">
+            <a:avLst/>
+          </a:prstGeom>
+        </p:spPr>
+        <p:txBody>
+          <a:bodyPr wrap="none">
+            <a:spAutoFit/>
+          </a:bodyPr>
+          <a:lstStyle/>
+          <a:p>
+            <a:pPr lvl="0" algn="ctr"/>
+            <a:r>
+              <a:rPr kumimoji="1" lang="en-US" altLang="ja-JP" sz="1000">
+                <a:solidFill>
+                  <a:srgbClr val="FF0000"/>
+                </a:solidFill>
+              </a:rPr>
+              <a:t>Php Training</a:t>
+            </a:r>
+            <a:endParaRPr kumimoji="1" lang="ja-JP" altLang="en-US" sz="1000">
+              <a:solidFill>
+                <a:srgbClr val="FF0000"/>
+              </a:solidFill>
+            </a:endParaRPr>
+          </a:p>
+        </p:txBody>
+      </p:sp>
+      <p:sp>
+        <p:nvSpPr>
+          <p:cNvPr id="7" name="Rectangle 6"/>
+          <p:cNvSpPr/>
+          <p:nvPr/>
+        </p:nvSpPr>
+        <p:spPr>
+          <a:xfrm>
+            <a:off x="477876" y="1420804"/>
+            <a:ext cx="1871134" cy="192975"/>
+          </a:xfrm>
+          <a:prstGeom prst="rect">
+            <a:avLst/>
+          </a:prstGeom>
+          <a:ln>
+            <a:solidFill>
+              <a:schemeClr val="tx1"/>
+            </a:solidFill>
+          </a:ln>
+          <a:effectLst/>
+        </p:spPr>
+        <p:style>
+          <a:lnRef idx="1">
+            <a:schemeClr val="accent1"/>
+          </a:lnRef>
+          <a:fillRef idx="3">
+            <a:schemeClr val="accent1"/>
+          </a:fillRef>
+          <a:effectRef idx="2">
+            <a:schemeClr val="accent1"/>
+          </a:effectRef>
+          <a:fontRef idx="minor">
+            <a:schemeClr val="lt1"/>
+          </a:fontRef>
+        </p:style>
+        <p:txBody>
+          <a:bodyPr rtlCol="0" anchor="ctr"/>
+          <a:lstStyle/>
+          <a:p>
+            <a:r>
+              <a:rPr kumimoji="1" lang="en-US" altLang="ja-JP" sz="800" i="1">
+                <a:solidFill>
+                  <a:schemeClr val="bg1">
+                    <a:lumMod val="75000"/>
+                  </a:schemeClr>
+                </a:solidFill>
+              </a:rPr>
+              <a:t>Username, firstname, lastname,…</a:t>
+            </a:r>
+            <a:endParaRPr kumimoji="1" lang="ja-JP" altLang="en-US" sz="800" i="1">
+              <a:solidFill>
+                <a:schemeClr val="bg1">
+                  <a:lumMod val="75000"/>
+                </a:schemeClr>
+              </a:solidFill>
+            </a:endParaRPr>
+          </a:p>
+        </p:txBody>
+      </p:sp>
+      <p:sp>
+        <p:nvSpPr>
+          <p:cNvPr id="8" name="Rectangle 7"/>
+          <p:cNvSpPr/>
+          <p:nvPr/>
+        </p:nvSpPr>
+        <p:spPr>
+          <a:xfrm>
+            <a:off x="2413000" y="1420804"/>
+            <a:ext cx="558800" cy="209383"/>
+          </a:xfrm>
+          <a:prstGeom prst="rect">
+            <a:avLst/>
+          </a:prstGeom>
+        </p:spPr>
+        <p:style>
+          <a:lnRef idx="1">
+            <a:schemeClr val="accent1"/>
+          </a:lnRef>
+          <a:fillRef idx="3">
+            <a:schemeClr val="accent1"/>
+          </a:fillRef>
+          <a:effectRef idx="2">
+            <a:schemeClr val="accent1"/>
+          </a:effectRef>
+          <a:fontRef idx="minor">
+            <a:schemeClr val="lt1"/>
+          </a:fontRef>
+        </p:style>
+        <p:txBody>
+          <a:bodyPr rtlCol="0" anchor="ctr"/>
+          <a:lstStyle/>
+          <a:p>
+            <a:pPr algn="ctr"/>
+            <a:r>
+              <a:rPr kumimoji="1" lang="en-US" altLang="ja-JP" sz="1000"/>
+              <a:t>Search</a:t>
+            </a:r>
+            <a:endParaRPr kumimoji="1" lang="ja-JP" altLang="en-US" sz="1000"/>
+          </a:p>
+        </p:txBody>
+      </p:sp>
+      <p:sp>
+        <p:nvSpPr>
+          <p:cNvPr id="9" name="Rectangle 8"/>
+          <p:cNvSpPr/>
+          <p:nvPr/>
+        </p:nvSpPr>
+        <p:spPr>
+          <a:xfrm>
+            <a:off x="2548467" y="983891"/>
+            <a:ext cx="1600200" cy="292291"/>
+          </a:xfrm>
+          <a:prstGeom prst="rect">
+            <a:avLst/>
+          </a:prstGeom>
+        </p:spPr>
+        <p:style>
+          <a:lnRef idx="1">
+            <a:schemeClr val="accent1"/>
+          </a:lnRef>
+          <a:fillRef idx="3">
+            <a:schemeClr val="accent1"/>
+          </a:fillRef>
+          <a:effectRef idx="2">
+            <a:schemeClr val="accent1"/>
+          </a:effectRef>
+          <a:fontRef idx="minor">
+            <a:schemeClr val="lt1"/>
+          </a:fontRef>
+        </p:style>
+        <p:txBody>
+          <a:bodyPr rtlCol="0" anchor="ctr"/>
+          <a:lstStyle/>
+          <a:p>
+            <a:pPr algn="r"/>
+            <a:r>
+              <a:rPr kumimoji="1" lang="en-US" altLang="ja-JP" sz="1000"/>
+              <a:t>  Blog | Sitemap | </a:t>
+            </a:r>
+            <a:r>
+              <a:rPr kumimoji="1" lang="en-US" altLang="ja-JP" sz="1000">
+                <a:solidFill>
+                  <a:srgbClr val="FF0000"/>
+                </a:solidFill>
+              </a:rPr>
+              <a:t>Login</a:t>
+            </a:r>
+            <a:endParaRPr kumimoji="1" lang="ja-JP" altLang="en-US" sz="1000">
+              <a:solidFill>
+                <a:srgbClr val="FF0000"/>
+              </a:solidFill>
+            </a:endParaRPr>
+          </a:p>
+        </p:txBody>
+      </p:sp>
+      <p:cxnSp>
+        <p:nvCxnSpPr>
+          <p:cNvPr id="13" name="Straight Connector 12"/>
+          <p:cNvCxnSpPr/>
+          <p:nvPr/>
+        </p:nvCxnSpPr>
+        <p:spPr>
+          <a:xfrm>
+            <a:off x="477876" y="1921934"/>
+            <a:ext cx="3670791" cy="0"/>
+          </a:xfrm>
+          <a:prstGeom prst="line">
+            <a:avLst/>
+          </a:prstGeom>
+          <a:ln w="3175" cmpd="sng">
+            <a:solidFill>
+              <a:schemeClr val="bg1">
+                <a:lumMod val="75000"/>
+              </a:schemeClr>
+            </a:solidFill>
+          </a:ln>
+          <a:effectLst/>
+        </p:spPr>
+        <p:style>
+          <a:lnRef idx="2">
+            <a:schemeClr val="accent1"/>
+          </a:lnRef>
+          <a:fillRef idx="0">
+            <a:schemeClr val="accent1"/>
+          </a:fillRef>
+          <a:effectRef idx="1">
+            <a:schemeClr val="accent1"/>
+          </a:effectRef>
+          <a:fontRef idx="minor">
+            <a:schemeClr val="tx1"/>
+          </a:fontRef>
+        </p:style>
+      </p:cxnSp>
+      <p:sp>
+        <p:nvSpPr>
+          <p:cNvPr id="14" name="TextBox 13"/>
+          <p:cNvSpPr txBox="1"/>
+          <p:nvPr/>
+        </p:nvSpPr>
+        <p:spPr>
+          <a:xfrm>
+            <a:off x="384739" y="1668018"/>
             <a:ext cx="919665" cy="253916"/>
           </a:xfrm>
           <a:prstGeom prst="rect">
@@ -9630,7 +10915,7 @@
           <p:nvPr>
             <p:extLst>
               <p:ext uri="{D42A27DB-BD31-4B8C-83A1-F6EECF244321}">
-                <p14:modId xmlns:p14="http://schemas.microsoft.com/office/powerpoint/2010/main" val="1703034106"/>
+                <p14:modId xmlns:p14="http://schemas.microsoft.com/office/powerpoint/2010/main" val="4163590924"/>
               </p:ext>
             </p:extLst>
           </p:nvPr>
@@ -10270,23 +11555,7 @@
                   <a:srgbClr val="FF0000"/>
                 </a:solidFill>
               </a:rPr>
-              <a:t>(</a:t>
-            </a:r>
-            <a:r>
-              <a:rPr kumimoji="1" lang="en-US" altLang="ja-JP" sz="1000">
-                <a:solidFill>
-                  <a:srgbClr val="FF0000"/>
-                </a:solidFill>
-              </a:rPr>
-              <a:t>show message</a:t>
-            </a:r>
-            <a:r>
-              <a:rPr kumimoji="1" lang="en-US" altLang="ja-JP" sz="1000">
-                <a:solidFill>
-                  <a:srgbClr val="FF0000"/>
-                </a:solidFill>
-              </a:rPr>
-              <a:t>)</a:t>
+              <a:t>(show message)</a:t>
             </a:r>
             <a:endParaRPr kumimoji="1" lang="ja-JP" altLang="en-US" sz="1000">
               <a:solidFill>
@@ -10299,7 +11568,7 @@
     </p:spTree>
     <p:extLst>
       <p:ext uri="{BB962C8B-B14F-4D97-AF65-F5344CB8AC3E}">
-        <p14:creationId xmlns:p14="http://schemas.microsoft.com/office/powerpoint/2010/main" val="2944998633"/>
+        <p14:creationId xmlns:p14="http://schemas.microsoft.com/office/powerpoint/2010/main" val="939030142"/>
       </p:ext>
     </p:extLst>
   </p:cSld>
@@ -10316,7 +11585,7 @@
 </p:sld>
 </file>
 
-<file path=ppt/slides/slide4.xml><?xml version="1.0" encoding="utf-8"?>
+<file path=ppt/slides/slide5.xml><?xml version="1.0" encoding="utf-8"?>
 <p:sld xmlns:a="http://schemas.openxmlformats.org/drawingml/2006/main" xmlns:r="http://schemas.openxmlformats.org/officeDocument/2006/relationships" xmlns:p="http://schemas.openxmlformats.org/presentationml/2006/main">
   <p:cSld>
     <p:spTree>
@@ -11539,7 +12808,7 @@
 </p:sld>
 </file>
 
-<file path=ppt/slides/slide5.xml><?xml version="1.0" encoding="utf-8"?>
+<file path=ppt/slides/slide6.xml><?xml version="1.0" encoding="utf-8"?>
 <p:sld xmlns:a="http://schemas.openxmlformats.org/drawingml/2006/main" xmlns:r="http://schemas.openxmlformats.org/officeDocument/2006/relationships" xmlns:p="http://schemas.openxmlformats.org/presentationml/2006/main">
   <p:cSld>
     <p:spTree>
@@ -11594,35 +12863,21 @@
             <a:p>
               <a:r>
                 <a:rPr lang="en-US" b="1" dirty="0">
-                  <a:latin typeface="Times New Roman" panose="02020603050405020304" pitchFamily="18" charset="0"/>
-                  <a:cs typeface="Times New Roman" panose="02020603050405020304" pitchFamily="18" charset="0"/>
+                  <a:latin typeface="Calibri"/>
+                  <a:cs typeface="Calibri"/>
                 </a:rPr>
-                <a:t> </a:t>
-              </a:r>
-              <a:r>
-                <a:rPr lang="en-US" b="1" dirty="0">
-                  <a:latin typeface="Times New Roman" panose="02020603050405020304" pitchFamily="18" charset="0"/>
-                  <a:cs typeface="Times New Roman" panose="02020603050405020304" pitchFamily="18" charset="0"/>
-                </a:rPr>
-                <a:t>S-4-2 </a:t>
-              </a:r>
-              <a:r>
-                <a:rPr lang="en-US" b="1" dirty="0">
-                  <a:latin typeface="Times New Roman" panose="02020603050405020304" pitchFamily="18" charset="0"/>
-                  <a:cs typeface="Times New Roman" panose="02020603050405020304" pitchFamily="18" charset="0"/>
-                </a:rPr>
-                <a:t>Update </a:t>
+                <a:t> S-4-2 Update </a:t>
               </a:r>
               <a:r>
                 <a:rPr lang="en-US" b="1" dirty="0" smtClean="0">
-                  <a:latin typeface="Times New Roman" panose="02020603050405020304" pitchFamily="18" charset="0"/>
-                  <a:cs typeface="Times New Roman" panose="02020603050405020304" pitchFamily="18" charset="0"/>
+                  <a:latin typeface="Calibri"/>
+                  <a:cs typeface="Calibri"/>
                 </a:rPr>
                 <a:t>user info</a:t>
               </a:r>
               <a:endParaRPr lang="en-US" b="1" dirty="0">
-                <a:latin typeface="Times New Roman" panose="02020603050405020304" pitchFamily="18" charset="0"/>
-                <a:cs typeface="Times New Roman" panose="02020603050405020304" pitchFamily="18" charset="0"/>
+                <a:latin typeface="Calibri"/>
+                <a:cs typeface="Calibri"/>
               </a:endParaRPr>
             </a:p>
           </p:txBody>
@@ -11759,7 +13014,10 @@
                   </a:bodyPr>
                   <a:lstStyle/>
                   <a:p>
-                    <a:endParaRPr lang="en-US"/>
+                    <a:endParaRPr lang="en-US">
+                      <a:latin typeface="Calibri"/>
+                      <a:cs typeface="Calibri"/>
+                    </a:endParaRPr>
                   </a:p>
                 </p:txBody>
               </p:sp>
@@ -11821,15 +13079,17 @@
                           <a:srgbClr val="FEFEFE"/>
                         </a:solidFill>
                         <a:effectLst/>
+                        <a:latin typeface="Calibri"/>
                         <a:ea typeface="Times New Roman" panose="02020603050405020304" pitchFamily="18" charset="0"/>
-                        <a:cs typeface="Times New Roman" panose="02020603050405020304" pitchFamily="18" charset="0"/>
+                        <a:cs typeface="Calibri"/>
                       </a:rPr>
                       <a:t>Header</a:t>
                     </a:r>
                     <a:endParaRPr lang="en-US" sz="1200">
                       <a:effectLst/>
-                      <a:latin typeface="Times New Roman" panose="02020603050405020304" pitchFamily="18" charset="0"/>
+                      <a:latin typeface="Calibri"/>
                       <a:ea typeface="Times New Roman" panose="02020603050405020304" pitchFamily="18" charset="0"/>
+                      <a:cs typeface="Calibri"/>
                     </a:endParaRPr>
                   </a:p>
                 </p:txBody>
@@ -11892,15 +13152,17 @@
                           <a:srgbClr val="FEFEFE"/>
                         </a:solidFill>
                         <a:effectLst/>
+                        <a:latin typeface="Calibri"/>
                         <a:ea typeface="Times New Roman" panose="02020603050405020304" pitchFamily="18" charset="0"/>
-                        <a:cs typeface="Times New Roman" panose="02020603050405020304" pitchFamily="18" charset="0"/>
+                        <a:cs typeface="Calibri"/>
                       </a:rPr>
                       <a:t>Footer</a:t>
                     </a:r>
                     <a:endParaRPr lang="en-US" sz="1200">
                       <a:effectLst/>
-                      <a:latin typeface="Times New Roman" panose="02020603050405020304" pitchFamily="18" charset="0"/>
+                      <a:latin typeface="Calibri"/>
                       <a:ea typeface="Times New Roman" panose="02020603050405020304" pitchFamily="18" charset="0"/>
+                      <a:cs typeface="Calibri"/>
                     </a:endParaRPr>
                   </a:p>
                 </p:txBody>
@@ -12006,15 +13268,17 @@
                               <a:srgbClr val="FEFEFE"/>
                             </a:solidFill>
                             <a:effectLst/>
+                            <a:latin typeface="Calibri"/>
                             <a:ea typeface="Times New Roman" panose="02020603050405020304" pitchFamily="18" charset="0"/>
-                            <a:cs typeface="Times New Roman" panose="02020603050405020304" pitchFamily="18" charset="0"/>
+                            <a:cs typeface="Calibri"/>
                           </a:rPr>
                           <a:t>Basic info</a:t>
                         </a:r>
                         <a:endParaRPr lang="en-US" sz="1200">
                           <a:effectLst/>
-                          <a:latin typeface="Times New Roman" panose="02020603050405020304" pitchFamily="18" charset="0"/>
+                          <a:latin typeface="Calibri"/>
                           <a:ea typeface="Times New Roman" panose="02020603050405020304" pitchFamily="18" charset="0"/>
+                          <a:cs typeface="Calibri"/>
                         </a:endParaRPr>
                       </a:p>
                     </p:txBody>
@@ -12064,7 +13328,10 @@
                       </a:bodyPr>
                       <a:lstStyle/>
                       <a:p>
-                        <a:endParaRPr lang="en-US"/>
+                        <a:endParaRPr lang="en-US">
+                          <a:latin typeface="Calibri"/>
+                          <a:cs typeface="Calibri"/>
+                        </a:endParaRPr>
                       </a:p>
                     </p:txBody>
                   </p:sp>
@@ -12156,7 +13423,10 @@
                           </a:bodyPr>
                           <a:lstStyle/>
                           <a:p>
-                            <a:endParaRPr lang="en-US"/>
+                            <a:endParaRPr lang="en-US">
+                              <a:latin typeface="Calibri"/>
+                              <a:cs typeface="Calibri"/>
+                            </a:endParaRPr>
                           </a:p>
                         </p:txBody>
                       </p:sp>
@@ -12200,17 +13470,17 @@
                                   <a:srgbClr val="2E75B6"/>
                                 </a:solidFill>
                                 <a:effectLst/>
-                                <a:latin typeface="Times New Roman" panose="02020603050405020304" pitchFamily="18" charset="0"/>
+                                <a:latin typeface="Calibri"/>
                                 <a:ea typeface="Times New Roman" panose="02020603050405020304" pitchFamily="18" charset="0"/>
-                                <a:cs typeface="Times New Roman" panose="02020603050405020304" pitchFamily="18" charset="0"/>
+                                <a:cs typeface="Calibri"/>
                               </a:rPr>
                               <a:t>Ti</a:t>
                             </a:r>
                             <a:endParaRPr lang="en-US" sz="1200" dirty="0">
                               <a:effectLst/>
-                              <a:latin typeface="Times New Roman" panose="02020603050405020304" pitchFamily="18" charset="0"/>
+                              <a:latin typeface="Calibri"/>
                               <a:ea typeface="Times New Roman" panose="02020603050405020304" pitchFamily="18" charset="0"/>
-                              <a:cs typeface="Times New Roman" panose="02020603050405020304" pitchFamily="18" charset="0"/>
+                              <a:cs typeface="Calibri"/>
                             </a:endParaRPr>
                           </a:p>
                         </p:txBody>
@@ -12275,7 +13545,10 @@
                           </a:bodyPr>
                           <a:lstStyle/>
                           <a:p>
-                            <a:endParaRPr lang="en-US"/>
+                            <a:endParaRPr lang="en-US">
+                              <a:latin typeface="Calibri"/>
+                              <a:cs typeface="Calibri"/>
+                            </a:endParaRPr>
                           </a:p>
                         </p:txBody>
                       </p:sp>
@@ -12318,9 +13591,9 @@
                                 <a:solidFill>
                                   <a:srgbClr val="2E75B6"/>
                                 </a:solidFill>
-                                <a:latin typeface="Times New Roman" panose="02020603050405020304" pitchFamily="18" charset="0"/>
+                                <a:latin typeface="Calibri"/>
                                 <a:ea typeface="Times New Roman" panose="02020603050405020304" pitchFamily="18" charset="0"/>
-                                <a:cs typeface="Times New Roman" panose="02020603050405020304" pitchFamily="18" charset="0"/>
+                                <a:cs typeface="Calibri"/>
                               </a:rPr>
                               <a:t>Nguyen</a:t>
                             </a:r>
@@ -12330,17 +13603,17 @@
                                   <a:srgbClr val="2E75B6"/>
                                 </a:solidFill>
                                 <a:effectLst/>
-                                <a:latin typeface="Times New Roman" panose="02020603050405020304" pitchFamily="18" charset="0"/>
+                                <a:latin typeface="Calibri"/>
                                 <a:ea typeface="Times New Roman" panose="02020603050405020304" pitchFamily="18" charset="0"/>
-                                <a:cs typeface="Times New Roman" panose="02020603050405020304" pitchFamily="18" charset="0"/>
+                                <a:cs typeface="Calibri"/>
                               </a:rPr>
                               <a:t> Van</a:t>
                             </a:r>
                             <a:endParaRPr lang="en-US" sz="1200" dirty="0">
                               <a:effectLst/>
-                              <a:latin typeface="Times New Roman" panose="02020603050405020304" pitchFamily="18" charset="0"/>
+                              <a:latin typeface="Calibri"/>
                               <a:ea typeface="Times New Roman" panose="02020603050405020304" pitchFamily="18" charset="0"/>
-                              <a:cs typeface="Times New Roman" panose="02020603050405020304" pitchFamily="18" charset="0"/>
+                              <a:cs typeface="Calibri"/>
                             </a:endParaRPr>
                           </a:p>
                         </p:txBody>
@@ -12421,9 +13694,9 @@
                                 <a:solidFill>
                                   <a:srgbClr val="2E75B6"/>
                                 </a:solidFill>
-                                <a:latin typeface="Times New Roman" panose="02020603050405020304" pitchFamily="18" charset="0"/>
+                                <a:latin typeface="Calibri"/>
                                 <a:ea typeface="Times New Roman" panose="02020603050405020304" pitchFamily="18" charset="0"/>
-                                <a:cs typeface="Times New Roman" panose="02020603050405020304" pitchFamily="18" charset="0"/>
+                                <a:cs typeface="Calibri"/>
                               </a:rPr>
                               <a:t>Male</a:t>
                             </a:r>
@@ -12431,9 +13704,9 @@
                               <a:solidFill>
                                 <a:srgbClr val="2E75B6"/>
                               </a:solidFill>
-                              <a:latin typeface="Times New Roman" panose="02020603050405020304" pitchFamily="18" charset="0"/>
+                              <a:latin typeface="Calibri"/>
                               <a:ea typeface="Times New Roman" panose="02020603050405020304" pitchFamily="18" charset="0"/>
-                              <a:cs typeface="Times New Roman" panose="02020603050405020304" pitchFamily="18" charset="0"/>
+                              <a:cs typeface="Calibri"/>
                             </a:endParaRPr>
                           </a:p>
                         </p:txBody>
@@ -12485,7 +13758,10 @@
                           </a:bodyPr>
                           <a:lstStyle/>
                           <a:p>
-                            <a:endParaRPr lang="en-US"/>
+                            <a:endParaRPr lang="en-US">
+                              <a:latin typeface="Calibri"/>
+                              <a:cs typeface="Calibri"/>
+                            </a:endParaRPr>
                           </a:p>
                         </p:txBody>
                       </p:sp>
@@ -12565,9 +13841,9 @@
                                 <a:solidFill>
                                   <a:srgbClr val="2E75B6"/>
                                 </a:solidFill>
-                                <a:latin typeface="Times New Roman" panose="02020603050405020304" pitchFamily="18" charset="0"/>
+                                <a:latin typeface="Calibri"/>
                                 <a:ea typeface="Times New Roman" panose="02020603050405020304" pitchFamily="18" charset="0"/>
-                                <a:cs typeface="Times New Roman" panose="02020603050405020304" pitchFamily="18" charset="0"/>
+                                <a:cs typeface="Calibri"/>
                               </a:rPr>
                               <a:t>25</a:t>
                             </a:r>
@@ -12575,9 +13851,9 @@
                               <a:solidFill>
                                 <a:srgbClr val="2E75B6"/>
                               </a:solidFill>
-                              <a:latin typeface="Times New Roman" panose="02020603050405020304" pitchFamily="18" charset="0"/>
+                              <a:latin typeface="Calibri"/>
                               <a:ea typeface="Times New Roman" panose="02020603050405020304" pitchFamily="18" charset="0"/>
-                              <a:cs typeface="Times New Roman" panose="02020603050405020304" pitchFamily="18" charset="0"/>
+                              <a:cs typeface="Calibri"/>
                             </a:endParaRPr>
                           </a:p>
                         </p:txBody>
@@ -12629,7 +13905,10 @@
                           </a:bodyPr>
                           <a:lstStyle/>
                           <a:p>
-                            <a:endParaRPr lang="en-US"/>
+                            <a:endParaRPr lang="en-US">
+                              <a:latin typeface="Calibri"/>
+                              <a:cs typeface="Calibri"/>
+                            </a:endParaRPr>
                           </a:p>
                         </p:txBody>
                       </p:sp>
@@ -12709,9 +13988,9 @@
                                 <a:solidFill>
                                   <a:srgbClr val="2E75B6"/>
                                 </a:solidFill>
-                                <a:latin typeface="Times New Roman" panose="02020603050405020304" pitchFamily="18" charset="0"/>
+                                <a:latin typeface="Calibri"/>
                                 <a:ea typeface="Times New Roman" panose="02020603050405020304" pitchFamily="18" charset="0"/>
-                                <a:cs typeface="Times New Roman" panose="02020603050405020304" pitchFamily="18" charset="0"/>
+                                <a:cs typeface="Calibri"/>
                               </a:rPr>
                               <a:t>December</a:t>
                             </a:r>
@@ -12719,9 +13998,9 @@
                               <a:solidFill>
                                 <a:srgbClr val="2E75B6"/>
                               </a:solidFill>
-                              <a:latin typeface="Times New Roman" panose="02020603050405020304" pitchFamily="18" charset="0"/>
+                              <a:latin typeface="Calibri"/>
                               <a:ea typeface="Times New Roman" panose="02020603050405020304" pitchFamily="18" charset="0"/>
-                              <a:cs typeface="Times New Roman" panose="02020603050405020304" pitchFamily="18" charset="0"/>
+                              <a:cs typeface="Calibri"/>
                             </a:endParaRPr>
                           </a:p>
                         </p:txBody>
@@ -12773,7 +14052,10 @@
                           </a:bodyPr>
                           <a:lstStyle/>
                           <a:p>
-                            <a:endParaRPr lang="en-US"/>
+                            <a:endParaRPr lang="en-US">
+                              <a:latin typeface="Calibri"/>
+                              <a:cs typeface="Calibri"/>
+                            </a:endParaRPr>
                           </a:p>
                         </p:txBody>
                       </p:sp>
@@ -12853,9 +14135,9 @@
                                 <a:solidFill>
                                   <a:srgbClr val="2E75B6"/>
                                 </a:solidFill>
-                                <a:latin typeface="Times New Roman" panose="02020603050405020304" pitchFamily="18" charset="0"/>
+                                <a:latin typeface="Calibri"/>
                                 <a:ea typeface="Times New Roman" panose="02020603050405020304" pitchFamily="18" charset="0"/>
-                                <a:cs typeface="Times New Roman" panose="02020603050405020304" pitchFamily="18" charset="0"/>
+                                <a:cs typeface="Calibri"/>
                               </a:rPr>
                               <a:t>1999</a:t>
                             </a:r>
@@ -12863,9 +14145,9 @@
                               <a:solidFill>
                                 <a:srgbClr val="2E75B6"/>
                               </a:solidFill>
-                              <a:latin typeface="Times New Roman" panose="02020603050405020304" pitchFamily="18" charset="0"/>
+                              <a:latin typeface="Calibri"/>
                               <a:ea typeface="Times New Roman" panose="02020603050405020304" pitchFamily="18" charset="0"/>
-                              <a:cs typeface="Times New Roman" panose="02020603050405020304" pitchFamily="18" charset="0"/>
+                              <a:cs typeface="Calibri"/>
                             </a:endParaRPr>
                           </a:p>
                         </p:txBody>
@@ -12917,7 +14199,10 @@
                           </a:bodyPr>
                           <a:lstStyle/>
                           <a:p>
-                            <a:endParaRPr lang="en-US"/>
+                            <a:endParaRPr lang="en-US">
+                              <a:latin typeface="Calibri"/>
+                              <a:cs typeface="Calibri"/>
+                            </a:endParaRPr>
                           </a:p>
                         </p:txBody>
                       </p:sp>
@@ -12974,22 +14259,22 @@
                             </a:spcAft>
                           </a:pPr>
                           <a:r>
-                            <a:rPr lang="en-US" sz="1200" b="1" dirty="0">
+                            <a:rPr lang="en-US" sz="1200" dirty="0">
                               <a:solidFill>
                                 <a:srgbClr val="2E75B6"/>
                               </a:solidFill>
                               <a:effectLst/>
-                              <a:latin typeface="Times New Roman" panose="02020603050405020304" pitchFamily="18" charset="0"/>
+                              <a:latin typeface="Calibri"/>
                               <a:ea typeface="Calibri" panose="020F0502020204030204" pitchFamily="34" charset="0"/>
-                              <a:cs typeface="Times New Roman" panose="02020603050405020304" pitchFamily="18" charset="0"/>
+                              <a:cs typeface="Calibri"/>
                             </a:rPr>
                             <a:t>First name</a:t>
                           </a:r>
                           <a:endParaRPr lang="en-US" sz="1200" dirty="0">
                             <a:effectLst/>
-                            <a:latin typeface="Times New Roman" panose="02020603050405020304" pitchFamily="18" charset="0"/>
+                            <a:latin typeface="Calibri"/>
                             <a:ea typeface="Calibri" panose="020F0502020204030204" pitchFamily="34" charset="0"/>
-                            <a:cs typeface="Times New Roman" panose="02020603050405020304" pitchFamily="18" charset="0"/>
+                            <a:cs typeface="Calibri"/>
                           </a:endParaRPr>
                         </a:p>
                       </p:txBody>
@@ -13046,22 +14331,22 @@
                             </a:spcAft>
                           </a:pPr>
                           <a:r>
-                            <a:rPr lang="en-US" sz="1200" b="1" dirty="0">
+                            <a:rPr lang="en-US" sz="1200" dirty="0">
                               <a:solidFill>
                                 <a:srgbClr val="2E75B6"/>
                               </a:solidFill>
                               <a:effectLst/>
-                              <a:latin typeface="Times New Roman" panose="02020603050405020304" pitchFamily="18" charset="0"/>
+                              <a:latin typeface="Calibri"/>
                               <a:ea typeface="Calibri" panose="020F0502020204030204" pitchFamily="34" charset="0"/>
-                              <a:cs typeface="Times New Roman" panose="02020603050405020304" pitchFamily="18" charset="0"/>
+                              <a:cs typeface="Calibri"/>
                             </a:rPr>
                             <a:t>Last name</a:t>
                           </a:r>
                           <a:endParaRPr lang="en-US" sz="1200" dirty="0">
                             <a:effectLst/>
-                            <a:latin typeface="Times New Roman" panose="02020603050405020304" pitchFamily="18" charset="0"/>
+                            <a:latin typeface="Calibri"/>
                             <a:ea typeface="Calibri" panose="020F0502020204030204" pitchFamily="34" charset="0"/>
-                            <a:cs typeface="Times New Roman" panose="02020603050405020304" pitchFamily="18" charset="0"/>
+                            <a:cs typeface="Calibri"/>
                           </a:endParaRPr>
                         </a:p>
                       </p:txBody>
@@ -13118,13 +14403,13 @@
                             </a:spcAft>
                           </a:pPr>
                           <a:r>
-                            <a:rPr lang="en-US" sz="1200" b="1" dirty="0">
+                            <a:rPr lang="en-US" sz="1200" dirty="0">
                               <a:solidFill>
                                 <a:srgbClr val="2E75B6"/>
                               </a:solidFill>
-                              <a:latin typeface="Times New Roman" panose="02020603050405020304" pitchFamily="18" charset="0"/>
+                              <a:latin typeface="Calibri"/>
                               <a:ea typeface="Calibri" panose="020F0502020204030204" pitchFamily="34" charset="0"/>
-                              <a:cs typeface="Times New Roman" panose="02020603050405020304" pitchFamily="18" charset="0"/>
+                              <a:cs typeface="Calibri"/>
                             </a:rPr>
                             <a:t>Gender</a:t>
                           </a:r>
@@ -13183,13 +14468,13 @@
                             </a:spcAft>
                           </a:pPr>
                           <a:r>
-                            <a:rPr lang="en-US" sz="1200" b="1" dirty="0">
+                            <a:rPr lang="en-US" sz="1200" dirty="0">
                               <a:solidFill>
                                 <a:srgbClr val="2E75B6"/>
                               </a:solidFill>
-                              <a:latin typeface="Times New Roman" panose="02020603050405020304" pitchFamily="18" charset="0"/>
+                              <a:latin typeface="Calibri"/>
                               <a:ea typeface="Calibri" panose="020F0502020204030204" pitchFamily="34" charset="0"/>
-                              <a:cs typeface="Times New Roman" panose="02020603050405020304" pitchFamily="18" charset="0"/>
+                              <a:cs typeface="Calibri"/>
                             </a:rPr>
                             <a:t>Birthday</a:t>
                           </a:r>
@@ -13296,8 +14581,9 @@
                     <a:r>
                       <a:rPr lang="en-US" sz="1100">
                         <a:effectLst/>
+                        <a:latin typeface="Calibri"/>
                         <a:ea typeface="Calibri" panose="020F0502020204030204" pitchFamily="34" charset="0"/>
-                        <a:cs typeface="Times New Roman" panose="02020603050405020304" pitchFamily="18" charset="0"/>
+                        <a:cs typeface="Calibri"/>
                       </a:rPr>
                       <a:t>Change avatar</a:t>
                     </a:r>
@@ -13405,15 +14691,17 @@
                               <a:srgbClr val="FEFEFE"/>
                             </a:solidFill>
                             <a:effectLst/>
+                            <a:latin typeface="Calibri"/>
                             <a:ea typeface="Times New Roman" panose="02020603050405020304" pitchFamily="18" charset="0"/>
-                            <a:cs typeface="Times New Roman" panose="02020603050405020304" pitchFamily="18" charset="0"/>
+                            <a:cs typeface="Calibri"/>
                           </a:rPr>
                           <a:t>Contact info</a:t>
                         </a:r>
                         <a:endParaRPr lang="en-US" sz="1200">
                           <a:effectLst/>
-                          <a:latin typeface="Times New Roman" panose="02020603050405020304" pitchFamily="18" charset="0"/>
+                          <a:latin typeface="Calibri"/>
                           <a:ea typeface="Times New Roman" panose="02020603050405020304" pitchFamily="18" charset="0"/>
+                          <a:cs typeface="Calibri"/>
                         </a:endParaRPr>
                       </a:p>
                     </p:txBody>
@@ -13463,7 +14751,10 @@
                       </a:bodyPr>
                       <a:lstStyle/>
                       <a:p>
-                        <a:endParaRPr lang="en-US"/>
+                        <a:endParaRPr lang="en-US">
+                          <a:latin typeface="Calibri"/>
+                          <a:cs typeface="Calibri"/>
+                        </a:endParaRPr>
                       </a:p>
                     </p:txBody>
                   </p:sp>
@@ -13541,7 +14832,10 @@
                         </a:bodyPr>
                         <a:lstStyle/>
                         <a:p>
-                          <a:endParaRPr lang="en-US"/>
+                          <a:endParaRPr lang="en-US">
+                            <a:latin typeface="Calibri"/>
+                            <a:cs typeface="Calibri"/>
+                          </a:endParaRPr>
                         </a:p>
                       </p:txBody>
                     </p:sp>
@@ -13585,9 +14879,9 @@
                                 <a:srgbClr val="2E75B6"/>
                               </a:solidFill>
                               <a:effectLst/>
-                              <a:latin typeface="Times New Roman" panose="02020603050405020304" pitchFamily="18" charset="0"/>
+                              <a:latin typeface="Calibri"/>
                               <a:ea typeface="Times New Roman" panose="02020603050405020304" pitchFamily="18" charset="0"/>
-                              <a:cs typeface="Times New Roman" panose="02020603050405020304" pitchFamily="18" charset="0"/>
+                              <a:cs typeface="Calibri"/>
                             </a:rPr>
                             <a:t>111/222 Tieu La street, Ward </a:t>
                           </a:r>
@@ -13597,9 +14891,9 @@
                                 <a:srgbClr val="2E75B6"/>
                               </a:solidFill>
                               <a:effectLst/>
-                              <a:latin typeface="Times New Roman" panose="02020603050405020304" pitchFamily="18" charset="0"/>
+                              <a:latin typeface="Calibri"/>
                               <a:ea typeface="Times New Roman" panose="02020603050405020304" pitchFamily="18" charset="0"/>
-                              <a:cs typeface="Times New Roman" panose="02020603050405020304" pitchFamily="18" charset="0"/>
+                              <a:cs typeface="Calibri"/>
                             </a:rPr>
                             <a:t>Dakao</a:t>
                           </a:r>
@@ -13609,17 +14903,17 @@
                                 <a:srgbClr val="2E75B6"/>
                               </a:solidFill>
                               <a:effectLst/>
-                              <a:latin typeface="Times New Roman" panose="02020603050405020304" pitchFamily="18" charset="0"/>
+                              <a:latin typeface="Calibri"/>
                               <a:ea typeface="Times New Roman" panose="02020603050405020304" pitchFamily="18" charset="0"/>
-                              <a:cs typeface="Times New Roman" panose="02020603050405020304" pitchFamily="18" charset="0"/>
+                              <a:cs typeface="Calibri"/>
                             </a:rPr>
                             <a:t>, District 1</a:t>
                           </a:r>
                           <a:endParaRPr lang="en-US" sz="1200" dirty="0">
                             <a:effectLst/>
-                            <a:latin typeface="Times New Roman" panose="02020603050405020304" pitchFamily="18" charset="0"/>
+                            <a:latin typeface="Calibri"/>
                             <a:ea typeface="Times New Roman" panose="02020603050405020304" pitchFamily="18" charset="0"/>
-                            <a:cs typeface="Times New Roman" panose="02020603050405020304" pitchFamily="18" charset="0"/>
+                            <a:cs typeface="Calibri"/>
                           </a:endParaRPr>
                         </a:p>
                       </p:txBody>
@@ -13701,9 +14995,9 @@
                                 <a:srgbClr val="2E75B6"/>
                               </a:solidFill>
                               <a:effectLst/>
-                              <a:latin typeface="Times New Roman" panose="02020603050405020304" pitchFamily="18" charset="0"/>
+                              <a:latin typeface="Calibri"/>
                               <a:ea typeface="Times New Roman" panose="02020603050405020304" pitchFamily="18" charset="0"/>
-                              <a:cs typeface="Times New Roman" panose="02020603050405020304" pitchFamily="18" charset="0"/>
+                              <a:cs typeface="Calibri"/>
                             </a:rPr>
                             <a:t>Ho</a:t>
                           </a:r>
@@ -13713,17 +15007,17 @@
                                 <a:srgbClr val="2E75B6"/>
                               </a:solidFill>
                               <a:effectLst/>
-                              <a:latin typeface="Times New Roman" panose="02020603050405020304" pitchFamily="18" charset="0"/>
+                              <a:latin typeface="Calibri"/>
                               <a:ea typeface="Times New Roman" panose="02020603050405020304" pitchFamily="18" charset="0"/>
-                              <a:cs typeface="Times New Roman" panose="02020603050405020304" pitchFamily="18" charset="0"/>
+                              <a:cs typeface="Calibri"/>
                             </a:rPr>
                             <a:t> Chi Minh</a:t>
                           </a:r>
                           <a:endParaRPr lang="en-US" sz="1200" dirty="0">
                             <a:effectLst/>
-                            <a:latin typeface="Times New Roman" panose="02020603050405020304" pitchFamily="18" charset="0"/>
+                            <a:latin typeface="Calibri"/>
                             <a:ea typeface="Times New Roman" panose="02020603050405020304" pitchFamily="18" charset="0"/>
-                            <a:cs typeface="Times New Roman" panose="02020603050405020304" pitchFamily="18" charset="0"/>
+                            <a:cs typeface="Calibri"/>
                           </a:endParaRPr>
                         </a:p>
                       </p:txBody>
@@ -13775,7 +15069,10 @@
                         </a:bodyPr>
                         <a:lstStyle/>
                         <a:p>
-                          <a:endParaRPr lang="en-US"/>
+                          <a:endParaRPr lang="en-US">
+                            <a:latin typeface="Calibri"/>
+                            <a:cs typeface="Calibri"/>
+                          </a:endParaRPr>
                         </a:p>
                       </p:txBody>
                     </p:sp>
@@ -13832,23 +15129,23 @@
                           </a:spcAft>
                         </a:pPr>
                         <a:r>
-                          <a:rPr lang="en-US" sz="1200" b="1" dirty="0" smtClean="0">
+                          <a:rPr lang="en-US" sz="1200" dirty="0" smtClean="0">
                             <a:solidFill>
                               <a:srgbClr val="2E75B6"/>
                             </a:solidFill>
-                            <a:latin typeface="Times New Roman" panose="02020603050405020304" pitchFamily="18" charset="0"/>
+                            <a:latin typeface="Calibri"/>
                             <a:ea typeface="Calibri" panose="020F0502020204030204" pitchFamily="34" charset="0"/>
-                            <a:cs typeface="Times New Roman" panose="02020603050405020304" pitchFamily="18" charset="0"/>
+                            <a:cs typeface="Calibri"/>
                           </a:rPr>
                           <a:t>Address</a:t>
                         </a:r>
-                        <a:endParaRPr lang="en-US" sz="1200" b="1" dirty="0">
+                        <a:endParaRPr lang="en-US" sz="1200" dirty="0">
                           <a:solidFill>
                             <a:srgbClr val="2E75B6"/>
                           </a:solidFill>
-                          <a:latin typeface="Times New Roman" panose="02020603050405020304" pitchFamily="18" charset="0"/>
+                          <a:latin typeface="Calibri"/>
                           <a:ea typeface="Calibri" panose="020F0502020204030204" pitchFamily="34" charset="0"/>
-                          <a:cs typeface="Times New Roman" panose="02020603050405020304" pitchFamily="18" charset="0"/>
+                          <a:cs typeface="Calibri"/>
                         </a:endParaRPr>
                       </a:p>
                     </p:txBody>
@@ -13905,13 +15202,13 @@
                           </a:spcAft>
                         </a:pPr>
                         <a:r>
-                          <a:rPr lang="en-US" sz="1200" b="1" dirty="0">
+                          <a:rPr lang="en-US" sz="1200" dirty="0">
                             <a:solidFill>
                               <a:srgbClr val="2E75B6"/>
                             </a:solidFill>
-                            <a:latin typeface="Times New Roman" panose="02020603050405020304" pitchFamily="18" charset="0"/>
+                            <a:latin typeface="Calibri"/>
                             <a:ea typeface="Calibri" panose="020F0502020204030204" pitchFamily="34" charset="0"/>
-                            <a:cs typeface="Times New Roman" panose="02020603050405020304" pitchFamily="18" charset="0"/>
+                            <a:cs typeface="Calibri"/>
                           </a:rPr>
                           <a:t>City</a:t>
                         </a:r>
@@ -13970,13 +15267,13 @@
                           </a:spcAft>
                         </a:pPr>
                         <a:r>
-                          <a:rPr lang="en-US" sz="1200" b="1" dirty="0">
+                          <a:rPr lang="en-US" sz="1200" dirty="0">
                             <a:solidFill>
                               <a:srgbClr val="2E75B6"/>
                             </a:solidFill>
-                            <a:latin typeface="Times New Roman" panose="02020603050405020304" pitchFamily="18" charset="0"/>
+                            <a:latin typeface="Calibri"/>
                             <a:ea typeface="Calibri" panose="020F0502020204030204" pitchFamily="34" charset="0"/>
-                            <a:cs typeface="Times New Roman" panose="02020603050405020304" pitchFamily="18" charset="0"/>
+                            <a:cs typeface="Calibri"/>
                           </a:rPr>
                           <a:t>Email</a:t>
                         </a:r>
@@ -14024,9 +15321,9 @@
                         <a:solidFill>
                           <a:srgbClr val="2E75B6"/>
                         </a:solidFill>
-                        <a:latin typeface="Times New Roman" panose="02020603050405020304" pitchFamily="18" charset="0"/>
+                        <a:latin typeface="Calibri"/>
                         <a:ea typeface="Times New Roman" panose="02020603050405020304" pitchFamily="18" charset="0"/>
-                        <a:cs typeface="Times New Roman" panose="02020603050405020304" pitchFamily="18" charset="0"/>
+                        <a:cs typeface="Calibri"/>
                       </a:rPr>
                       <a:t>boss@mulodo.com</a:t>
                     </a:r>
@@ -14034,9 +15331,9 @@
                       <a:solidFill>
                         <a:srgbClr val="2E75B6"/>
                       </a:solidFill>
-                      <a:latin typeface="Times New Roman" panose="02020603050405020304" pitchFamily="18" charset="0"/>
+                      <a:latin typeface="Calibri"/>
                       <a:ea typeface="Times New Roman" panose="02020603050405020304" pitchFamily="18" charset="0"/>
-                      <a:cs typeface="Times New Roman" panose="02020603050405020304" pitchFamily="18" charset="0"/>
+                      <a:cs typeface="Calibri"/>
                     </a:endParaRPr>
                   </a:p>
                 </p:txBody>
@@ -14093,13 +15390,13 @@
                       </a:spcAft>
                     </a:pPr>
                     <a:r>
-                      <a:rPr lang="en-US" sz="1200" b="1" dirty="0">
+                      <a:rPr lang="en-US" sz="1200" dirty="0">
                         <a:solidFill>
                           <a:srgbClr val="2E75B6"/>
                         </a:solidFill>
-                        <a:latin typeface="Times New Roman" panose="02020603050405020304" pitchFamily="18" charset="0"/>
+                        <a:latin typeface="Calibri"/>
                         <a:ea typeface="Calibri" panose="020F0502020204030204" pitchFamily="34" charset="0"/>
-                        <a:cs typeface="Times New Roman" panose="02020603050405020304" pitchFamily="18" charset="0"/>
+                        <a:cs typeface="Calibri"/>
                       </a:rPr>
                       <a:t>Mobile</a:t>
                     </a:r>
@@ -14146,9 +15443,9 @@
                           <a:srgbClr val="2E75B6"/>
                         </a:solidFill>
                         <a:effectLst/>
-                        <a:latin typeface="Times New Roman" panose="02020603050405020304" pitchFamily="18" charset="0"/>
+                        <a:latin typeface="Calibri"/>
                         <a:ea typeface="Times New Roman" panose="02020603050405020304" pitchFamily="18" charset="0"/>
-                        <a:cs typeface="Times New Roman" panose="02020603050405020304" pitchFamily="18" charset="0"/>
+                        <a:cs typeface="Calibri"/>
                       </a:rPr>
                       <a:t>0123 456 </a:t>
                     </a:r>
@@ -14157,9 +15454,9 @@
                         <a:solidFill>
                           <a:srgbClr val="2E75B6"/>
                         </a:solidFill>
-                        <a:latin typeface="Times New Roman" panose="02020603050405020304" pitchFamily="18" charset="0"/>
+                        <a:latin typeface="Calibri"/>
                         <a:ea typeface="Times New Roman" panose="02020603050405020304" pitchFamily="18" charset="0"/>
-                        <a:cs typeface="Times New Roman" panose="02020603050405020304" pitchFamily="18" charset="0"/>
+                        <a:cs typeface="Calibri"/>
                       </a:rPr>
                       <a:t>789</a:t>
                     </a:r>
@@ -14167,9 +15464,9 @@
                       <a:solidFill>
                         <a:srgbClr val="2E75B6"/>
                       </a:solidFill>
-                      <a:latin typeface="Times New Roman" panose="02020603050405020304" pitchFamily="18" charset="0"/>
+                      <a:latin typeface="Calibri"/>
                       <a:ea typeface="Times New Roman" panose="02020603050405020304" pitchFamily="18" charset="0"/>
-                      <a:cs typeface="Times New Roman" panose="02020603050405020304" pitchFamily="18" charset="0"/>
+                      <a:cs typeface="Calibri"/>
                     </a:endParaRPr>
                   </a:p>
                 </p:txBody>
@@ -14248,15 +15545,17 @@
                         <a:srgbClr val="FEFEFE"/>
                       </a:solidFill>
                       <a:effectLst/>
+                      <a:latin typeface="Calibri"/>
                       <a:ea typeface="Times New Roman" panose="02020603050405020304" pitchFamily="18" charset="0"/>
-                      <a:cs typeface="Times New Roman" panose="02020603050405020304" pitchFamily="18" charset="0"/>
+                      <a:cs typeface="Calibri"/>
                     </a:rPr>
                     <a:t>Comfirm</a:t>
                   </a:r>
                   <a:endParaRPr lang="en-US" sz="1200">
                     <a:effectLst/>
-                    <a:latin typeface="Times New Roman" panose="02020603050405020304" pitchFamily="18" charset="0"/>
+                    <a:latin typeface="Calibri"/>
                     <a:ea typeface="Times New Roman" panose="02020603050405020304" pitchFamily="18" charset="0"/>
+                    <a:cs typeface="Calibri"/>
                   </a:endParaRPr>
                 </a:p>
               </p:txBody>
@@ -14306,7 +15605,10 @@
                 </a:bodyPr>
                 <a:lstStyle/>
                 <a:p>
-                  <a:endParaRPr lang="en-US"/>
+                  <a:endParaRPr lang="en-US">
+                    <a:latin typeface="Calibri"/>
+                    <a:cs typeface="Calibri"/>
+                  </a:endParaRPr>
                 </a:p>
               </p:txBody>
             </p:sp>
@@ -14367,22 +15669,22 @@
                     </a:spcAft>
                   </a:pPr>
                   <a:r>
-                    <a:rPr lang="en-GB" sz="1200" b="1" kern="1200" dirty="0">
+                    <a:rPr lang="en-GB" sz="1200" kern="1200" dirty="0">
                       <a:solidFill>
                         <a:srgbClr val="5B9BD5"/>
                       </a:solidFill>
                       <a:effectLst/>
-                      <a:latin typeface="Times New Roman" panose="02020603050405020304" pitchFamily="18" charset="0"/>
+                      <a:latin typeface="Calibri"/>
                       <a:ea typeface="Times New Roman" panose="02020603050405020304" pitchFamily="18" charset="0"/>
-                      <a:cs typeface="Times New Roman" panose="02020603050405020304" pitchFamily="18" charset="0"/>
+                      <a:cs typeface="Calibri"/>
                     </a:rPr>
                     <a:t>OK</a:t>
                   </a:r>
                   <a:endParaRPr lang="en-US" sz="1200" dirty="0">
                     <a:effectLst/>
-                    <a:latin typeface="Times New Roman" panose="02020603050405020304" pitchFamily="18" charset="0"/>
+                    <a:latin typeface="Calibri"/>
                     <a:ea typeface="Times New Roman" panose="02020603050405020304" pitchFamily="18" charset="0"/>
-                    <a:cs typeface="Times New Roman" panose="02020603050405020304" pitchFamily="18" charset="0"/>
+                    <a:cs typeface="Calibri"/>
                   </a:endParaRPr>
                 </a:p>
               </p:txBody>
@@ -14447,22 +15749,22 @@
                     </a:spcAft>
                   </a:pPr>
                   <a:r>
-                    <a:rPr lang="en-GB" sz="1200" b="1" kern="1200" dirty="0">
+                    <a:rPr lang="en-GB" sz="1200" kern="1200" dirty="0">
                       <a:solidFill>
                         <a:srgbClr val="5B9BD5"/>
                       </a:solidFill>
                       <a:effectLst/>
-                      <a:latin typeface="Times New Roman" panose="02020603050405020304" pitchFamily="18" charset="0"/>
+                      <a:latin typeface="Calibri"/>
                       <a:ea typeface="Times New Roman" panose="02020603050405020304" pitchFamily="18" charset="0"/>
-                      <a:cs typeface="Times New Roman" panose="02020603050405020304" pitchFamily="18" charset="0"/>
+                      <a:cs typeface="Calibri"/>
                     </a:rPr>
                     <a:t>CANCEL</a:t>
                   </a:r>
                   <a:endParaRPr lang="en-US" sz="1200" dirty="0">
                     <a:effectLst/>
-                    <a:latin typeface="Times New Roman" panose="02020603050405020304" pitchFamily="18" charset="0"/>
+                    <a:latin typeface="Calibri"/>
                     <a:ea typeface="Times New Roman" panose="02020603050405020304" pitchFamily="18" charset="0"/>
-                    <a:cs typeface="Times New Roman" panose="02020603050405020304" pitchFamily="18" charset="0"/>
+                    <a:cs typeface="Calibri"/>
                   </a:endParaRPr>
                 </a:p>
               </p:txBody>
@@ -14478,7 +15780,7 @@
           <p:spPr>
             <a:xfrm>
               <a:off x="4339090" y="1483261"/>
-              <a:ext cx="492862" cy="369332"/>
+              <a:ext cx="492862" cy="389826"/>
             </a:xfrm>
             <a:prstGeom prst="rect">
               <a:avLst/>
@@ -14497,6 +15799,8 @@
                   <a:solidFill>
                     <a:srgbClr val="FF0000"/>
                   </a:solidFill>
+                  <a:latin typeface="Calibri"/>
+                  <a:cs typeface="Calibri"/>
                 </a:rPr>
                 <a:t>(1)</a:t>
               </a:r>
@@ -14504,6 +15808,8 @@
                 <a:solidFill>
                   <a:srgbClr val="FF0000"/>
                 </a:solidFill>
+                <a:latin typeface="Calibri"/>
+                <a:cs typeface="Calibri"/>
               </a:endParaRPr>
             </a:p>
           </p:txBody>
@@ -14517,7 +15823,7 @@
           <p:spPr>
             <a:xfrm>
               <a:off x="4336942" y="1841725"/>
-              <a:ext cx="492862" cy="369332"/>
+              <a:ext cx="492862" cy="389826"/>
             </a:xfrm>
             <a:prstGeom prst="rect">
               <a:avLst/>
@@ -14536,6 +15842,8 @@
                   <a:solidFill>
                     <a:srgbClr val="FF0000"/>
                   </a:solidFill>
+                  <a:latin typeface="Calibri"/>
+                  <a:cs typeface="Calibri"/>
                 </a:rPr>
                 <a:t>(2)</a:t>
               </a:r>
@@ -14543,6 +15851,8 @@
                 <a:solidFill>
                   <a:srgbClr val="FF0000"/>
                 </a:solidFill>
+                <a:latin typeface="Calibri"/>
+                <a:cs typeface="Calibri"/>
               </a:endParaRPr>
             </a:p>
           </p:txBody>
@@ -14556,7 +15866,7 @@
           <p:spPr>
             <a:xfrm>
               <a:off x="2355740" y="2174811"/>
-              <a:ext cx="492862" cy="369332"/>
+              <a:ext cx="492862" cy="389826"/>
             </a:xfrm>
             <a:prstGeom prst="rect">
               <a:avLst/>
@@ -14575,6 +15885,8 @@
                   <a:solidFill>
                     <a:srgbClr val="FF0000"/>
                   </a:solidFill>
+                  <a:latin typeface="Calibri"/>
+                  <a:cs typeface="Calibri"/>
                 </a:rPr>
                 <a:t>(3)</a:t>
               </a:r>
@@ -14582,6 +15894,8 @@
                 <a:solidFill>
                   <a:srgbClr val="FF0000"/>
                 </a:solidFill>
+                <a:latin typeface="Calibri"/>
+                <a:cs typeface="Calibri"/>
               </a:endParaRPr>
             </a:p>
           </p:txBody>
@@ -14595,7 +15909,7 @@
           <p:spPr>
             <a:xfrm>
               <a:off x="3643673" y="2430816"/>
-              <a:ext cx="492862" cy="369332"/>
+              <a:ext cx="492862" cy="389826"/>
             </a:xfrm>
             <a:prstGeom prst="rect">
               <a:avLst/>
@@ -14614,6 +15928,8 @@
                   <a:solidFill>
                     <a:srgbClr val="FF0000"/>
                   </a:solidFill>
+                  <a:latin typeface="Calibri"/>
+                  <a:cs typeface="Calibri"/>
                 </a:rPr>
                 <a:t>(4)</a:t>
               </a:r>
@@ -14621,6 +15937,8 @@
                 <a:solidFill>
                   <a:srgbClr val="FF0000"/>
                 </a:solidFill>
+                <a:latin typeface="Calibri"/>
+                <a:cs typeface="Calibri"/>
               </a:endParaRPr>
             </a:p>
           </p:txBody>
@@ -14634,7 +15952,7 @@
           <p:spPr>
             <a:xfrm>
               <a:off x="5761886" y="1527365"/>
-              <a:ext cx="492862" cy="369332"/>
+              <a:ext cx="492862" cy="389826"/>
             </a:xfrm>
             <a:prstGeom prst="rect">
               <a:avLst/>
@@ -14653,6 +15971,8 @@
                   <a:solidFill>
                     <a:srgbClr val="FF0000"/>
                   </a:solidFill>
+                  <a:latin typeface="Calibri"/>
+                  <a:cs typeface="Calibri"/>
                 </a:rPr>
                 <a:t>(5)</a:t>
               </a:r>
@@ -14660,6 +15980,8 @@
                 <a:solidFill>
                   <a:srgbClr val="FF0000"/>
                 </a:solidFill>
+                <a:latin typeface="Calibri"/>
+                <a:cs typeface="Calibri"/>
               </a:endParaRPr>
             </a:p>
           </p:txBody>
@@ -14673,7 +15995,7 @@
           <p:spPr>
             <a:xfrm>
               <a:off x="4336942" y="3860622"/>
-              <a:ext cx="492862" cy="369332"/>
+              <a:ext cx="492862" cy="389826"/>
             </a:xfrm>
             <a:prstGeom prst="rect">
               <a:avLst/>
@@ -14692,6 +16014,8 @@
                   <a:solidFill>
                     <a:srgbClr val="FF0000"/>
                   </a:solidFill>
+                  <a:latin typeface="Calibri"/>
+                  <a:cs typeface="Calibri"/>
                 </a:rPr>
                 <a:t>(7)</a:t>
               </a:r>
@@ -14699,6 +16023,8 @@
                 <a:solidFill>
                   <a:srgbClr val="FF0000"/>
                 </a:solidFill>
+                <a:latin typeface="Calibri"/>
+                <a:cs typeface="Calibri"/>
               </a:endParaRPr>
             </a:p>
           </p:txBody>
@@ -14712,7 +16038,7 @@
           <p:spPr>
             <a:xfrm>
               <a:off x="2367113" y="4158053"/>
-              <a:ext cx="492862" cy="369332"/>
+              <a:ext cx="492862" cy="389826"/>
             </a:xfrm>
             <a:prstGeom prst="rect">
               <a:avLst/>
@@ -14731,6 +16057,8 @@
                   <a:solidFill>
                     <a:srgbClr val="FF0000"/>
                   </a:solidFill>
+                  <a:latin typeface="Calibri"/>
+                  <a:cs typeface="Calibri"/>
                 </a:rPr>
                 <a:t>(8)</a:t>
               </a:r>
@@ -14738,6 +16066,8 @@
                 <a:solidFill>
                   <a:srgbClr val="FF0000"/>
                 </a:solidFill>
+                <a:latin typeface="Calibri"/>
+                <a:cs typeface="Calibri"/>
               </a:endParaRPr>
             </a:p>
           </p:txBody>
@@ -14751,7 +16081,7 @@
           <p:spPr>
             <a:xfrm>
               <a:off x="4422556" y="4456525"/>
-              <a:ext cx="492862" cy="369332"/>
+              <a:ext cx="492862" cy="389826"/>
             </a:xfrm>
             <a:prstGeom prst="rect">
               <a:avLst/>
@@ -14770,6 +16100,8 @@
                   <a:solidFill>
                     <a:srgbClr val="FF0000"/>
                   </a:solidFill>
+                  <a:latin typeface="Calibri"/>
+                  <a:cs typeface="Calibri"/>
                 </a:rPr>
                 <a:t>(9)</a:t>
               </a:r>
@@ -14777,6 +16109,8 @@
                 <a:solidFill>
                   <a:srgbClr val="FF0000"/>
                 </a:solidFill>
+                <a:latin typeface="Calibri"/>
+                <a:cs typeface="Calibri"/>
               </a:endParaRPr>
             </a:p>
           </p:txBody>
@@ -14790,7 +16124,7 @@
           <p:spPr>
             <a:xfrm>
               <a:off x="2144279" y="6080859"/>
-              <a:ext cx="593454" cy="369332"/>
+              <a:ext cx="593454" cy="389826"/>
             </a:xfrm>
             <a:prstGeom prst="rect">
               <a:avLst/>
@@ -14809,6 +16143,8 @@
                   <a:solidFill>
                     <a:srgbClr val="FF0000"/>
                   </a:solidFill>
+                  <a:latin typeface="Calibri"/>
+                  <a:cs typeface="Calibri"/>
                 </a:rPr>
                 <a:t>(11)</a:t>
               </a:r>
@@ -14816,6 +16152,8 @@
                 <a:solidFill>
                   <a:srgbClr val="FF0000"/>
                 </a:solidFill>
+                <a:latin typeface="Calibri"/>
+                <a:cs typeface="Calibri"/>
               </a:endParaRPr>
             </a:p>
           </p:txBody>
@@ -14829,7 +16167,7 @@
           <p:spPr>
             <a:xfrm>
               <a:off x="3959070" y="6091904"/>
-              <a:ext cx="593454" cy="369332"/>
+              <a:ext cx="593454" cy="389826"/>
             </a:xfrm>
             <a:prstGeom prst="rect">
               <a:avLst/>
@@ -14848,6 +16186,8 @@
                   <a:solidFill>
                     <a:srgbClr val="FF0000"/>
                   </a:solidFill>
+                  <a:latin typeface="Calibri"/>
+                  <a:cs typeface="Calibri"/>
                 </a:rPr>
                 <a:t>(12)</a:t>
               </a:r>
@@ -14855,6 +16195,8 @@
                 <a:solidFill>
                   <a:srgbClr val="FF0000"/>
                 </a:solidFill>
+                <a:latin typeface="Calibri"/>
+                <a:cs typeface="Calibri"/>
               </a:endParaRPr>
             </a:p>
           </p:txBody>
@@ -14868,7 +16210,7 @@
           <p:spPr>
             <a:xfrm>
               <a:off x="5751550" y="2427984"/>
-              <a:ext cx="492862" cy="369332"/>
+              <a:ext cx="492862" cy="389826"/>
             </a:xfrm>
             <a:prstGeom prst="rect">
               <a:avLst/>
@@ -14887,6 +16229,8 @@
                   <a:solidFill>
                     <a:srgbClr val="FF0000"/>
                   </a:solidFill>
+                  <a:latin typeface="Calibri"/>
+                  <a:cs typeface="Calibri"/>
                 </a:rPr>
                 <a:t>(6)</a:t>
               </a:r>
@@ -14894,6 +16238,8 @@
                 <a:solidFill>
                   <a:srgbClr val="FF0000"/>
                 </a:solidFill>
+                <a:latin typeface="Calibri"/>
+                <a:cs typeface="Calibri"/>
               </a:endParaRPr>
             </a:p>
           </p:txBody>
@@ -14907,7 +16253,7 @@
           <p:spPr>
             <a:xfrm>
               <a:off x="4236350" y="4829209"/>
-              <a:ext cx="593454" cy="369332"/>
+              <a:ext cx="593454" cy="389826"/>
             </a:xfrm>
             <a:prstGeom prst="rect">
               <a:avLst/>
@@ -14926,6 +16272,8 @@
                   <a:solidFill>
                     <a:srgbClr val="FF0000"/>
                   </a:solidFill>
+                  <a:latin typeface="Calibri"/>
+                  <a:cs typeface="Calibri"/>
                 </a:rPr>
                 <a:t>(10)</a:t>
               </a:r>
@@ -14933,6 +16281,8 @@
                 <a:solidFill>
                   <a:srgbClr val="FF0000"/>
                 </a:solidFill>
+                <a:latin typeface="Calibri"/>
+                <a:cs typeface="Calibri"/>
               </a:endParaRPr>
             </a:p>
           </p:txBody>
@@ -14946,7 +16296,7 @@
           <p:spPr>
             <a:xfrm>
               <a:off x="4040340" y="785606"/>
-              <a:ext cx="2391324" cy="369332"/>
+              <a:ext cx="2391324" cy="389826"/>
             </a:xfrm>
             <a:prstGeom prst="rect">
               <a:avLst/>
@@ -14961,17 +16311,21 @@
             <a:p>
               <a:pPr algn="ctr"/>
               <a:r>
-                <a:rPr lang="en-GB" b="1" i="1" u="sng" dirty="0" smtClean="0">
+                <a:rPr lang="en-GB" u="sng" dirty="0" smtClean="0">
                   <a:solidFill>
                     <a:srgbClr val="0070C0"/>
                   </a:solidFill>
+                  <a:latin typeface="Calibri"/>
+                  <a:cs typeface="Calibri"/>
                 </a:rPr>
                 <a:t>Message for updating</a:t>
               </a:r>
-              <a:endParaRPr lang="en-US" b="1" i="1" u="sng" dirty="0">
+              <a:endParaRPr lang="en-US" u="sng" dirty="0">
                 <a:solidFill>
                   <a:srgbClr val="0070C0"/>
                 </a:solidFill>
+                <a:latin typeface="Calibri"/>
+                <a:cs typeface="Calibri"/>
               </a:endParaRPr>
             </a:p>
           </p:txBody>
@@ -14985,7 +16339,7 @@
           <p:spPr>
             <a:xfrm>
               <a:off x="3743613" y="795665"/>
-              <a:ext cx="593454" cy="369332"/>
+              <a:ext cx="593454" cy="389826"/>
             </a:xfrm>
             <a:prstGeom prst="rect">
               <a:avLst/>
@@ -15004,6 +16358,8 @@
                   <a:solidFill>
                     <a:srgbClr val="FF0000"/>
                   </a:solidFill>
+                  <a:latin typeface="Calibri"/>
+                  <a:cs typeface="Calibri"/>
                 </a:rPr>
                 <a:t>(13)</a:t>
               </a:r>
@@ -15011,6 +16367,8 @@
                 <a:solidFill>
                   <a:srgbClr val="FF0000"/>
                 </a:solidFill>
+                <a:latin typeface="Calibri"/>
+                <a:cs typeface="Calibri"/>
               </a:endParaRPr>
             </a:p>
           </p:txBody>
@@ -15029,7 +16387,7 @@
 </p:sld>
 </file>
 
-<file path=ppt/slides/slide6.xml><?xml version="1.0" encoding="utf-8"?>
+<file path=ppt/slides/slide7.xml><?xml version="1.0" encoding="utf-8"?>
 <p:sld xmlns:a="http://schemas.openxmlformats.org/drawingml/2006/main" xmlns:r="http://schemas.openxmlformats.org/officeDocument/2006/relationships" xmlns:p="http://schemas.openxmlformats.org/presentationml/2006/main">
   <p:cSld>
     <p:spTree>
@@ -15084,28 +16442,21 @@
             <a:p>
               <a:r>
                 <a:rPr lang="en-US" b="1" dirty="0">
-                  <a:latin typeface="Times New Roman" panose="02020603050405020304" pitchFamily="18" charset="0"/>
-                  <a:cs typeface="Times New Roman" panose="02020603050405020304" pitchFamily="18" charset="0"/>
+                  <a:latin typeface="Calibri (Body)"/>
+                  <a:cs typeface="Calibri (Body)"/>
                 </a:rPr>
-                <a:t>S-4-2 </a:t>
-              </a:r>
-              <a:r>
-                <a:rPr lang="en-US" b="1" dirty="0">
-                  <a:latin typeface="Times New Roman" panose="02020603050405020304" pitchFamily="18" charset="0"/>
-                  <a:cs typeface="Times New Roman" panose="02020603050405020304" pitchFamily="18" charset="0"/>
-                </a:rPr>
-                <a:t>Update </a:t>
+                <a:t>S-4-2 Update </a:t>
               </a:r>
               <a:r>
                 <a:rPr lang="en-US" b="1" dirty="0" smtClean="0">
-                  <a:latin typeface="Times New Roman" panose="02020603050405020304" pitchFamily="18" charset="0"/>
-                  <a:cs typeface="Times New Roman" panose="02020603050405020304" pitchFamily="18" charset="0"/>
+                  <a:latin typeface="Calibri (Body)"/>
+                  <a:cs typeface="Calibri (Body)"/>
                 </a:rPr>
                 <a:t>user info</a:t>
               </a:r>
               <a:endParaRPr lang="en-US" b="1" dirty="0">
-                <a:latin typeface="Times New Roman" panose="02020603050405020304" pitchFamily="18" charset="0"/>
-                <a:cs typeface="Times New Roman" panose="02020603050405020304" pitchFamily="18" charset="0"/>
+                <a:latin typeface="Calibri (Body)"/>
+                <a:cs typeface="Calibri (Body)"/>
               </a:endParaRPr>
             </a:p>
           </p:txBody>
@@ -15150,7 +16501,7 @@
           <p:nvPr>
             <p:extLst>
               <p:ext uri="{D42A27DB-BD31-4B8C-83A1-F6EECF244321}">
-                <p14:modId xmlns:p14="http://schemas.microsoft.com/office/powerpoint/2010/main" val="1699848867"/>
+                <p14:modId xmlns:p14="http://schemas.microsoft.com/office/powerpoint/2010/main" val="293882282"/>
               </p:ext>
             </p:extLst>
           </p:nvPr>
@@ -15167,8 +16518,8 @@
               </a:tblPr>
               <a:tblGrid>
                 <a:gridCol w="435568"/>
-                <a:gridCol w="778040"/>
-                <a:gridCol w="987527"/>
+                <a:gridCol w="946109"/>
+                <a:gridCol w="819458"/>
                 <a:gridCol w="4222442"/>
                 <a:gridCol w="2184400"/>
               </a:tblGrid>
@@ -15181,14 +16532,14 @@
                       <a:pPr algn="ctr"/>
                       <a:r>
                         <a:rPr lang="en-GB" sz="1100" b="1" dirty="0" smtClean="0">
-                          <a:latin typeface="Times New Roman" panose="02020603050405020304" pitchFamily="18" charset="0"/>
-                          <a:cs typeface="Times New Roman" panose="02020603050405020304" pitchFamily="18" charset="0"/>
+                          <a:latin typeface="Calibri (Body)"/>
+                          <a:cs typeface="Calibri (Body)"/>
                         </a:rPr>
                         <a:t>No</a:t>
                       </a:r>
                       <a:endParaRPr lang="en-US" sz="1100" b="1" dirty="0">
-                        <a:latin typeface="Times New Roman" panose="02020603050405020304" pitchFamily="18" charset="0"/>
-                        <a:cs typeface="Times New Roman" panose="02020603050405020304" pitchFamily="18" charset="0"/>
+                        <a:latin typeface="Calibri (Body)"/>
+                        <a:cs typeface="Calibri (Body)"/>
                       </a:endParaRPr>
                     </a:p>
                   </a:txBody>
@@ -15209,14 +16560,14 @@
                       <a:pPr algn="ctr"/>
                       <a:r>
                         <a:rPr lang="en-GB" sz="1100" b="1" dirty="0" smtClean="0">
-                          <a:latin typeface="Times New Roman" panose="02020603050405020304" pitchFamily="18" charset="0"/>
-                          <a:cs typeface="Times New Roman" panose="02020603050405020304" pitchFamily="18" charset="0"/>
+                          <a:latin typeface="Calibri (Body)"/>
+                          <a:cs typeface="Calibri (Body)"/>
                         </a:rPr>
                         <a:t>Content</a:t>
                       </a:r>
                       <a:endParaRPr lang="en-US" sz="1100" b="1" dirty="0">
-                        <a:latin typeface="Times New Roman" panose="02020603050405020304" pitchFamily="18" charset="0"/>
-                        <a:cs typeface="Times New Roman" panose="02020603050405020304" pitchFamily="18" charset="0"/>
+                        <a:latin typeface="Calibri (Body)"/>
+                        <a:cs typeface="Calibri (Body)"/>
                       </a:endParaRPr>
                     </a:p>
                   </a:txBody>
@@ -15237,14 +16588,14 @@
                       <a:pPr algn="ctr"/>
                       <a:r>
                         <a:rPr lang="en-GB" sz="1100" b="1" dirty="0" smtClean="0">
-                          <a:latin typeface="Times New Roman" panose="02020603050405020304" pitchFamily="18" charset="0"/>
-                          <a:cs typeface="Times New Roman" panose="02020603050405020304" pitchFamily="18" charset="0"/>
+                          <a:latin typeface="Calibri (Body)"/>
+                          <a:cs typeface="Calibri (Body)"/>
                         </a:rPr>
                         <a:t>Function</a:t>
                       </a:r>
                       <a:endParaRPr lang="en-US" sz="1100" b="1" dirty="0">
-                        <a:latin typeface="Times New Roman" panose="02020603050405020304" pitchFamily="18" charset="0"/>
-                        <a:cs typeface="Times New Roman" panose="02020603050405020304" pitchFamily="18" charset="0"/>
+                        <a:latin typeface="Calibri (Body)"/>
+                        <a:cs typeface="Calibri (Body)"/>
                       </a:endParaRPr>
                     </a:p>
                   </a:txBody>
@@ -15265,14 +16616,14 @@
                       <a:pPr algn="ctr"/>
                       <a:r>
                         <a:rPr lang="en-GB" sz="1100" b="1" dirty="0" smtClean="0">
-                          <a:latin typeface="Times New Roman" panose="02020603050405020304" pitchFamily="18" charset="0"/>
-                          <a:cs typeface="Times New Roman" panose="02020603050405020304" pitchFamily="18" charset="0"/>
+                          <a:latin typeface="Calibri (Body)"/>
+                          <a:cs typeface="Calibri (Body)"/>
                         </a:rPr>
                         <a:t>Detail/ Option</a:t>
                       </a:r>
                       <a:endParaRPr lang="en-US" sz="1100" b="1" dirty="0">
-                        <a:latin typeface="Times New Roman" panose="02020603050405020304" pitchFamily="18" charset="0"/>
-                        <a:cs typeface="Times New Roman" panose="02020603050405020304" pitchFamily="18" charset="0"/>
+                        <a:latin typeface="Calibri (Body)"/>
+                        <a:cs typeface="Calibri (Body)"/>
                       </a:endParaRPr>
                     </a:p>
                   </a:txBody>
@@ -15293,14 +16644,14 @@
                       <a:pPr algn="ctr"/>
                       <a:r>
                         <a:rPr lang="en-GB" sz="1100" b="1" dirty="0" smtClean="0">
-                          <a:latin typeface="Times New Roman" panose="02020603050405020304" pitchFamily="18" charset="0"/>
-                          <a:cs typeface="Times New Roman" panose="02020603050405020304" pitchFamily="18" charset="0"/>
+                          <a:latin typeface="Calibri (Body)"/>
+                          <a:cs typeface="Calibri (Body)"/>
                         </a:rPr>
                         <a:t>Go to</a:t>
                       </a:r>
                       <a:endParaRPr lang="en-US" sz="1100" b="1" dirty="0">
-                        <a:latin typeface="Times New Roman" panose="02020603050405020304" pitchFamily="18" charset="0"/>
-                        <a:cs typeface="Times New Roman" panose="02020603050405020304" pitchFamily="18" charset="0"/>
+                        <a:latin typeface="Calibri (Body)"/>
+                        <a:cs typeface="Calibri (Body)"/>
                       </a:endParaRPr>
                     </a:p>
                   </a:txBody>
@@ -15323,14 +16674,14 @@
                       <a:pPr algn="ctr"/>
                       <a:r>
                         <a:rPr lang="en-GB" sz="1100" b="1" dirty="0" smtClean="0">
-                          <a:latin typeface="Times New Roman" panose="02020603050405020304" pitchFamily="18" charset="0"/>
-                          <a:cs typeface="Times New Roman" panose="02020603050405020304" pitchFamily="18" charset="0"/>
+                          <a:latin typeface="Calibri (Body)"/>
+                          <a:cs typeface="Calibri (Body)"/>
                         </a:rPr>
                         <a:t>1</a:t>
                       </a:r>
                       <a:endParaRPr lang="en-US" sz="1100" b="1" dirty="0">
-                        <a:latin typeface="Times New Roman" panose="02020603050405020304" pitchFamily="18" charset="0"/>
-                        <a:cs typeface="Times New Roman" panose="02020603050405020304" pitchFamily="18" charset="0"/>
+                        <a:latin typeface="Calibri (Body)"/>
+                        <a:cs typeface="Calibri (Body)"/>
                       </a:endParaRPr>
                     </a:p>
                   </a:txBody>
@@ -15344,14 +16695,14 @@
                       <a:pPr algn="ctr"/>
                       <a:r>
                         <a:rPr lang="en-GB" sz="1100" dirty="0" smtClean="0">
-                          <a:latin typeface="Times New Roman" panose="02020603050405020304" pitchFamily="18" charset="0"/>
-                          <a:cs typeface="Times New Roman" panose="02020603050405020304" pitchFamily="18" charset="0"/>
+                          <a:latin typeface="Calibri (Body)"/>
+                          <a:cs typeface="Calibri (Body)"/>
                         </a:rPr>
                         <a:t>First name</a:t>
                       </a:r>
                       <a:endParaRPr lang="en-US" sz="1100" dirty="0">
-                        <a:latin typeface="Times New Roman" panose="02020603050405020304" pitchFamily="18" charset="0"/>
-                        <a:cs typeface="Times New Roman" panose="02020603050405020304" pitchFamily="18" charset="0"/>
+                        <a:latin typeface="Calibri (Body)"/>
+                        <a:cs typeface="Calibri (Body)"/>
                       </a:endParaRPr>
                     </a:p>
                   </a:txBody>
@@ -15363,8 +16714,8 @@
                     <a:lstStyle/>
                     <a:p>
                       <a:endParaRPr lang="en-US" sz="1100">
-                        <a:latin typeface="Times New Roman" panose="02020603050405020304" pitchFamily="18" charset="0"/>
-                        <a:cs typeface="Times New Roman" panose="02020603050405020304" pitchFamily="18" charset="0"/>
+                        <a:latin typeface="Calibri (Body)"/>
+                        <a:cs typeface="Calibri (Body)"/>
                       </a:endParaRPr>
                     </a:p>
                   </a:txBody>
@@ -15377,21 +16728,21 @@
                     <a:p>
                       <a:r>
                         <a:rPr lang="en-GB" sz="1100" dirty="0" smtClean="0">
-                          <a:latin typeface="Times New Roman" panose="02020603050405020304" pitchFamily="18" charset="0"/>
-                          <a:cs typeface="Times New Roman" panose="02020603050405020304" pitchFamily="18" charset="0"/>
+                          <a:latin typeface="Calibri (Body)"/>
+                          <a:cs typeface="Calibri (Body)"/>
                         </a:rPr>
                         <a:t>Display user’</a:t>
                       </a:r>
                       <a:r>
                         <a:rPr lang="en-GB" sz="1100" baseline="0" dirty="0" smtClean="0">
-                          <a:latin typeface="Times New Roman" panose="02020603050405020304" pitchFamily="18" charset="0"/>
-                          <a:cs typeface="Times New Roman" panose="02020603050405020304" pitchFamily="18" charset="0"/>
+                          <a:latin typeface="Calibri (Body)"/>
+                          <a:cs typeface="Calibri (Body)"/>
                         </a:rPr>
                         <a:t> s  current first name.</a:t>
                       </a:r>
                       <a:endParaRPr lang="en-US" sz="1100" dirty="0">
-                        <a:latin typeface="Times New Roman" panose="02020603050405020304" pitchFamily="18" charset="0"/>
-                        <a:cs typeface="Times New Roman" panose="02020603050405020304" pitchFamily="18" charset="0"/>
+                        <a:latin typeface="Calibri (Body)"/>
+                        <a:cs typeface="Calibri (Body)"/>
                       </a:endParaRPr>
                     </a:p>
                   </a:txBody>
@@ -15403,8 +16754,8 @@
                     <a:lstStyle/>
                     <a:p>
                       <a:endParaRPr lang="en-US" sz="1100">
-                        <a:latin typeface="Times New Roman" panose="02020603050405020304" pitchFamily="18" charset="0"/>
-                        <a:cs typeface="Times New Roman" panose="02020603050405020304" pitchFamily="18" charset="0"/>
+                        <a:latin typeface="Calibri (Body)"/>
+                        <a:cs typeface="Calibri (Body)"/>
                       </a:endParaRPr>
                     </a:p>
                   </a:txBody>
@@ -15423,9 +16774,9 @@
                           <a:solidFill>
                             <a:schemeClr val="tx1"/>
                           </a:solidFill>
-                          <a:latin typeface="Times New Roman" panose="02020603050405020304" pitchFamily="18" charset="0"/>
+                          <a:latin typeface="Calibri (Body)"/>
                           <a:ea typeface="+mn-ea"/>
-                          <a:cs typeface="Times New Roman" panose="02020603050405020304" pitchFamily="18" charset="0"/>
+                          <a:cs typeface="Calibri (Body)"/>
                         </a:rPr>
                         <a:t>2</a:t>
                       </a:r>
@@ -15433,9 +16784,9 @@
                         <a:solidFill>
                           <a:schemeClr val="tx1"/>
                         </a:solidFill>
-                        <a:latin typeface="Times New Roman" panose="02020603050405020304" pitchFamily="18" charset="0"/>
+                        <a:latin typeface="Calibri (Body)"/>
                         <a:ea typeface="+mn-ea"/>
-                        <a:cs typeface="Times New Roman" panose="02020603050405020304" pitchFamily="18" charset="0"/>
+                        <a:cs typeface="Calibri (Body)"/>
                       </a:endParaRPr>
                     </a:p>
                   </a:txBody>
@@ -15449,21 +16800,21 @@
                       <a:pPr algn="ctr"/>
                       <a:r>
                         <a:rPr lang="en-GB" sz="1100" dirty="0" smtClean="0">
-                          <a:latin typeface="Times New Roman" panose="02020603050405020304" pitchFamily="18" charset="0"/>
-                          <a:cs typeface="Times New Roman" panose="02020603050405020304" pitchFamily="18" charset="0"/>
+                          <a:latin typeface="Calibri (Body)"/>
+                          <a:cs typeface="Calibri (Body)"/>
                         </a:rPr>
                         <a:t>Last</a:t>
                       </a:r>
                       <a:r>
                         <a:rPr lang="en-GB" sz="1100" baseline="0" dirty="0" smtClean="0">
-                          <a:latin typeface="Times New Roman" panose="02020603050405020304" pitchFamily="18" charset="0"/>
-                          <a:cs typeface="Times New Roman" panose="02020603050405020304" pitchFamily="18" charset="0"/>
+                          <a:latin typeface="Calibri (Body)"/>
+                          <a:cs typeface="Calibri (Body)"/>
                         </a:rPr>
                         <a:t> name</a:t>
                       </a:r>
                       <a:endParaRPr lang="en-US" sz="1100" dirty="0">
-                        <a:latin typeface="Times New Roman" panose="02020603050405020304" pitchFamily="18" charset="0"/>
-                        <a:cs typeface="Times New Roman" panose="02020603050405020304" pitchFamily="18" charset="0"/>
+                        <a:latin typeface="Calibri (Body)"/>
+                        <a:cs typeface="Calibri (Body)"/>
                       </a:endParaRPr>
                     </a:p>
                   </a:txBody>
@@ -15475,8 +16826,8 @@
                     <a:lstStyle/>
                     <a:p>
                       <a:endParaRPr lang="en-US" sz="1100" dirty="0">
-                        <a:latin typeface="Times New Roman" panose="02020603050405020304" pitchFamily="18" charset="0"/>
-                        <a:cs typeface="Times New Roman" panose="02020603050405020304" pitchFamily="18" charset="0"/>
+                        <a:latin typeface="Calibri (Body)"/>
+                        <a:cs typeface="Calibri (Body)"/>
                       </a:endParaRPr>
                     </a:p>
                   </a:txBody>
@@ -15506,27 +16857,27 @@
                       </a:pPr>
                       <a:r>
                         <a:rPr lang="en-GB" sz="1100" dirty="0" smtClean="0">
-                          <a:latin typeface="Times New Roman" panose="02020603050405020304" pitchFamily="18" charset="0"/>
-                          <a:cs typeface="Times New Roman" panose="02020603050405020304" pitchFamily="18" charset="0"/>
+                          <a:latin typeface="Calibri (Body)"/>
+                          <a:cs typeface="Calibri (Body)"/>
                         </a:rPr>
                         <a:t>Display user’</a:t>
                       </a:r>
                       <a:r>
                         <a:rPr lang="en-GB" sz="1100" baseline="0" dirty="0" smtClean="0">
-                          <a:latin typeface="Times New Roman" panose="02020603050405020304" pitchFamily="18" charset="0"/>
-                          <a:cs typeface="Times New Roman" panose="02020603050405020304" pitchFamily="18" charset="0"/>
+                          <a:latin typeface="Calibri (Body)"/>
+                          <a:cs typeface="Calibri (Body)"/>
                         </a:rPr>
                         <a:t> s  current last name.</a:t>
                       </a:r>
                       <a:endParaRPr lang="en-US" sz="1100" dirty="0" smtClean="0">
-                        <a:latin typeface="Times New Roman" panose="02020603050405020304" pitchFamily="18" charset="0"/>
-                        <a:cs typeface="Times New Roman" panose="02020603050405020304" pitchFamily="18" charset="0"/>
+                        <a:latin typeface="Calibri (Body)"/>
+                        <a:cs typeface="Calibri (Body)"/>
                       </a:endParaRPr>
                     </a:p>
                     <a:p>
                       <a:endParaRPr lang="en-US" sz="1100" dirty="0">
-                        <a:latin typeface="Times New Roman" panose="02020603050405020304" pitchFamily="18" charset="0"/>
-                        <a:cs typeface="Times New Roman" panose="02020603050405020304" pitchFamily="18" charset="0"/>
+                        <a:latin typeface="Calibri (Body)"/>
+                        <a:cs typeface="Calibri (Body)"/>
                       </a:endParaRPr>
                     </a:p>
                   </a:txBody>
@@ -15538,8 +16889,8 @@
                     <a:lstStyle/>
                     <a:p>
                       <a:endParaRPr lang="en-US" sz="1100">
-                        <a:latin typeface="Times New Roman" panose="02020603050405020304" pitchFamily="18" charset="0"/>
-                        <a:cs typeface="Times New Roman" panose="02020603050405020304" pitchFamily="18" charset="0"/>
+                        <a:latin typeface="Calibri (Body)"/>
+                        <a:cs typeface="Calibri (Body)"/>
                       </a:endParaRPr>
                     </a:p>
                   </a:txBody>
@@ -15558,9 +16909,9 @@
                           <a:solidFill>
                             <a:schemeClr val="tx1"/>
                           </a:solidFill>
-                          <a:latin typeface="Times New Roman" panose="02020603050405020304" pitchFamily="18" charset="0"/>
+                          <a:latin typeface="Calibri (Body)"/>
                           <a:ea typeface="+mn-ea"/>
-                          <a:cs typeface="Times New Roman" panose="02020603050405020304" pitchFamily="18" charset="0"/>
+                          <a:cs typeface="Calibri (Body)"/>
                         </a:rPr>
                         <a:t>3</a:t>
                       </a:r>
@@ -15568,9 +16919,9 @@
                         <a:solidFill>
                           <a:schemeClr val="tx1"/>
                         </a:solidFill>
-                        <a:latin typeface="Times New Roman" panose="02020603050405020304" pitchFamily="18" charset="0"/>
+                        <a:latin typeface="Calibri (Body)"/>
                         <a:ea typeface="+mn-ea"/>
-                        <a:cs typeface="Times New Roman" panose="02020603050405020304" pitchFamily="18" charset="0"/>
+                        <a:cs typeface="Calibri (Body)"/>
                       </a:endParaRPr>
                     </a:p>
                   </a:txBody>
@@ -15584,14 +16935,14 @@
                       <a:pPr algn="ctr"/>
                       <a:r>
                         <a:rPr lang="en-GB" sz="1100" dirty="0" smtClean="0">
-                          <a:latin typeface="Times New Roman" panose="02020603050405020304" pitchFamily="18" charset="0"/>
-                          <a:cs typeface="Times New Roman" panose="02020603050405020304" pitchFamily="18" charset="0"/>
+                          <a:latin typeface="Calibri (Body)"/>
+                          <a:cs typeface="Calibri (Body)"/>
                         </a:rPr>
                         <a:t>Gender</a:t>
                       </a:r>
                       <a:endParaRPr lang="en-US" sz="1100" dirty="0">
-                        <a:latin typeface="Times New Roman" panose="02020603050405020304" pitchFamily="18" charset="0"/>
-                        <a:cs typeface="Times New Roman" panose="02020603050405020304" pitchFamily="18" charset="0"/>
+                        <a:latin typeface="Calibri (Body)"/>
+                        <a:cs typeface="Calibri (Body)"/>
                       </a:endParaRPr>
                     </a:p>
                   </a:txBody>
@@ -15603,8 +16954,8 @@
                     <a:lstStyle/>
                     <a:p>
                       <a:endParaRPr lang="en-US" sz="1100" dirty="0">
-                        <a:latin typeface="Times New Roman" panose="02020603050405020304" pitchFamily="18" charset="0"/>
-                        <a:cs typeface="Times New Roman" panose="02020603050405020304" pitchFamily="18" charset="0"/>
+                        <a:latin typeface="Calibri (Body)"/>
+                        <a:cs typeface="Calibri (Body)"/>
                       </a:endParaRPr>
                     </a:p>
                   </a:txBody>
@@ -15617,15 +16968,15 @@
                     <a:p>
                       <a:r>
                         <a:rPr lang="en-GB" sz="1100" dirty="0" smtClean="0">
-                          <a:latin typeface="Times New Roman" panose="02020603050405020304" pitchFamily="18" charset="0"/>
-                          <a:cs typeface="Times New Roman" panose="02020603050405020304" pitchFamily="18" charset="0"/>
+                          <a:latin typeface="Calibri (Body)"/>
+                          <a:cs typeface="Calibri (Body)"/>
                         </a:rPr>
                         <a:t>- There</a:t>
                       </a:r>
                       <a:r>
                         <a:rPr lang="en-GB" sz="1100" baseline="0" dirty="0" smtClean="0">
-                          <a:latin typeface="Times New Roman" panose="02020603050405020304" pitchFamily="18" charset="0"/>
-                          <a:cs typeface="Times New Roman" panose="02020603050405020304" pitchFamily="18" charset="0"/>
+                          <a:latin typeface="Calibri (Body)"/>
+                          <a:cs typeface="Calibri (Body)"/>
                         </a:rPr>
                         <a:t> are 2 value: Male and Female.</a:t>
                       </a:r>
@@ -15633,14 +16984,14 @@
                     <a:p>
                       <a:r>
                         <a:rPr lang="en-GB" sz="1100" baseline="0" dirty="0" smtClean="0">
-                          <a:latin typeface="Times New Roman" panose="02020603050405020304" pitchFamily="18" charset="0"/>
-                          <a:cs typeface="Times New Roman" panose="02020603050405020304" pitchFamily="18" charset="0"/>
+                          <a:latin typeface="Calibri (Body)"/>
+                          <a:cs typeface="Calibri (Body)"/>
                         </a:rPr>
                         <a:t>- Display user’ s current gender</a:t>
                       </a:r>
                       <a:endParaRPr lang="en-US" sz="1100" dirty="0">
-                        <a:latin typeface="Times New Roman" panose="02020603050405020304" pitchFamily="18" charset="0"/>
-                        <a:cs typeface="Times New Roman" panose="02020603050405020304" pitchFamily="18" charset="0"/>
+                        <a:latin typeface="Calibri (Body)"/>
+                        <a:cs typeface="Calibri (Body)"/>
                       </a:endParaRPr>
                     </a:p>
                   </a:txBody>
@@ -15652,8 +17003,8 @@
                     <a:lstStyle/>
                     <a:p>
                       <a:endParaRPr lang="en-US" sz="1100" dirty="0">
-                        <a:latin typeface="Times New Roman" panose="02020603050405020304" pitchFamily="18" charset="0"/>
-                        <a:cs typeface="Times New Roman" panose="02020603050405020304" pitchFamily="18" charset="0"/>
+                        <a:latin typeface="Calibri (Body)"/>
+                        <a:cs typeface="Calibri (Body)"/>
                       </a:endParaRPr>
                     </a:p>
                   </a:txBody>
@@ -15672,9 +17023,9 @@
                           <a:solidFill>
                             <a:schemeClr val="tx1"/>
                           </a:solidFill>
-                          <a:latin typeface="Times New Roman" panose="02020603050405020304" pitchFamily="18" charset="0"/>
+                          <a:latin typeface="Calibri (Body)"/>
                           <a:ea typeface="+mn-ea"/>
-                          <a:cs typeface="Times New Roman" panose="02020603050405020304" pitchFamily="18" charset="0"/>
+                          <a:cs typeface="Calibri (Body)"/>
                         </a:rPr>
                         <a:t>4</a:t>
                       </a:r>
@@ -15682,9 +17033,9 @@
                         <a:solidFill>
                           <a:schemeClr val="tx1"/>
                         </a:solidFill>
-                        <a:latin typeface="Times New Roman" panose="02020603050405020304" pitchFamily="18" charset="0"/>
+                        <a:latin typeface="Calibri (Body)"/>
                         <a:ea typeface="+mn-ea"/>
-                        <a:cs typeface="Times New Roman" panose="02020603050405020304" pitchFamily="18" charset="0"/>
+                        <a:cs typeface="Calibri (Body)"/>
                       </a:endParaRPr>
                     </a:p>
                   </a:txBody>
@@ -15698,14 +17049,14 @@
                       <a:pPr algn="ctr"/>
                       <a:r>
                         <a:rPr lang="en-GB" sz="1100" dirty="0" smtClean="0">
-                          <a:latin typeface="Times New Roman" panose="02020603050405020304" pitchFamily="18" charset="0"/>
-                          <a:cs typeface="Times New Roman" panose="02020603050405020304" pitchFamily="18" charset="0"/>
+                          <a:latin typeface="Calibri (Body)"/>
+                          <a:cs typeface="Calibri (Body)"/>
                         </a:rPr>
                         <a:t>Birthday</a:t>
                       </a:r>
                       <a:endParaRPr lang="en-US" sz="1100" dirty="0">
-                        <a:latin typeface="Times New Roman" panose="02020603050405020304" pitchFamily="18" charset="0"/>
-                        <a:cs typeface="Times New Roman" panose="02020603050405020304" pitchFamily="18" charset="0"/>
+                        <a:latin typeface="Calibri (Body)"/>
+                        <a:cs typeface="Calibri (Body)"/>
                       </a:endParaRPr>
                     </a:p>
                   </a:txBody>
@@ -15717,8 +17068,8 @@
                     <a:lstStyle/>
                     <a:p>
                       <a:endParaRPr lang="en-US" sz="1100" dirty="0">
-                        <a:latin typeface="Times New Roman" panose="02020603050405020304" pitchFamily="18" charset="0"/>
-                        <a:cs typeface="Times New Roman" panose="02020603050405020304" pitchFamily="18" charset="0"/>
+                        <a:latin typeface="Calibri (Body)"/>
+                        <a:cs typeface="Calibri (Body)"/>
                       </a:endParaRPr>
                     </a:p>
                   </a:txBody>
@@ -15731,28 +17082,28 @@
                     <a:p>
                       <a:r>
                         <a:rPr lang="en-GB" sz="1100" dirty="0" smtClean="0">
-                          <a:latin typeface="Times New Roman" panose="02020603050405020304" pitchFamily="18" charset="0"/>
-                          <a:cs typeface="Times New Roman" panose="02020603050405020304" pitchFamily="18" charset="0"/>
+                          <a:latin typeface="Calibri (Body)"/>
+                          <a:cs typeface="Calibri (Body)"/>
                         </a:rPr>
                         <a:t>Display</a:t>
                       </a:r>
                       <a:r>
                         <a:rPr lang="en-GB" sz="1100" baseline="0" dirty="0" smtClean="0">
-                          <a:latin typeface="Times New Roman" panose="02020603050405020304" pitchFamily="18" charset="0"/>
-                          <a:cs typeface="Times New Roman" panose="02020603050405020304" pitchFamily="18" charset="0"/>
+                          <a:latin typeface="Calibri (Body)"/>
+                          <a:cs typeface="Calibri (Body)"/>
                         </a:rPr>
                         <a:t> user’ s current </a:t>
                       </a:r>
                       <a:r>
                         <a:rPr lang="en-GB" sz="1100" baseline="0" dirty="0" err="1" smtClean="0">
-                          <a:latin typeface="Times New Roman" panose="02020603050405020304" pitchFamily="18" charset="0"/>
-                          <a:cs typeface="Times New Roman" panose="02020603050405020304" pitchFamily="18" charset="0"/>
+                          <a:latin typeface="Calibri (Body)"/>
+                          <a:cs typeface="Calibri (Body)"/>
                         </a:rPr>
                         <a:t>birthay</a:t>
                       </a:r>
                       <a:endParaRPr lang="en-US" sz="1100" dirty="0">
-                        <a:latin typeface="Times New Roman" panose="02020603050405020304" pitchFamily="18" charset="0"/>
-                        <a:cs typeface="Times New Roman" panose="02020603050405020304" pitchFamily="18" charset="0"/>
+                        <a:latin typeface="Calibri (Body)"/>
+                        <a:cs typeface="Calibri (Body)"/>
                       </a:endParaRPr>
                     </a:p>
                   </a:txBody>
@@ -15764,8 +17115,8 @@
                     <a:lstStyle/>
                     <a:p>
                       <a:endParaRPr lang="en-US" sz="1100" dirty="0">
-                        <a:latin typeface="Times New Roman" panose="02020603050405020304" pitchFamily="18" charset="0"/>
-                        <a:cs typeface="Times New Roman" panose="02020603050405020304" pitchFamily="18" charset="0"/>
+                        <a:latin typeface="Calibri (Body)"/>
+                        <a:cs typeface="Calibri (Body)"/>
                       </a:endParaRPr>
                     </a:p>
                   </a:txBody>
@@ -15784,9 +17135,9 @@
                           <a:solidFill>
                             <a:schemeClr val="tx1"/>
                           </a:solidFill>
-                          <a:latin typeface="Times New Roman" panose="02020603050405020304" pitchFamily="18" charset="0"/>
+                          <a:latin typeface="Calibri (Body)"/>
                           <a:ea typeface="+mn-ea"/>
-                          <a:cs typeface="Times New Roman" panose="02020603050405020304" pitchFamily="18" charset="0"/>
+                          <a:cs typeface="Calibri (Body)"/>
                         </a:rPr>
                         <a:t>5</a:t>
                       </a:r>
@@ -15794,9 +17145,9 @@
                         <a:solidFill>
                           <a:schemeClr val="tx1"/>
                         </a:solidFill>
-                        <a:latin typeface="Times New Roman" panose="02020603050405020304" pitchFamily="18" charset="0"/>
+                        <a:latin typeface="Calibri (Body)"/>
                         <a:ea typeface="+mn-ea"/>
-                        <a:cs typeface="Times New Roman" panose="02020603050405020304" pitchFamily="18" charset="0"/>
+                        <a:cs typeface="Calibri (Body)"/>
                       </a:endParaRPr>
                     </a:p>
                   </a:txBody>
@@ -15810,14 +17161,14 @@
                       <a:pPr algn="ctr"/>
                       <a:r>
                         <a:rPr lang="en-GB" sz="1100" dirty="0" smtClean="0">
-                          <a:latin typeface="Times New Roman" panose="02020603050405020304" pitchFamily="18" charset="0"/>
-                          <a:cs typeface="Times New Roman" panose="02020603050405020304" pitchFamily="18" charset="0"/>
+                          <a:latin typeface="Calibri (Body)"/>
+                          <a:cs typeface="Calibri (Body)"/>
                         </a:rPr>
                         <a:t>Avatar</a:t>
                       </a:r>
                       <a:endParaRPr lang="en-US" sz="1100" dirty="0">
-                        <a:latin typeface="Times New Roman" panose="02020603050405020304" pitchFamily="18" charset="0"/>
-                        <a:cs typeface="Times New Roman" panose="02020603050405020304" pitchFamily="18" charset="0"/>
+                        <a:latin typeface="Calibri (Body)"/>
+                        <a:cs typeface="Calibri (Body)"/>
                       </a:endParaRPr>
                     </a:p>
                   </a:txBody>
@@ -15829,8 +17180,8 @@
                     <a:lstStyle/>
                     <a:p>
                       <a:endParaRPr lang="en-US" sz="1100" dirty="0">
-                        <a:latin typeface="Times New Roman" panose="02020603050405020304" pitchFamily="18" charset="0"/>
-                        <a:cs typeface="Times New Roman" panose="02020603050405020304" pitchFamily="18" charset="0"/>
+                        <a:latin typeface="Calibri (Body)"/>
+                        <a:cs typeface="Calibri (Body)"/>
                       </a:endParaRPr>
                     </a:p>
                   </a:txBody>
@@ -15843,21 +17194,21 @@
                     <a:p>
                       <a:r>
                         <a:rPr lang="en-GB" sz="1100" dirty="0" smtClean="0">
-                          <a:latin typeface="Times New Roman" panose="02020603050405020304" pitchFamily="18" charset="0"/>
-                          <a:cs typeface="Times New Roman" panose="02020603050405020304" pitchFamily="18" charset="0"/>
+                          <a:latin typeface="Calibri (Body)"/>
+                          <a:cs typeface="Calibri (Body)"/>
                         </a:rPr>
                         <a:t>Display</a:t>
                       </a:r>
                       <a:r>
                         <a:rPr lang="en-GB" sz="1100" baseline="0" dirty="0" smtClean="0">
-                          <a:latin typeface="Times New Roman" panose="02020603050405020304" pitchFamily="18" charset="0"/>
-                          <a:cs typeface="Times New Roman" panose="02020603050405020304" pitchFamily="18" charset="0"/>
+                          <a:latin typeface="Calibri (Body)"/>
+                          <a:cs typeface="Calibri (Body)"/>
                         </a:rPr>
                         <a:t> user’s current avatar</a:t>
                       </a:r>
                       <a:endParaRPr lang="en-US" sz="1100" dirty="0">
-                        <a:latin typeface="Times New Roman" panose="02020603050405020304" pitchFamily="18" charset="0"/>
-                        <a:cs typeface="Times New Roman" panose="02020603050405020304" pitchFamily="18" charset="0"/>
+                        <a:latin typeface="Calibri (Body)"/>
+                        <a:cs typeface="Calibri (Body)"/>
                       </a:endParaRPr>
                     </a:p>
                   </a:txBody>
@@ -15869,8 +17220,8 @@
                     <a:lstStyle/>
                     <a:p>
                       <a:endParaRPr lang="en-US" sz="1100" dirty="0">
-                        <a:latin typeface="Times New Roman" panose="02020603050405020304" pitchFamily="18" charset="0"/>
-                        <a:cs typeface="Times New Roman" panose="02020603050405020304" pitchFamily="18" charset="0"/>
+                        <a:latin typeface="Calibri (Body)"/>
+                        <a:cs typeface="Calibri (Body)"/>
                       </a:endParaRPr>
                     </a:p>
                   </a:txBody>
@@ -15889,9 +17240,9 @@
                           <a:solidFill>
                             <a:schemeClr val="tx1"/>
                           </a:solidFill>
-                          <a:latin typeface="Times New Roman" panose="02020603050405020304" pitchFamily="18" charset="0"/>
+                          <a:latin typeface="Calibri (Body)"/>
                           <a:ea typeface="+mn-ea"/>
-                          <a:cs typeface="Times New Roman" panose="02020603050405020304" pitchFamily="18" charset="0"/>
+                          <a:cs typeface="Calibri (Body)"/>
                         </a:rPr>
                         <a:t>6</a:t>
                       </a:r>
@@ -15899,9 +17250,9 @@
                         <a:solidFill>
                           <a:schemeClr val="tx1"/>
                         </a:solidFill>
-                        <a:latin typeface="Times New Roman" panose="02020603050405020304" pitchFamily="18" charset="0"/>
+                        <a:latin typeface="Calibri (Body)"/>
                         <a:ea typeface="+mn-ea"/>
-                        <a:cs typeface="Times New Roman" panose="02020603050405020304" pitchFamily="18" charset="0"/>
+                        <a:cs typeface="Calibri (Body)"/>
                       </a:endParaRPr>
                     </a:p>
                   </a:txBody>
@@ -15915,14 +17266,14 @@
                       <a:pPr algn="ctr"/>
                       <a:r>
                         <a:rPr lang="en-GB" sz="1100" dirty="0" smtClean="0">
-                          <a:latin typeface="Times New Roman" panose="02020603050405020304" pitchFamily="18" charset="0"/>
-                          <a:cs typeface="Times New Roman" panose="02020603050405020304" pitchFamily="18" charset="0"/>
+                          <a:latin typeface="Calibri (Body)"/>
+                          <a:cs typeface="Calibri (Body)"/>
                         </a:rPr>
                         <a:t>Change avatar</a:t>
                       </a:r>
                       <a:endParaRPr lang="en-US" sz="1100" dirty="0">
-                        <a:latin typeface="Times New Roman" panose="02020603050405020304" pitchFamily="18" charset="0"/>
-                        <a:cs typeface="Times New Roman" panose="02020603050405020304" pitchFamily="18" charset="0"/>
+                        <a:latin typeface="Calibri (Body)"/>
+                        <a:cs typeface="Calibri (Body)"/>
                       </a:endParaRPr>
                     </a:p>
                   </a:txBody>
@@ -15934,8 +17285,8 @@
                     <a:lstStyle/>
                     <a:p>
                       <a:endParaRPr lang="en-US" sz="1100" dirty="0">
-                        <a:latin typeface="Times New Roman" panose="02020603050405020304" pitchFamily="18" charset="0"/>
-                        <a:cs typeface="Times New Roman" panose="02020603050405020304" pitchFamily="18" charset="0"/>
+                        <a:latin typeface="Calibri (Body)"/>
+                        <a:cs typeface="Calibri (Body)"/>
                       </a:endParaRPr>
                     </a:p>
                   </a:txBody>
@@ -15947,8 +17298,8 @@
                     <a:lstStyle/>
                     <a:p>
                       <a:endParaRPr lang="en-US" sz="1100" dirty="0">
-                        <a:latin typeface="Times New Roman" panose="02020603050405020304" pitchFamily="18" charset="0"/>
-                        <a:cs typeface="Times New Roman" panose="02020603050405020304" pitchFamily="18" charset="0"/>
+                        <a:latin typeface="Calibri (Body)"/>
+                        <a:cs typeface="Calibri (Body)"/>
                       </a:endParaRPr>
                     </a:p>
                   </a:txBody>
@@ -15961,21 +17312,21 @@
                     <a:p>
                       <a:r>
                         <a:rPr lang="en-GB" sz="1100" dirty="0" smtClean="0">
-                          <a:latin typeface="Times New Roman" panose="02020603050405020304" pitchFamily="18" charset="0"/>
-                          <a:cs typeface="Times New Roman" panose="02020603050405020304" pitchFamily="18" charset="0"/>
+                          <a:latin typeface="Calibri (Body)"/>
+                          <a:cs typeface="Calibri (Body)"/>
                         </a:rPr>
                         <a:t>Open</a:t>
                       </a:r>
                       <a:r>
                         <a:rPr lang="en-GB" sz="1100" baseline="0" dirty="0" smtClean="0">
-                          <a:latin typeface="Times New Roman" panose="02020603050405020304" pitchFamily="18" charset="0"/>
-                          <a:cs typeface="Times New Roman" panose="02020603050405020304" pitchFamily="18" charset="0"/>
+                          <a:latin typeface="Calibri (Body)"/>
+                          <a:cs typeface="Calibri (Body)"/>
                         </a:rPr>
                         <a:t> dialog to choose &amp; upload a image.</a:t>
                       </a:r>
                       <a:endParaRPr lang="en-US" sz="1100" dirty="0">
-                        <a:latin typeface="Times New Roman" panose="02020603050405020304" pitchFamily="18" charset="0"/>
-                        <a:cs typeface="Times New Roman" panose="02020603050405020304" pitchFamily="18" charset="0"/>
+                        <a:latin typeface="Calibri (Body)"/>
+                        <a:cs typeface="Calibri (Body)"/>
                       </a:endParaRPr>
                     </a:p>
                   </a:txBody>
@@ -15994,9 +17345,9 @@
                           <a:solidFill>
                             <a:schemeClr val="tx1"/>
                           </a:solidFill>
-                          <a:latin typeface="Times New Roman" panose="02020603050405020304" pitchFamily="18" charset="0"/>
+                          <a:latin typeface="Calibri (Body)"/>
                           <a:ea typeface="+mn-ea"/>
-                          <a:cs typeface="Times New Roman" panose="02020603050405020304" pitchFamily="18" charset="0"/>
+                          <a:cs typeface="Calibri (Body)"/>
                         </a:rPr>
                         <a:t>7</a:t>
                       </a:r>
@@ -16004,9 +17355,9 @@
                         <a:solidFill>
                           <a:schemeClr val="tx1"/>
                         </a:solidFill>
-                        <a:latin typeface="Times New Roman" panose="02020603050405020304" pitchFamily="18" charset="0"/>
+                        <a:latin typeface="Calibri (Body)"/>
                         <a:ea typeface="+mn-ea"/>
-                        <a:cs typeface="Times New Roman" panose="02020603050405020304" pitchFamily="18" charset="0"/>
+                        <a:cs typeface="Calibri (Body)"/>
                       </a:endParaRPr>
                     </a:p>
                   </a:txBody>
@@ -16020,14 +17371,14 @@
                       <a:pPr algn="ctr"/>
                       <a:r>
                         <a:rPr lang="en-GB" sz="1100" dirty="0" smtClean="0">
-                          <a:latin typeface="Times New Roman" panose="02020603050405020304" pitchFamily="18" charset="0"/>
-                          <a:cs typeface="Times New Roman" panose="02020603050405020304" pitchFamily="18" charset="0"/>
+                          <a:latin typeface="Calibri (Body)"/>
+                          <a:cs typeface="Calibri (Body)"/>
                         </a:rPr>
                         <a:t>Address</a:t>
                       </a:r>
                       <a:endParaRPr lang="en-US" sz="1100" dirty="0">
-                        <a:latin typeface="Times New Roman" panose="02020603050405020304" pitchFamily="18" charset="0"/>
-                        <a:cs typeface="Times New Roman" panose="02020603050405020304" pitchFamily="18" charset="0"/>
+                        <a:latin typeface="Calibri (Body)"/>
+                        <a:cs typeface="Calibri (Body)"/>
                       </a:endParaRPr>
                     </a:p>
                   </a:txBody>
@@ -16039,8 +17390,8 @@
                     <a:lstStyle/>
                     <a:p>
                       <a:endParaRPr lang="en-US" sz="1100" dirty="0">
-                        <a:latin typeface="Times New Roman" panose="02020603050405020304" pitchFamily="18" charset="0"/>
-                        <a:cs typeface="Times New Roman" panose="02020603050405020304" pitchFamily="18" charset="0"/>
+                        <a:latin typeface="Calibri (Body)"/>
+                        <a:cs typeface="Calibri (Body)"/>
                       </a:endParaRPr>
                     </a:p>
                   </a:txBody>
@@ -16070,27 +17421,27 @@
                       </a:pPr>
                       <a:r>
                         <a:rPr lang="en-GB" sz="1100" dirty="0" smtClean="0">
-                          <a:latin typeface="Times New Roman" panose="02020603050405020304" pitchFamily="18" charset="0"/>
-                          <a:cs typeface="Times New Roman" panose="02020603050405020304" pitchFamily="18" charset="0"/>
+                          <a:latin typeface="Calibri (Body)"/>
+                          <a:cs typeface="Calibri (Body)"/>
                         </a:rPr>
                         <a:t>Display</a:t>
                       </a:r>
                       <a:r>
                         <a:rPr lang="en-GB" sz="1100" baseline="0" dirty="0" smtClean="0">
-                          <a:latin typeface="Times New Roman" panose="02020603050405020304" pitchFamily="18" charset="0"/>
-                          <a:cs typeface="Times New Roman" panose="02020603050405020304" pitchFamily="18" charset="0"/>
+                          <a:latin typeface="Calibri (Body)"/>
+                          <a:cs typeface="Calibri (Body)"/>
                         </a:rPr>
                         <a:t> user’s current address</a:t>
                       </a:r>
                       <a:endParaRPr lang="en-US" sz="1100" dirty="0" smtClean="0">
-                        <a:latin typeface="Times New Roman" panose="02020603050405020304" pitchFamily="18" charset="0"/>
-                        <a:cs typeface="Times New Roman" panose="02020603050405020304" pitchFamily="18" charset="0"/>
+                        <a:latin typeface="Calibri (Body)"/>
+                        <a:cs typeface="Calibri (Body)"/>
                       </a:endParaRPr>
                     </a:p>
                     <a:p>
                       <a:endParaRPr lang="en-US" sz="1100" dirty="0">
-                        <a:latin typeface="Times New Roman" panose="02020603050405020304" pitchFamily="18" charset="0"/>
-                        <a:cs typeface="Times New Roman" panose="02020603050405020304" pitchFamily="18" charset="0"/>
+                        <a:latin typeface="Calibri (Body)"/>
+                        <a:cs typeface="Calibri (Body)"/>
                       </a:endParaRPr>
                     </a:p>
                   </a:txBody>
@@ -16102,8 +17453,8 @@
                     <a:lstStyle/>
                     <a:p>
                       <a:endParaRPr lang="en-US" sz="1100" dirty="0">
-                        <a:latin typeface="Times New Roman" panose="02020603050405020304" pitchFamily="18" charset="0"/>
-                        <a:cs typeface="Times New Roman" panose="02020603050405020304" pitchFamily="18" charset="0"/>
+                        <a:latin typeface="Calibri (Body)"/>
+                        <a:cs typeface="Calibri (Body)"/>
                       </a:endParaRPr>
                     </a:p>
                   </a:txBody>
@@ -16122,9 +17473,9 @@
                           <a:solidFill>
                             <a:schemeClr val="tx1"/>
                           </a:solidFill>
-                          <a:latin typeface="Times New Roman" panose="02020603050405020304" pitchFamily="18" charset="0"/>
+                          <a:latin typeface="Calibri (Body)"/>
                           <a:ea typeface="+mn-ea"/>
-                          <a:cs typeface="Times New Roman" panose="02020603050405020304" pitchFamily="18" charset="0"/>
+                          <a:cs typeface="Calibri (Body)"/>
                         </a:rPr>
                         <a:t>8</a:t>
                       </a:r>
@@ -16132,9 +17483,9 @@
                         <a:solidFill>
                           <a:schemeClr val="tx1"/>
                         </a:solidFill>
-                        <a:latin typeface="Times New Roman" panose="02020603050405020304" pitchFamily="18" charset="0"/>
+                        <a:latin typeface="Calibri (Body)"/>
                         <a:ea typeface="+mn-ea"/>
-                        <a:cs typeface="Times New Roman" panose="02020603050405020304" pitchFamily="18" charset="0"/>
+                        <a:cs typeface="Calibri (Body)"/>
                       </a:endParaRPr>
                     </a:p>
                   </a:txBody>
@@ -16148,14 +17499,14 @@
                       <a:pPr algn="ctr"/>
                       <a:r>
                         <a:rPr lang="en-GB" sz="1100" dirty="0" smtClean="0">
-                          <a:latin typeface="Times New Roman" panose="02020603050405020304" pitchFamily="18" charset="0"/>
-                          <a:cs typeface="Times New Roman" panose="02020603050405020304" pitchFamily="18" charset="0"/>
+                          <a:latin typeface="Calibri (Body)"/>
+                          <a:cs typeface="Calibri (Body)"/>
                         </a:rPr>
                         <a:t>City</a:t>
                       </a:r>
                       <a:endParaRPr lang="en-US" sz="1100" dirty="0">
-                        <a:latin typeface="Times New Roman" panose="02020603050405020304" pitchFamily="18" charset="0"/>
-                        <a:cs typeface="Times New Roman" panose="02020603050405020304" pitchFamily="18" charset="0"/>
+                        <a:latin typeface="Calibri (Body)"/>
+                        <a:cs typeface="Calibri (Body)"/>
                       </a:endParaRPr>
                     </a:p>
                   </a:txBody>
@@ -16167,8 +17518,8 @@
                     <a:lstStyle/>
                     <a:p>
                       <a:endParaRPr lang="en-US" sz="1100" dirty="0">
-                        <a:latin typeface="Times New Roman" panose="02020603050405020304" pitchFamily="18" charset="0"/>
-                        <a:cs typeface="Times New Roman" panose="02020603050405020304" pitchFamily="18" charset="0"/>
+                        <a:latin typeface="Calibri (Body)"/>
+                        <a:cs typeface="Calibri (Body)"/>
                       </a:endParaRPr>
                     </a:p>
                   </a:txBody>
@@ -16198,27 +17549,27 @@
                       </a:pPr>
                       <a:r>
                         <a:rPr lang="en-GB" sz="1100" dirty="0" smtClean="0">
-                          <a:latin typeface="Times New Roman" panose="02020603050405020304" pitchFamily="18" charset="0"/>
-                          <a:cs typeface="Times New Roman" panose="02020603050405020304" pitchFamily="18" charset="0"/>
+                          <a:latin typeface="Calibri (Body)"/>
+                          <a:cs typeface="Calibri (Body)"/>
                         </a:rPr>
                         <a:t>Display</a:t>
                       </a:r>
                       <a:r>
                         <a:rPr lang="en-GB" sz="1100" baseline="0" dirty="0" smtClean="0">
-                          <a:latin typeface="Times New Roman" panose="02020603050405020304" pitchFamily="18" charset="0"/>
-                          <a:cs typeface="Times New Roman" panose="02020603050405020304" pitchFamily="18" charset="0"/>
+                          <a:latin typeface="Calibri (Body)"/>
+                          <a:cs typeface="Calibri (Body)"/>
                         </a:rPr>
                         <a:t> user’s current city</a:t>
                       </a:r>
                       <a:endParaRPr lang="en-US" sz="1100" dirty="0" smtClean="0">
-                        <a:latin typeface="Times New Roman" panose="02020603050405020304" pitchFamily="18" charset="0"/>
-                        <a:cs typeface="Times New Roman" panose="02020603050405020304" pitchFamily="18" charset="0"/>
+                        <a:latin typeface="Calibri (Body)"/>
+                        <a:cs typeface="Calibri (Body)"/>
                       </a:endParaRPr>
                     </a:p>
                     <a:p>
                       <a:endParaRPr lang="en-US" sz="1100" dirty="0">
-                        <a:latin typeface="Times New Roman" panose="02020603050405020304" pitchFamily="18" charset="0"/>
-                        <a:cs typeface="Times New Roman" panose="02020603050405020304" pitchFamily="18" charset="0"/>
+                        <a:latin typeface="Calibri (Body)"/>
+                        <a:cs typeface="Calibri (Body)"/>
                       </a:endParaRPr>
                     </a:p>
                   </a:txBody>
@@ -16230,8 +17581,8 @@
                     <a:lstStyle/>
                     <a:p>
                       <a:endParaRPr lang="en-US" sz="1100" dirty="0">
-                        <a:latin typeface="Times New Roman" panose="02020603050405020304" pitchFamily="18" charset="0"/>
-                        <a:cs typeface="Times New Roman" panose="02020603050405020304" pitchFamily="18" charset="0"/>
+                        <a:latin typeface="Calibri (Body)"/>
+                        <a:cs typeface="Calibri (Body)"/>
                       </a:endParaRPr>
                     </a:p>
                   </a:txBody>
@@ -16250,9 +17601,9 @@
                           <a:solidFill>
                             <a:schemeClr val="tx1"/>
                           </a:solidFill>
-                          <a:latin typeface="Times New Roman" panose="02020603050405020304" pitchFamily="18" charset="0"/>
+                          <a:latin typeface="Calibri (Body)"/>
                           <a:ea typeface="+mn-ea"/>
-                          <a:cs typeface="Times New Roman" panose="02020603050405020304" pitchFamily="18" charset="0"/>
+                          <a:cs typeface="Calibri (Body)"/>
                         </a:rPr>
                         <a:t>9</a:t>
                       </a:r>
@@ -16260,9 +17611,9 @@
                         <a:solidFill>
                           <a:schemeClr val="tx1"/>
                         </a:solidFill>
-                        <a:latin typeface="Times New Roman" panose="02020603050405020304" pitchFamily="18" charset="0"/>
+                        <a:latin typeface="Calibri (Body)"/>
                         <a:ea typeface="+mn-ea"/>
-                        <a:cs typeface="Times New Roman" panose="02020603050405020304" pitchFamily="18" charset="0"/>
+                        <a:cs typeface="Calibri (Body)"/>
                       </a:endParaRPr>
                     </a:p>
                   </a:txBody>
@@ -16276,14 +17627,14 @@
                       <a:pPr algn="ctr"/>
                       <a:r>
                         <a:rPr lang="en-GB" sz="1100" dirty="0" smtClean="0">
-                          <a:latin typeface="Times New Roman" panose="02020603050405020304" pitchFamily="18" charset="0"/>
-                          <a:cs typeface="Times New Roman" panose="02020603050405020304" pitchFamily="18" charset="0"/>
+                          <a:latin typeface="Calibri (Body)"/>
+                          <a:cs typeface="Calibri (Body)"/>
                         </a:rPr>
                         <a:t>Email</a:t>
                       </a:r>
                       <a:endParaRPr lang="en-US" sz="1100" dirty="0">
-                        <a:latin typeface="Times New Roman" panose="02020603050405020304" pitchFamily="18" charset="0"/>
-                        <a:cs typeface="Times New Roman" panose="02020603050405020304" pitchFamily="18" charset="0"/>
+                        <a:latin typeface="Calibri (Body)"/>
+                        <a:cs typeface="Calibri (Body)"/>
                       </a:endParaRPr>
                     </a:p>
                   </a:txBody>
@@ -16295,8 +17646,8 @@
                     <a:lstStyle/>
                     <a:p>
                       <a:endParaRPr lang="en-US" sz="1100" dirty="0">
-                        <a:latin typeface="Times New Roman" panose="02020603050405020304" pitchFamily="18" charset="0"/>
-                        <a:cs typeface="Times New Roman" panose="02020603050405020304" pitchFamily="18" charset="0"/>
+                        <a:latin typeface="Calibri (Body)"/>
+                        <a:cs typeface="Calibri (Body)"/>
                       </a:endParaRPr>
                     </a:p>
                   </a:txBody>
@@ -16326,27 +17677,27 @@
                       </a:pPr>
                       <a:r>
                         <a:rPr lang="en-GB" sz="1100" dirty="0" smtClean="0">
-                          <a:latin typeface="Times New Roman" panose="02020603050405020304" pitchFamily="18" charset="0"/>
-                          <a:cs typeface="Times New Roman" panose="02020603050405020304" pitchFamily="18" charset="0"/>
+                          <a:latin typeface="Calibri (Body)"/>
+                          <a:cs typeface="Calibri (Body)"/>
                         </a:rPr>
                         <a:t>Display</a:t>
                       </a:r>
                       <a:r>
                         <a:rPr lang="en-GB" sz="1100" baseline="0" dirty="0" smtClean="0">
-                          <a:latin typeface="Times New Roman" panose="02020603050405020304" pitchFamily="18" charset="0"/>
-                          <a:cs typeface="Times New Roman" panose="02020603050405020304" pitchFamily="18" charset="0"/>
+                          <a:latin typeface="Calibri (Body)"/>
+                          <a:cs typeface="Calibri (Body)"/>
                         </a:rPr>
                         <a:t> user’s current email</a:t>
                       </a:r>
                       <a:endParaRPr lang="en-US" sz="1100" dirty="0" smtClean="0">
-                        <a:latin typeface="Times New Roman" panose="02020603050405020304" pitchFamily="18" charset="0"/>
-                        <a:cs typeface="Times New Roman" panose="02020603050405020304" pitchFamily="18" charset="0"/>
+                        <a:latin typeface="Calibri (Body)"/>
+                        <a:cs typeface="Calibri (Body)"/>
                       </a:endParaRPr>
                     </a:p>
                     <a:p>
                       <a:endParaRPr lang="en-US" sz="1100" dirty="0">
-                        <a:latin typeface="Times New Roman" panose="02020603050405020304" pitchFamily="18" charset="0"/>
-                        <a:cs typeface="Times New Roman" panose="02020603050405020304" pitchFamily="18" charset="0"/>
+                        <a:latin typeface="Calibri (Body)"/>
+                        <a:cs typeface="Calibri (Body)"/>
                       </a:endParaRPr>
                     </a:p>
                   </a:txBody>
@@ -16358,8 +17709,8 @@
                     <a:lstStyle/>
                     <a:p>
                       <a:endParaRPr lang="en-US" sz="1100" dirty="0">
-                        <a:latin typeface="Times New Roman" panose="02020603050405020304" pitchFamily="18" charset="0"/>
-                        <a:cs typeface="Times New Roman" panose="02020603050405020304" pitchFamily="18" charset="0"/>
+                        <a:latin typeface="Calibri (Body)"/>
+                        <a:cs typeface="Calibri (Body)"/>
                       </a:endParaRPr>
                     </a:p>
                   </a:txBody>
@@ -16378,9 +17729,9 @@
                           <a:solidFill>
                             <a:schemeClr val="tx1"/>
                           </a:solidFill>
-                          <a:latin typeface="Times New Roman" panose="02020603050405020304" pitchFamily="18" charset="0"/>
+                          <a:latin typeface="Calibri (Body)"/>
                           <a:ea typeface="+mn-ea"/>
-                          <a:cs typeface="Times New Roman" panose="02020603050405020304" pitchFamily="18" charset="0"/>
+                          <a:cs typeface="Calibri (Body)"/>
                         </a:rPr>
                         <a:t>10</a:t>
                       </a:r>
@@ -16388,9 +17739,9 @@
                         <a:solidFill>
                           <a:schemeClr val="tx1"/>
                         </a:solidFill>
-                        <a:latin typeface="Times New Roman" panose="02020603050405020304" pitchFamily="18" charset="0"/>
+                        <a:latin typeface="Calibri (Body)"/>
                         <a:ea typeface="+mn-ea"/>
-                        <a:cs typeface="Times New Roman" panose="02020603050405020304" pitchFamily="18" charset="0"/>
+                        <a:cs typeface="Calibri (Body)"/>
                       </a:endParaRPr>
                     </a:p>
                   </a:txBody>
@@ -16404,14 +17755,14 @@
                       <a:pPr algn="ctr"/>
                       <a:r>
                         <a:rPr lang="en-GB" sz="1100" dirty="0" smtClean="0">
-                          <a:latin typeface="Times New Roman" panose="02020603050405020304" pitchFamily="18" charset="0"/>
-                          <a:cs typeface="Times New Roman" panose="02020603050405020304" pitchFamily="18" charset="0"/>
+                          <a:latin typeface="Calibri (Body)"/>
+                          <a:cs typeface="Calibri (Body)"/>
                         </a:rPr>
                         <a:t>Mobile</a:t>
                       </a:r>
                       <a:endParaRPr lang="en-US" sz="1100" dirty="0">
-                        <a:latin typeface="Times New Roman" panose="02020603050405020304" pitchFamily="18" charset="0"/>
-                        <a:cs typeface="Times New Roman" panose="02020603050405020304" pitchFamily="18" charset="0"/>
+                        <a:latin typeface="Calibri (Body)"/>
+                        <a:cs typeface="Calibri (Body)"/>
                       </a:endParaRPr>
                     </a:p>
                   </a:txBody>
@@ -16423,8 +17774,8 @@
                     <a:lstStyle/>
                     <a:p>
                       <a:endParaRPr lang="en-US" sz="1100" dirty="0">
-                        <a:latin typeface="Times New Roman" panose="02020603050405020304" pitchFamily="18" charset="0"/>
-                        <a:cs typeface="Times New Roman" panose="02020603050405020304" pitchFamily="18" charset="0"/>
+                        <a:latin typeface="Calibri (Body)"/>
+                        <a:cs typeface="Calibri (Body)"/>
                       </a:endParaRPr>
                     </a:p>
                   </a:txBody>
@@ -16437,21 +17788,21 @@
                     <a:p>
                       <a:r>
                         <a:rPr lang="en-GB" sz="1100" dirty="0" smtClean="0">
-                          <a:latin typeface="Times New Roman" panose="02020603050405020304" pitchFamily="18" charset="0"/>
-                          <a:cs typeface="Times New Roman" panose="02020603050405020304" pitchFamily="18" charset="0"/>
+                          <a:latin typeface="Calibri (Body)"/>
+                          <a:cs typeface="Calibri (Body)"/>
                         </a:rPr>
                         <a:t>Display</a:t>
                       </a:r>
                       <a:r>
                         <a:rPr lang="en-GB" sz="1100" baseline="0" dirty="0" smtClean="0">
-                          <a:latin typeface="Times New Roman" panose="02020603050405020304" pitchFamily="18" charset="0"/>
-                          <a:cs typeface="Times New Roman" panose="02020603050405020304" pitchFamily="18" charset="0"/>
+                          <a:latin typeface="Calibri (Body)"/>
+                          <a:cs typeface="Calibri (Body)"/>
                         </a:rPr>
                         <a:t> user’s current mobile</a:t>
                       </a:r>
                       <a:endParaRPr lang="en-US" sz="1100" dirty="0">
-                        <a:latin typeface="Times New Roman" panose="02020603050405020304" pitchFamily="18" charset="0"/>
-                        <a:cs typeface="Times New Roman" panose="02020603050405020304" pitchFamily="18" charset="0"/>
+                        <a:latin typeface="Calibri (Body)"/>
+                        <a:cs typeface="Calibri (Body)"/>
                       </a:endParaRPr>
                     </a:p>
                   </a:txBody>
@@ -16463,8 +17814,8 @@
                     <a:lstStyle/>
                     <a:p>
                       <a:endParaRPr lang="en-US" sz="1100" dirty="0">
-                        <a:latin typeface="Times New Roman" panose="02020603050405020304" pitchFamily="18" charset="0"/>
-                        <a:cs typeface="Times New Roman" panose="02020603050405020304" pitchFamily="18" charset="0"/>
+                        <a:latin typeface="Calibri (Body)"/>
+                        <a:cs typeface="Calibri (Body)"/>
                       </a:endParaRPr>
                     </a:p>
                   </a:txBody>
@@ -16483,9 +17834,9 @@
                           <a:solidFill>
                             <a:schemeClr val="tx1"/>
                           </a:solidFill>
-                          <a:latin typeface="Times New Roman" panose="02020603050405020304" pitchFamily="18" charset="0"/>
+                          <a:latin typeface="Calibri (Body)"/>
                           <a:ea typeface="+mn-ea"/>
-                          <a:cs typeface="Times New Roman" panose="02020603050405020304" pitchFamily="18" charset="0"/>
+                          <a:cs typeface="Calibri (Body)"/>
                         </a:rPr>
                         <a:t>11</a:t>
                       </a:r>
@@ -16493,9 +17844,9 @@
                         <a:solidFill>
                           <a:schemeClr val="tx1"/>
                         </a:solidFill>
-                        <a:latin typeface="Times New Roman" panose="02020603050405020304" pitchFamily="18" charset="0"/>
+                        <a:latin typeface="Calibri (Body)"/>
                         <a:ea typeface="+mn-ea"/>
-                        <a:cs typeface="Times New Roman" panose="02020603050405020304" pitchFamily="18" charset="0"/>
+                        <a:cs typeface="Calibri (Body)"/>
                       </a:endParaRPr>
                     </a:p>
                   </a:txBody>
@@ -16509,14 +17860,14 @@
                       <a:pPr algn="ctr"/>
                       <a:r>
                         <a:rPr lang="en-GB" sz="1100" dirty="0" smtClean="0">
-                          <a:latin typeface="Times New Roman" panose="02020603050405020304" pitchFamily="18" charset="0"/>
-                          <a:cs typeface="Times New Roman" panose="02020603050405020304" pitchFamily="18" charset="0"/>
+                          <a:latin typeface="Calibri (Body)"/>
+                          <a:cs typeface="Calibri (Body)"/>
                         </a:rPr>
                         <a:t>OK</a:t>
                       </a:r>
                       <a:endParaRPr lang="en-US" sz="1100" dirty="0">
-                        <a:latin typeface="Times New Roman" panose="02020603050405020304" pitchFamily="18" charset="0"/>
-                        <a:cs typeface="Times New Roman" panose="02020603050405020304" pitchFamily="18" charset="0"/>
+                        <a:latin typeface="Calibri (Body)"/>
+                        <a:cs typeface="Calibri (Body)"/>
                       </a:endParaRPr>
                     </a:p>
                   </a:txBody>
@@ -16529,28 +17880,28 @@
                     <a:p>
                       <a:r>
                         <a:rPr lang="en-GB" sz="1100" dirty="0" smtClean="0">
-                          <a:latin typeface="Times New Roman" panose="02020603050405020304" pitchFamily="18" charset="0"/>
-                          <a:cs typeface="Times New Roman" panose="02020603050405020304" pitchFamily="18" charset="0"/>
+                          <a:latin typeface="Calibri (Body)"/>
+                          <a:cs typeface="Calibri (Body)"/>
                         </a:rPr>
                         <a:t>Update</a:t>
                       </a:r>
                       <a:r>
                         <a:rPr lang="en-GB" sz="1100" baseline="0" dirty="0" smtClean="0">
-                          <a:latin typeface="Times New Roman" panose="02020603050405020304" pitchFamily="18" charset="0"/>
-                          <a:cs typeface="Times New Roman" panose="02020603050405020304" pitchFamily="18" charset="0"/>
+                          <a:latin typeface="Calibri (Body)"/>
+                          <a:cs typeface="Calibri (Body)"/>
                         </a:rPr>
                         <a:t> </a:t>
                       </a:r>
                       <a:r>
                         <a:rPr lang="en-GB" sz="1100" baseline="0" dirty="0" err="1" smtClean="0">
-                          <a:latin typeface="Times New Roman" panose="02020603050405020304" pitchFamily="18" charset="0"/>
-                          <a:cs typeface="Times New Roman" panose="02020603050405020304" pitchFamily="18" charset="0"/>
+                          <a:latin typeface="Calibri (Body)"/>
+                          <a:cs typeface="Calibri (Body)"/>
                         </a:rPr>
                         <a:t>infor</a:t>
                       </a:r>
                       <a:endParaRPr lang="en-US" sz="1100" dirty="0">
-                        <a:latin typeface="Times New Roman" panose="02020603050405020304" pitchFamily="18" charset="0"/>
-                        <a:cs typeface="Times New Roman" panose="02020603050405020304" pitchFamily="18" charset="0"/>
+                        <a:latin typeface="Calibri (Body)"/>
+                        <a:cs typeface="Calibri (Body)"/>
                       </a:endParaRPr>
                     </a:p>
                   </a:txBody>
@@ -16563,15 +17914,15 @@
                     <a:p>
                       <a:r>
                         <a:rPr lang="en-GB" sz="1100" dirty="0" smtClean="0">
-                          <a:latin typeface="Times New Roman" panose="02020603050405020304" pitchFamily="18" charset="0"/>
-                          <a:cs typeface="Times New Roman" panose="02020603050405020304" pitchFamily="18" charset="0"/>
+                          <a:latin typeface="Calibri (Body)"/>
+                          <a:cs typeface="Calibri (Body)"/>
                         </a:rPr>
                         <a:t>Update all information</a:t>
                       </a:r>
                       <a:r>
                         <a:rPr lang="en-GB" sz="1100" baseline="0" dirty="0" smtClean="0">
-                          <a:latin typeface="Times New Roman" panose="02020603050405020304" pitchFamily="18" charset="0"/>
-                          <a:cs typeface="Times New Roman" panose="02020603050405020304" pitchFamily="18" charset="0"/>
+                          <a:latin typeface="Calibri (Body)"/>
+                          <a:cs typeface="Calibri (Body)"/>
                         </a:rPr>
                         <a:t> that user want to change</a:t>
                       </a:r>
@@ -16583,8 +17934,8 @@
                       </a:pPr>
                       <a:r>
                         <a:rPr lang="en-GB" sz="1100" baseline="0" dirty="0" smtClean="0">
-                          <a:latin typeface="Times New Roman" panose="02020603050405020304" pitchFamily="18" charset="0"/>
-                          <a:cs typeface="Times New Roman" panose="02020603050405020304" pitchFamily="18" charset="0"/>
+                          <a:latin typeface="Calibri (Body)"/>
+                          <a:cs typeface="Calibri (Body)"/>
                           <a:sym typeface="Wingdings" panose="05000000000000000000" pitchFamily="2" charset="2"/>
                         </a:rPr>
                         <a:t>If something wrong, it will display error message</a:t>
@@ -16610,29 +17961,29 @@
                       </a:pPr>
                       <a:r>
                         <a:rPr lang="en-GB" sz="1100" dirty="0" smtClean="0">
-                          <a:latin typeface="Times New Roman" panose="02020603050405020304" pitchFamily="18" charset="0"/>
-                          <a:cs typeface="Times New Roman" panose="02020603050405020304" pitchFamily="18" charset="0"/>
+                          <a:latin typeface="Calibri (Body)"/>
+                          <a:cs typeface="Calibri (Body)"/>
                         </a:rPr>
                         <a:t>If</a:t>
                       </a:r>
                       <a:r>
                         <a:rPr lang="en-GB" sz="1100" baseline="0" dirty="0" smtClean="0">
-                          <a:latin typeface="Times New Roman" panose="02020603050405020304" pitchFamily="18" charset="0"/>
-                          <a:cs typeface="Times New Roman" panose="02020603050405020304" pitchFamily="18" charset="0"/>
+                          <a:latin typeface="Calibri (Body)"/>
+                          <a:cs typeface="Calibri (Body)"/>
                         </a:rPr>
                         <a:t> everything is alright, it </a:t>
                       </a:r>
                       <a:r>
                         <a:rPr lang="en-GB" sz="1100" baseline="0" dirty="0" smtClean="0">
-                          <a:latin typeface="Times New Roman" panose="02020603050405020304" pitchFamily="18" charset="0"/>
-                          <a:cs typeface="Times New Roman" panose="02020603050405020304" pitchFamily="18" charset="0"/>
+                          <a:latin typeface="Calibri (Body)"/>
+                          <a:cs typeface="Calibri (Body)"/>
                           <a:sym typeface="Wingdings" panose="05000000000000000000" pitchFamily="2" charset="2"/>
                         </a:rPr>
                         <a:t>will display success message</a:t>
                       </a:r>
                       <a:endParaRPr lang="en-US" sz="1100" dirty="0" smtClean="0">
-                        <a:latin typeface="Times New Roman" panose="02020603050405020304" pitchFamily="18" charset="0"/>
-                        <a:cs typeface="Times New Roman" panose="02020603050405020304" pitchFamily="18" charset="0"/>
+                        <a:latin typeface="Calibri (Body)"/>
+                        <a:cs typeface="Calibri (Body)"/>
                       </a:endParaRPr>
                     </a:p>
                     <a:p>
@@ -16641,8 +17992,8 @@
                         <a:buChar char="à"/>
                       </a:pPr>
                       <a:endParaRPr lang="en-US" sz="1100" dirty="0">
-                        <a:latin typeface="Times New Roman" panose="02020603050405020304" pitchFamily="18" charset="0"/>
-                        <a:cs typeface="Times New Roman" panose="02020603050405020304" pitchFamily="18" charset="0"/>
+                        <a:latin typeface="Calibri (Body)"/>
+                        <a:cs typeface="Calibri (Body)"/>
                       </a:endParaRPr>
                     </a:p>
                   </a:txBody>
@@ -16654,8 +18005,8 @@
                     <a:lstStyle/>
                     <a:p>
                       <a:endParaRPr lang="en-US" sz="1100" dirty="0">
-                        <a:latin typeface="Times New Roman" panose="02020603050405020304" pitchFamily="18" charset="0"/>
-                        <a:cs typeface="Times New Roman" panose="02020603050405020304" pitchFamily="18" charset="0"/>
+                        <a:latin typeface="Calibri (Body)"/>
+                        <a:cs typeface="Calibri (Body)"/>
                       </a:endParaRPr>
                     </a:p>
                   </a:txBody>
@@ -16674,9 +18025,9 @@
                           <a:solidFill>
                             <a:schemeClr val="tx1"/>
                           </a:solidFill>
-                          <a:latin typeface="Times New Roman" panose="02020603050405020304" pitchFamily="18" charset="0"/>
+                          <a:latin typeface="Calibri (Body)"/>
                           <a:ea typeface="+mn-ea"/>
-                          <a:cs typeface="Times New Roman" panose="02020603050405020304" pitchFamily="18" charset="0"/>
+                          <a:cs typeface="Calibri (Body)"/>
                         </a:rPr>
                         <a:t>12</a:t>
                       </a:r>
@@ -16684,9 +18035,9 @@
                         <a:solidFill>
                           <a:schemeClr val="tx1"/>
                         </a:solidFill>
-                        <a:latin typeface="Times New Roman" panose="02020603050405020304" pitchFamily="18" charset="0"/>
+                        <a:latin typeface="Calibri (Body)"/>
                         <a:ea typeface="+mn-ea"/>
-                        <a:cs typeface="Times New Roman" panose="02020603050405020304" pitchFamily="18" charset="0"/>
+                        <a:cs typeface="Calibri (Body)"/>
                       </a:endParaRPr>
                     </a:p>
                   </a:txBody>
@@ -16700,14 +18051,14 @@
                       <a:pPr algn="ctr"/>
                       <a:r>
                         <a:rPr lang="en-GB" sz="1100" dirty="0" smtClean="0">
-                          <a:latin typeface="Times New Roman" panose="02020603050405020304" pitchFamily="18" charset="0"/>
-                          <a:cs typeface="Times New Roman" panose="02020603050405020304" pitchFamily="18" charset="0"/>
+                          <a:latin typeface="Calibri (Body)"/>
+                          <a:cs typeface="Calibri (Body)"/>
                         </a:rPr>
                         <a:t>Cancel</a:t>
                       </a:r>
                       <a:endParaRPr lang="en-US" sz="1100" dirty="0">
-                        <a:latin typeface="Times New Roman" panose="02020603050405020304" pitchFamily="18" charset="0"/>
-                        <a:cs typeface="Times New Roman" panose="02020603050405020304" pitchFamily="18" charset="0"/>
+                        <a:latin typeface="Calibri (Body)"/>
+                        <a:cs typeface="Calibri (Body)"/>
                       </a:endParaRPr>
                     </a:p>
                   </a:txBody>
@@ -16719,8 +18070,8 @@
                     <a:lstStyle/>
                     <a:p>
                       <a:endParaRPr lang="en-US" sz="1100" dirty="0">
-                        <a:latin typeface="Times New Roman" panose="02020603050405020304" pitchFamily="18" charset="0"/>
-                        <a:cs typeface="Times New Roman" panose="02020603050405020304" pitchFamily="18" charset="0"/>
+                        <a:latin typeface="Calibri (Body)"/>
+                        <a:cs typeface="Calibri (Body)"/>
                       </a:endParaRPr>
                     </a:p>
                   </a:txBody>
@@ -16733,21 +18084,21 @@
                     <a:p>
                       <a:r>
                         <a:rPr lang="en-GB" sz="1100" dirty="0" smtClean="0">
-                          <a:latin typeface="Times New Roman" panose="02020603050405020304" pitchFamily="18" charset="0"/>
-                          <a:cs typeface="Times New Roman" panose="02020603050405020304" pitchFamily="18" charset="0"/>
+                          <a:latin typeface="Calibri (Body)"/>
+                          <a:cs typeface="Calibri (Body)"/>
                         </a:rPr>
                         <a:t>Set all information</a:t>
                       </a:r>
                       <a:r>
                         <a:rPr lang="en-GB" sz="1100" baseline="0" dirty="0" smtClean="0">
-                          <a:latin typeface="Times New Roman" panose="02020603050405020304" pitchFamily="18" charset="0"/>
-                          <a:cs typeface="Times New Roman" panose="02020603050405020304" pitchFamily="18" charset="0"/>
+                          <a:latin typeface="Calibri (Body)"/>
+                          <a:cs typeface="Calibri (Body)"/>
                         </a:rPr>
                         <a:t> of user to default.</a:t>
                       </a:r>
                       <a:endParaRPr lang="en-US" sz="1100" dirty="0">
-                        <a:latin typeface="Times New Roman" panose="02020603050405020304" pitchFamily="18" charset="0"/>
-                        <a:cs typeface="Times New Roman" panose="02020603050405020304" pitchFamily="18" charset="0"/>
+                        <a:latin typeface="Calibri (Body)"/>
+                        <a:cs typeface="Calibri (Body)"/>
                       </a:endParaRPr>
                     </a:p>
                   </a:txBody>
@@ -16759,8 +18110,8 @@
                     <a:lstStyle/>
                     <a:p>
                       <a:endParaRPr lang="en-US" sz="1100" dirty="0">
-                        <a:latin typeface="Times New Roman" panose="02020603050405020304" pitchFamily="18" charset="0"/>
-                        <a:cs typeface="Times New Roman" panose="02020603050405020304" pitchFamily="18" charset="0"/>
+                        <a:latin typeface="Calibri (Body)"/>
+                        <a:cs typeface="Calibri (Body)"/>
                       </a:endParaRPr>
                     </a:p>
                   </a:txBody>
@@ -16779,9 +18130,9 @@
                           <a:solidFill>
                             <a:schemeClr val="tx1"/>
                           </a:solidFill>
-                          <a:latin typeface="Times New Roman" panose="02020603050405020304" pitchFamily="18" charset="0"/>
+                          <a:latin typeface="Calibri (Body)"/>
                           <a:ea typeface="+mn-ea"/>
-                          <a:cs typeface="Times New Roman" panose="02020603050405020304" pitchFamily="18" charset="0"/>
+                          <a:cs typeface="Calibri (Body)"/>
                         </a:rPr>
                         <a:t>13</a:t>
                       </a:r>
@@ -16789,9 +18140,9 @@
                         <a:solidFill>
                           <a:schemeClr val="tx1"/>
                         </a:solidFill>
-                        <a:latin typeface="Times New Roman" panose="02020603050405020304" pitchFamily="18" charset="0"/>
+                        <a:latin typeface="Calibri (Body)"/>
                         <a:ea typeface="+mn-ea"/>
-                        <a:cs typeface="Times New Roman" panose="02020603050405020304" pitchFamily="18" charset="0"/>
+                        <a:cs typeface="Calibri (Body)"/>
                       </a:endParaRPr>
                     </a:p>
                   </a:txBody>
@@ -16805,14 +18156,14 @@
                       <a:pPr algn="ctr"/>
                       <a:r>
                         <a:rPr lang="en-GB" sz="1100" dirty="0" smtClean="0">
-                          <a:latin typeface="Times New Roman" panose="02020603050405020304" pitchFamily="18" charset="0"/>
-                          <a:cs typeface="Times New Roman" panose="02020603050405020304" pitchFamily="18" charset="0"/>
+                          <a:latin typeface="Calibri (Body)"/>
+                          <a:cs typeface="Calibri (Body)"/>
                         </a:rPr>
                         <a:t>Message</a:t>
                       </a:r>
                       <a:endParaRPr lang="en-US" sz="1100" dirty="0">
-                        <a:latin typeface="Times New Roman" panose="02020603050405020304" pitchFamily="18" charset="0"/>
-                        <a:cs typeface="Times New Roman" panose="02020603050405020304" pitchFamily="18" charset="0"/>
+                        <a:latin typeface="Calibri (Body)"/>
+                        <a:cs typeface="Calibri (Body)"/>
                       </a:endParaRPr>
                     </a:p>
                   </a:txBody>
@@ -16824,8 +18175,8 @@
                     <a:lstStyle/>
                     <a:p>
                       <a:endParaRPr lang="en-US" sz="1100" dirty="0">
-                        <a:latin typeface="Times New Roman" panose="02020603050405020304" pitchFamily="18" charset="0"/>
-                        <a:cs typeface="Times New Roman" panose="02020603050405020304" pitchFamily="18" charset="0"/>
+                        <a:latin typeface="Calibri (Body)"/>
+                        <a:cs typeface="Calibri (Body)"/>
                       </a:endParaRPr>
                     </a:p>
                   </a:txBody>
@@ -16838,8 +18189,8 @@
                     <a:p>
                       <a:r>
                         <a:rPr lang="en-GB" sz="1100" dirty="0" smtClean="0">
-                          <a:latin typeface="Times New Roman" panose="02020603050405020304" pitchFamily="18" charset="0"/>
-                          <a:cs typeface="Times New Roman" panose="02020603050405020304" pitchFamily="18" charset="0"/>
+                          <a:latin typeface="Calibri (Body)"/>
+                          <a:cs typeface="Calibri (Body)"/>
                         </a:rPr>
                         <a:t>- By default, it’ s hidden.</a:t>
                       </a:r>
@@ -16847,15 +18198,15 @@
                     <a:p>
                       <a:r>
                         <a:rPr lang="en-GB" sz="1100" dirty="0" smtClean="0">
-                          <a:latin typeface="Times New Roman" panose="02020603050405020304" pitchFamily="18" charset="0"/>
-                          <a:cs typeface="Times New Roman" panose="02020603050405020304" pitchFamily="18" charset="0"/>
+                          <a:latin typeface="Calibri (Body)"/>
+                          <a:cs typeface="Calibri (Body)"/>
                         </a:rPr>
                         <a:t>- If</a:t>
                       </a:r>
                       <a:r>
                         <a:rPr lang="en-GB" sz="1100" baseline="0" dirty="0" smtClean="0">
-                          <a:latin typeface="Times New Roman" panose="02020603050405020304" pitchFamily="18" charset="0"/>
-                          <a:cs typeface="Times New Roman" panose="02020603050405020304" pitchFamily="18" charset="0"/>
+                          <a:latin typeface="Calibri (Body)"/>
+                          <a:cs typeface="Calibri (Body)"/>
                         </a:rPr>
                         <a:t> everything is alright, the message change to green with text: “You have updated successfully” .</a:t>
                       </a:r>
@@ -16880,16 +18231,16 @@
                       </a:pPr>
                       <a:r>
                         <a:rPr lang="en-GB" sz="1100" baseline="0" dirty="0" smtClean="0">
-                          <a:latin typeface="Times New Roman" panose="02020603050405020304" pitchFamily="18" charset="0"/>
-                          <a:cs typeface="Times New Roman" panose="02020603050405020304" pitchFamily="18" charset="0"/>
+                          <a:latin typeface="Calibri (Body)"/>
+                          <a:cs typeface="Calibri (Body)"/>
                         </a:rPr>
                         <a:t>- If it’s wrong, the message change to red with text: “You have updated unsuccessfully” .</a:t>
                       </a:r>
                     </a:p>
                     <a:p>
                       <a:endParaRPr lang="en-US" sz="1100" dirty="0">
-                        <a:latin typeface="Times New Roman" panose="02020603050405020304" pitchFamily="18" charset="0"/>
-                        <a:cs typeface="Times New Roman" panose="02020603050405020304" pitchFamily="18" charset="0"/>
+                        <a:latin typeface="Calibri (Body)"/>
+                        <a:cs typeface="Calibri (Body)"/>
                       </a:endParaRPr>
                     </a:p>
                   </a:txBody>
@@ -16901,8 +18252,8 @@
                     <a:lstStyle/>
                     <a:p>
                       <a:endParaRPr lang="en-US" sz="1100" dirty="0">
-                        <a:latin typeface="Times New Roman" panose="02020603050405020304" pitchFamily="18" charset="0"/>
-                        <a:cs typeface="Times New Roman" panose="02020603050405020304" pitchFamily="18" charset="0"/>
+                        <a:latin typeface="Calibri (Body)"/>
+                        <a:cs typeface="Calibri (Body)"/>
                       </a:endParaRPr>
                     </a:p>
                   </a:txBody>

</xml_diff>

<commit_message>
fix sitemap, edit text, update homepage
</commit_message>
<xml_diff>
--- a/php/tam-v.anh/doc/detail_design/frontend/wireframe/MiniBlog_Wireframe_Ver_0.1.0.pptx
+++ b/php/tam-v.anh/doc/detail_design/frontend/wireframe/MiniBlog_Wireframe_Ver_0.1.0.pptx
@@ -8320,7 +8320,7 @@
         <p:spPr>
           <a:xfrm>
             <a:off x="3357319" y="3917897"/>
-            <a:ext cx="1199292" cy="307777"/>
+            <a:ext cx="1136699" cy="307777"/>
           </a:xfrm>
           <a:prstGeom prst="rect">
             <a:avLst/>
@@ -8335,7 +8335,7 @@
           <a:p>
             <a:r>
               <a:rPr kumimoji="1" lang="en-US" altLang="ja-JP" sz="1400"/>
-              <a:t>Manager Post</a:t>
+              <a:t>Manage Post</a:t>
             </a:r>
             <a:endParaRPr kumimoji="1" lang="ja-JP" altLang="en-US" sz="1400"/>
           </a:p>
@@ -8534,7 +8534,7 @@
         </p:nvSpPr>
         <p:spPr>
           <a:xfrm>
-            <a:off x="5404656" y="3720497"/>
+            <a:off x="5394035" y="4047367"/>
             <a:ext cx="598646" cy="290286"/>
           </a:xfrm>
           <a:prstGeom prst="rect">
@@ -8800,7 +8800,7 @@
         <p:spPr>
           <a:xfrm>
             <a:off x="2832604" y="5445183"/>
-            <a:ext cx="1608133" cy="307777"/>
+            <a:ext cx="1605703" cy="307777"/>
           </a:xfrm>
           <a:prstGeom prst="rect">
             <a:avLst/>
@@ -8815,7 +8815,11 @@
           <a:p>
             <a:r>
               <a:rPr kumimoji="1" lang="en-US" altLang="ja-JP" sz="1400"/>
-              <a:t>View all Post’s User</a:t>
+              <a:t>View all </a:t>
+            </a:r>
+            <a:r>
+              <a:rPr kumimoji="1" lang="en-US" altLang="ja-JP" sz="1400"/>
+              <a:t>User’s Post</a:t>
             </a:r>
             <a:endParaRPr kumimoji="1" lang="ja-JP" altLang="en-US" sz="1400"/>
           </a:p>
@@ -9187,7 +9191,7 @@
         <p:spPr>
           <a:xfrm>
             <a:off x="387048" y="762000"/>
-            <a:ext cx="3967238" cy="3716867"/>
+            <a:ext cx="3967238" cy="4140623"/>
           </a:xfrm>
           <a:prstGeom prst="rect">
             <a:avLst/>
@@ -9559,14 +9563,14 @@
           <p:nvPr>
             <p:extLst>
               <p:ext uri="{D42A27DB-BD31-4B8C-83A1-F6EECF244321}">
-                <p14:modId xmlns:p14="http://schemas.microsoft.com/office/powerpoint/2010/main" val="3839537198"/>
+                <p14:modId xmlns:p14="http://schemas.microsoft.com/office/powerpoint/2010/main" val="1252945179"/>
               </p:ext>
             </p:extLst>
           </p:nvPr>
         </p:nvGraphicFramePr>
         <p:xfrm>
           <a:off x="4478866" y="876073"/>
-          <a:ext cx="4461935" cy="1962492"/>
+          <a:ext cx="4461935" cy="3805376"/>
         </p:xfrm>
         <a:graphic>
           <a:graphicData uri="http://schemas.openxmlformats.org/drawingml/2006/table">
@@ -9993,6 +9997,368 @@
                   <a:tcPr/>
                 </a:tc>
               </a:tr>
+              <a:tr h="327082">
+                <a:tc>
+                  <a:txBody>
+                    <a:bodyPr/>
+                    <a:lstStyle/>
+                    <a:p>
+                      <a:r>
+                        <a:rPr kumimoji="1" lang="en-US" altLang="ja-JP" sz="1000"/>
+                        <a:t>6</a:t>
+                      </a:r>
+                      <a:endParaRPr kumimoji="1" lang="ja-JP" altLang="en-US" sz="1000"/>
+                    </a:p>
+                  </a:txBody>
+                  <a:tcPr/>
+                </a:tc>
+                <a:tc>
+                  <a:txBody>
+                    <a:bodyPr/>
+                    <a:lstStyle/>
+                    <a:p>
+                      <a:r>
+                        <a:rPr kumimoji="1" lang="en-US" altLang="ja-JP" sz="1000"/>
+                        <a:t>Image Post</a:t>
+                      </a:r>
+                      <a:endParaRPr kumimoji="1" lang="ja-JP" altLang="en-US" sz="1000"/>
+                    </a:p>
+                  </a:txBody>
+                  <a:tcPr/>
+                </a:tc>
+                <a:tc>
+                  <a:txBody>
+                    <a:bodyPr/>
+                    <a:lstStyle/>
+                    <a:p>
+                      <a:endParaRPr kumimoji="1" lang="ja-JP" altLang="en-US" sz="1000"/>
+                    </a:p>
+                  </a:txBody>
+                  <a:tcPr/>
+                </a:tc>
+                <a:tc>
+                  <a:txBody>
+                    <a:bodyPr/>
+                    <a:lstStyle/>
+                    <a:p>
+                      <a:pPr marL="0" marR="0" indent="0" algn="l" defTabSz="457200" rtl="0" eaLnBrk="1" fontAlgn="auto" latinLnBrk="0" hangingPunct="1">
+                        <a:lnSpc>
+                          <a:spcPct val="100000"/>
+                        </a:lnSpc>
+                        <a:spcBef>
+                          <a:spcPts val="0"/>
+                        </a:spcBef>
+                        <a:spcAft>
+                          <a:spcPts val="0"/>
+                        </a:spcAft>
+                        <a:buClrTx/>
+                        <a:buSzTx/>
+                        <a:buFontTx/>
+                        <a:buNone/>
+                        <a:tabLst/>
+                        <a:defRPr/>
+                      </a:pPr>
+                      <a:r>
+                        <a:rPr kumimoji="1" lang="en-US" altLang="ja-JP" sz="1000"/>
+                        <a:t>Click =&gt; go to detail post</a:t>
+                      </a:r>
+                      <a:endParaRPr kumimoji="1" lang="ja-JP" altLang="en-US" sz="1000"/>
+                    </a:p>
+                  </a:txBody>
+                  <a:tcPr/>
+                </a:tc>
+                <a:tc>
+                  <a:txBody>
+                    <a:bodyPr/>
+                    <a:lstStyle/>
+                    <a:p>
+                      <a:r>
+                        <a:rPr kumimoji="1" lang="vi-VN" altLang="ja-JP" sz="1000"/>
+                        <a:t>S-3-2</a:t>
+                      </a:r>
+                      <a:endParaRPr kumimoji="1" lang="ja-JP" altLang="en-US" sz="1000"/>
+                    </a:p>
+                  </a:txBody>
+                  <a:tcPr/>
+                </a:tc>
+              </a:tr>
+              <a:tr h="327082">
+                <a:tc>
+                  <a:txBody>
+                    <a:bodyPr/>
+                    <a:lstStyle/>
+                    <a:p>
+                      <a:r>
+                        <a:rPr kumimoji="1" lang="en-US" altLang="ja-JP" sz="1000"/>
+                        <a:t>7</a:t>
+                      </a:r>
+                      <a:endParaRPr kumimoji="1" lang="ja-JP" altLang="en-US" sz="1000"/>
+                    </a:p>
+                  </a:txBody>
+                  <a:tcPr/>
+                </a:tc>
+                <a:tc>
+                  <a:txBody>
+                    <a:bodyPr/>
+                    <a:lstStyle/>
+                    <a:p>
+                      <a:r>
+                        <a:rPr kumimoji="1" lang="en-US" altLang="ja-JP" sz="1000"/>
+                        <a:t>Title Post</a:t>
+                      </a:r>
+                      <a:endParaRPr kumimoji="1" lang="ja-JP" altLang="en-US" sz="1000"/>
+                    </a:p>
+                  </a:txBody>
+                  <a:tcPr/>
+                </a:tc>
+                <a:tc>
+                  <a:txBody>
+                    <a:bodyPr/>
+                    <a:lstStyle/>
+                    <a:p>
+                      <a:endParaRPr kumimoji="1" lang="ja-JP" altLang="en-US" sz="1000"/>
+                    </a:p>
+                  </a:txBody>
+                  <a:tcPr/>
+                </a:tc>
+                <a:tc>
+                  <a:txBody>
+                    <a:bodyPr/>
+                    <a:lstStyle/>
+                    <a:p>
+                      <a:r>
+                        <a:rPr kumimoji="1" lang="en-US" altLang="ja-JP" sz="1000"/>
+                        <a:t>Click =&gt; go to detail post</a:t>
+                      </a:r>
+                      <a:endParaRPr kumimoji="1" lang="ja-JP" altLang="en-US" sz="1000"/>
+                    </a:p>
+                  </a:txBody>
+                  <a:tcPr/>
+                </a:tc>
+                <a:tc>
+                  <a:txBody>
+                    <a:bodyPr/>
+                    <a:lstStyle/>
+                    <a:p>
+                      <a:r>
+                        <a:rPr kumimoji="1" lang="en-US" altLang="ja-JP" sz="1000"/>
+                        <a:t>S-3-2</a:t>
+                      </a:r>
+                      <a:endParaRPr kumimoji="1" lang="ja-JP" altLang="en-US" sz="1000"/>
+                    </a:p>
+                  </a:txBody>
+                  <a:tcPr/>
+                </a:tc>
+              </a:tr>
+              <a:tr h="327082">
+                <a:tc>
+                  <a:txBody>
+                    <a:bodyPr/>
+                    <a:lstStyle/>
+                    <a:p>
+                      <a:r>
+                        <a:rPr kumimoji="1" lang="en-US" altLang="ja-JP" sz="1000"/>
+                        <a:t>8</a:t>
+                      </a:r>
+                      <a:endParaRPr kumimoji="1" lang="ja-JP" altLang="en-US" sz="1000"/>
+                    </a:p>
+                  </a:txBody>
+                  <a:tcPr/>
+                </a:tc>
+                <a:tc>
+                  <a:txBody>
+                    <a:bodyPr/>
+                    <a:lstStyle/>
+                    <a:p>
+                      <a:r>
+                        <a:rPr kumimoji="1" lang="en-US" altLang="ja-JP" sz="1000"/>
+                        <a:t>Date Post</a:t>
+                      </a:r>
+                      <a:endParaRPr kumimoji="1" lang="ja-JP" altLang="en-US" sz="1000"/>
+                    </a:p>
+                  </a:txBody>
+                  <a:tcPr/>
+                </a:tc>
+                <a:tc>
+                  <a:txBody>
+                    <a:bodyPr/>
+                    <a:lstStyle/>
+                    <a:p>
+                      <a:endParaRPr kumimoji="1" lang="ja-JP" altLang="en-US" sz="1000"/>
+                    </a:p>
+                  </a:txBody>
+                  <a:tcPr/>
+                </a:tc>
+                <a:tc>
+                  <a:txBody>
+                    <a:bodyPr/>
+                    <a:lstStyle/>
+                    <a:p>
+                      <a:endParaRPr kumimoji="1" lang="ja-JP" altLang="en-US" sz="1000"/>
+                    </a:p>
+                  </a:txBody>
+                  <a:tcPr/>
+                </a:tc>
+                <a:tc>
+                  <a:txBody>
+                    <a:bodyPr/>
+                    <a:lstStyle/>
+                    <a:p>
+                      <a:endParaRPr kumimoji="1" lang="ja-JP" altLang="en-US" sz="1000"/>
+                    </a:p>
+                  </a:txBody>
+                  <a:tcPr/>
+                </a:tc>
+              </a:tr>
+              <a:tr h="327082">
+                <a:tc>
+                  <a:txBody>
+                    <a:bodyPr/>
+                    <a:lstStyle/>
+                    <a:p>
+                      <a:r>
+                        <a:rPr kumimoji="1" lang="en-US" altLang="ja-JP" sz="1000"/>
+                        <a:t>9</a:t>
+                      </a:r>
+                      <a:endParaRPr kumimoji="1" lang="ja-JP" altLang="en-US" sz="1000"/>
+                    </a:p>
+                  </a:txBody>
+                  <a:tcPr/>
+                </a:tc>
+                <a:tc>
+                  <a:txBody>
+                    <a:bodyPr/>
+                    <a:lstStyle/>
+                    <a:p>
+                      <a:r>
+                        <a:rPr kumimoji="1" lang="en-US" altLang="ja-JP" sz="1000"/>
+                        <a:t>Author Post</a:t>
+                      </a:r>
+                      <a:endParaRPr kumimoji="1" lang="ja-JP" altLang="en-US" sz="1000"/>
+                    </a:p>
+                  </a:txBody>
+                  <a:tcPr/>
+                </a:tc>
+                <a:tc>
+                  <a:txBody>
+                    <a:bodyPr/>
+                    <a:lstStyle/>
+                    <a:p>
+                      <a:endParaRPr kumimoji="1" lang="ja-JP" altLang="en-US" sz="1000"/>
+                    </a:p>
+                  </a:txBody>
+                  <a:tcPr/>
+                </a:tc>
+                <a:tc>
+                  <a:txBody>
+                    <a:bodyPr/>
+                    <a:lstStyle/>
+                    <a:p>
+                      <a:pPr marL="0" marR="0" indent="0" algn="l" defTabSz="457200" rtl="0" eaLnBrk="1" fontAlgn="auto" latinLnBrk="0" hangingPunct="1">
+                        <a:lnSpc>
+                          <a:spcPct val="100000"/>
+                        </a:lnSpc>
+                        <a:spcBef>
+                          <a:spcPts val="0"/>
+                        </a:spcBef>
+                        <a:spcAft>
+                          <a:spcPts val="0"/>
+                        </a:spcAft>
+                        <a:buClrTx/>
+                        <a:buSzTx/>
+                        <a:buFontTx/>
+                        <a:buNone/>
+                        <a:tabLst/>
+                        <a:defRPr/>
+                      </a:pPr>
+                      <a:r>
+                        <a:rPr kumimoji="1" lang="en-US" altLang="ja-JP" sz="1000"/>
+                        <a:t>Click =&gt; </a:t>
+                      </a:r>
+                      <a:r>
+                        <a:rPr kumimoji="1" lang="en-US" altLang="ja-JP" sz="1000"/>
+                        <a:t>All user’s post</a:t>
+                      </a:r>
+                      <a:endParaRPr kumimoji="1" lang="ja-JP" altLang="en-US" sz="1000"/>
+                    </a:p>
+                  </a:txBody>
+                  <a:tcPr/>
+                </a:tc>
+                <a:tc>
+                  <a:txBody>
+                    <a:bodyPr/>
+                    <a:lstStyle/>
+                    <a:p>
+                      <a:r>
+                        <a:rPr kumimoji="1" lang="vi-VN" altLang="ja-JP" sz="1000"/>
+                        <a:t>S-5-2</a:t>
+                      </a:r>
+                      <a:endParaRPr kumimoji="1" lang="ja-JP" altLang="en-US" sz="1000"/>
+                    </a:p>
+                  </a:txBody>
+                  <a:tcPr/>
+                </a:tc>
+              </a:tr>
+              <a:tr h="327082">
+                <a:tc>
+                  <a:txBody>
+                    <a:bodyPr/>
+                    <a:lstStyle/>
+                    <a:p>
+                      <a:r>
+                        <a:rPr kumimoji="1" lang="en-US" altLang="ja-JP" sz="1000"/>
+                        <a:t>10</a:t>
+                      </a:r>
+                      <a:endParaRPr kumimoji="1" lang="ja-JP" altLang="en-US" sz="1000"/>
+                    </a:p>
+                  </a:txBody>
+                  <a:tcPr/>
+                </a:tc>
+                <a:tc>
+                  <a:txBody>
+                    <a:bodyPr/>
+                    <a:lstStyle/>
+                    <a:p>
+                      <a:r>
+                        <a:rPr kumimoji="1" lang="en-US" altLang="ja-JP" sz="1000"/>
+                        <a:t>Description Post</a:t>
+                      </a:r>
+                      <a:endParaRPr kumimoji="1" lang="ja-JP" altLang="en-US" sz="1000"/>
+                    </a:p>
+                  </a:txBody>
+                  <a:tcPr/>
+                </a:tc>
+                <a:tc>
+                  <a:txBody>
+                    <a:bodyPr/>
+                    <a:lstStyle/>
+                    <a:p>
+                      <a:endParaRPr kumimoji="1" lang="ja-JP" altLang="en-US" sz="1000"/>
+                    </a:p>
+                  </a:txBody>
+                  <a:tcPr/>
+                </a:tc>
+                <a:tc>
+                  <a:txBody>
+                    <a:bodyPr/>
+                    <a:lstStyle/>
+                    <a:p>
+                      <a:endParaRPr kumimoji="1" lang="ja-JP" altLang="en-US" sz="1000"/>
+                    </a:p>
+                  </a:txBody>
+                  <a:tcPr/>
+                </a:tc>
+                <a:tc>
+                  <a:txBody>
+                    <a:bodyPr/>
+                    <a:lstStyle/>
+                    <a:p>
+                      <a:endParaRPr kumimoji="1" lang="ja-JP" altLang="en-US" sz="1000"/>
+                    </a:p>
+                  </a:txBody>
+                  <a:tcPr/>
+                </a:tc>
+              </a:tr>
             </a:tbl>
           </a:graphicData>
         </a:graphic>
@@ -10214,6 +10580,670 @@
                 <a:srgbClr val="FF0000"/>
               </a:solidFill>
             </a:endParaRPr>
+          </a:p>
+        </p:txBody>
+      </p:sp>
+      <p:sp>
+        <p:nvSpPr>
+          <p:cNvPr id="31" name="TextBox 30"/>
+          <p:cNvSpPr txBox="1"/>
+          <p:nvPr/>
+        </p:nvSpPr>
+        <p:spPr>
+          <a:xfrm>
+            <a:off x="571436" y="2769247"/>
+            <a:ext cx="327433" cy="246221"/>
+          </a:xfrm>
+          <a:prstGeom prst="rect">
+            <a:avLst/>
+          </a:prstGeom>
+          <a:noFill/>
+        </p:spPr>
+        <p:txBody>
+          <a:bodyPr wrap="none" rtlCol="0">
+            <a:spAutoFit/>
+          </a:bodyPr>
+          <a:lstStyle/>
+          <a:p>
+            <a:r>
+              <a:rPr kumimoji="1" lang="en-US" altLang="ja-JP" sz="1000">
+                <a:solidFill>
+                  <a:srgbClr val="FF0000"/>
+                </a:solidFill>
+              </a:rPr>
+              <a:t>(6)</a:t>
+            </a:r>
+            <a:endParaRPr kumimoji="1" lang="ja-JP" altLang="en-US" sz="1000">
+              <a:solidFill>
+                <a:srgbClr val="FF0000"/>
+              </a:solidFill>
+            </a:endParaRPr>
+          </a:p>
+        </p:txBody>
+      </p:sp>
+      <p:sp>
+        <p:nvSpPr>
+          <p:cNvPr id="32" name="TextBox 31"/>
+          <p:cNvSpPr txBox="1"/>
+          <p:nvPr/>
+        </p:nvSpPr>
+        <p:spPr>
+          <a:xfrm>
+            <a:off x="1593164" y="2406748"/>
+            <a:ext cx="327433" cy="246221"/>
+          </a:xfrm>
+          <a:prstGeom prst="rect">
+            <a:avLst/>
+          </a:prstGeom>
+          <a:noFill/>
+        </p:spPr>
+        <p:txBody>
+          <a:bodyPr wrap="none" rtlCol="0">
+            <a:spAutoFit/>
+          </a:bodyPr>
+          <a:lstStyle/>
+          <a:p>
+            <a:r>
+              <a:rPr kumimoji="1" lang="en-US" altLang="ja-JP" sz="1000">
+                <a:solidFill>
+                  <a:srgbClr val="FF0000"/>
+                </a:solidFill>
+              </a:rPr>
+              <a:t>(7)</a:t>
+            </a:r>
+            <a:endParaRPr kumimoji="1" lang="ja-JP" altLang="en-US" sz="1000">
+              <a:solidFill>
+                <a:srgbClr val="FF0000"/>
+              </a:solidFill>
+            </a:endParaRPr>
+          </a:p>
+        </p:txBody>
+      </p:sp>
+      <p:sp>
+        <p:nvSpPr>
+          <p:cNvPr id="33" name="TextBox 32"/>
+          <p:cNvSpPr txBox="1"/>
+          <p:nvPr/>
+        </p:nvSpPr>
+        <p:spPr>
+          <a:xfrm>
+            <a:off x="2034277" y="2406748"/>
+            <a:ext cx="327433" cy="246221"/>
+          </a:xfrm>
+          <a:prstGeom prst="rect">
+            <a:avLst/>
+          </a:prstGeom>
+          <a:noFill/>
+        </p:spPr>
+        <p:txBody>
+          <a:bodyPr wrap="none" rtlCol="0">
+            <a:spAutoFit/>
+          </a:bodyPr>
+          <a:lstStyle/>
+          <a:p>
+            <a:r>
+              <a:rPr kumimoji="1" lang="en-US" altLang="ja-JP" sz="1000">
+                <a:solidFill>
+                  <a:srgbClr val="FF0000"/>
+                </a:solidFill>
+              </a:rPr>
+              <a:t>(8)</a:t>
+            </a:r>
+            <a:endParaRPr kumimoji="1" lang="ja-JP" altLang="en-US" sz="1000">
+              <a:solidFill>
+                <a:srgbClr val="FF0000"/>
+              </a:solidFill>
+            </a:endParaRPr>
+          </a:p>
+        </p:txBody>
+      </p:sp>
+      <p:sp>
+        <p:nvSpPr>
+          <p:cNvPr id="34" name="TextBox 33"/>
+          <p:cNvSpPr txBox="1"/>
+          <p:nvPr/>
+        </p:nvSpPr>
+        <p:spPr>
+          <a:xfrm>
+            <a:off x="3173699" y="2538411"/>
+            <a:ext cx="327433" cy="246221"/>
+          </a:xfrm>
+          <a:prstGeom prst="rect">
+            <a:avLst/>
+          </a:prstGeom>
+          <a:noFill/>
+        </p:spPr>
+        <p:txBody>
+          <a:bodyPr wrap="none" rtlCol="0">
+            <a:spAutoFit/>
+          </a:bodyPr>
+          <a:lstStyle/>
+          <a:p>
+            <a:r>
+              <a:rPr kumimoji="1" lang="en-US" altLang="ja-JP" sz="1000">
+                <a:solidFill>
+                  <a:srgbClr val="FF0000"/>
+                </a:solidFill>
+              </a:rPr>
+              <a:t>(9)</a:t>
+            </a:r>
+            <a:endParaRPr kumimoji="1" lang="ja-JP" altLang="en-US" sz="1000">
+              <a:solidFill>
+                <a:srgbClr val="FF0000"/>
+              </a:solidFill>
+            </a:endParaRPr>
+          </a:p>
+        </p:txBody>
+      </p:sp>
+      <p:sp>
+        <p:nvSpPr>
+          <p:cNvPr id="6" name="Rectangle 5"/>
+          <p:cNvSpPr/>
+          <p:nvPr/>
+        </p:nvSpPr>
+        <p:spPr>
+          <a:xfrm>
+            <a:off x="618067" y="2491418"/>
+            <a:ext cx="557218" cy="531168"/>
+          </a:xfrm>
+          <a:prstGeom prst="rect">
+            <a:avLst/>
+          </a:prstGeom>
+          <a:ln>
+            <a:solidFill>
+              <a:schemeClr val="tx1"/>
+            </a:solidFill>
+          </a:ln>
+          <a:effectLst/>
+        </p:spPr>
+        <p:style>
+          <a:lnRef idx="1">
+            <a:schemeClr val="accent1"/>
+          </a:lnRef>
+          <a:fillRef idx="3">
+            <a:schemeClr val="accent1"/>
+          </a:fillRef>
+          <a:effectRef idx="2">
+            <a:schemeClr val="accent1"/>
+          </a:effectRef>
+          <a:fontRef idx="minor">
+            <a:schemeClr val="lt1"/>
+          </a:fontRef>
+        </p:style>
+        <p:txBody>
+          <a:bodyPr rtlCol="0" anchor="ctr"/>
+          <a:lstStyle/>
+          <a:p>
+            <a:pPr algn="ctr"/>
+            <a:r>
+              <a:rPr kumimoji="1" lang="en-US" altLang="ja-JP" sz="900">
+                <a:solidFill>
+                  <a:schemeClr val="tx1"/>
+                </a:solidFill>
+              </a:rPr>
+              <a:t>Image</a:t>
+            </a:r>
+            <a:endParaRPr kumimoji="1" lang="ja-JP" altLang="en-US" sz="900">
+              <a:solidFill>
+                <a:schemeClr val="tx1"/>
+              </a:solidFill>
+            </a:endParaRPr>
+          </a:p>
+        </p:txBody>
+      </p:sp>
+      <p:sp>
+        <p:nvSpPr>
+          <p:cNvPr id="10" name="TextBox 9"/>
+          <p:cNvSpPr txBox="1"/>
+          <p:nvPr/>
+        </p:nvSpPr>
+        <p:spPr>
+          <a:xfrm>
+            <a:off x="1176867" y="2406748"/>
+            <a:ext cx="505830" cy="246221"/>
+          </a:xfrm>
+          <a:prstGeom prst="rect">
+            <a:avLst/>
+          </a:prstGeom>
+          <a:noFill/>
+        </p:spPr>
+        <p:txBody>
+          <a:bodyPr wrap="none" rtlCol="0">
+            <a:spAutoFit/>
+          </a:bodyPr>
+          <a:lstStyle/>
+          <a:p>
+            <a:r>
+              <a:rPr kumimoji="1" lang="en-US" altLang="ja-JP" sz="1000"/>
+              <a:t>Blog 1</a:t>
+            </a:r>
+            <a:endParaRPr kumimoji="1" lang="ja-JP" altLang="en-US" sz="1000"/>
+          </a:p>
+        </p:txBody>
+      </p:sp>
+      <p:sp>
+        <p:nvSpPr>
+          <p:cNvPr id="11" name="TextBox 10"/>
+          <p:cNvSpPr txBox="1"/>
+          <p:nvPr/>
+        </p:nvSpPr>
+        <p:spPr>
+          <a:xfrm>
+            <a:off x="1200686" y="2538411"/>
+            <a:ext cx="2096678" cy="215444"/>
+          </a:xfrm>
+          <a:prstGeom prst="rect">
+            <a:avLst/>
+          </a:prstGeom>
+          <a:noFill/>
+        </p:spPr>
+        <p:txBody>
+          <a:bodyPr wrap="none" rtlCol="0">
+            <a:spAutoFit/>
+          </a:bodyPr>
+          <a:lstStyle/>
+          <a:p>
+            <a:r>
+              <a:rPr kumimoji="1" lang="en-US" altLang="ja-JP" sz="800" i="1">
+                <a:solidFill>
+                  <a:schemeClr val="bg1">
+                    <a:lumMod val="65000"/>
+                  </a:schemeClr>
+                </a:solidFill>
+              </a:rPr>
+              <a:t>Date: 08/12/2015 12:40 | Author: Tam Pham</a:t>
+            </a:r>
+            <a:endParaRPr kumimoji="1" lang="ja-JP" altLang="en-US" sz="800" i="1">
+              <a:solidFill>
+                <a:schemeClr val="bg1">
+                  <a:lumMod val="65000"/>
+                </a:schemeClr>
+              </a:solidFill>
+            </a:endParaRPr>
+          </a:p>
+        </p:txBody>
+      </p:sp>
+      <p:sp>
+        <p:nvSpPr>
+          <p:cNvPr id="12" name="TextBox 11"/>
+          <p:cNvSpPr txBox="1"/>
+          <p:nvPr/>
+        </p:nvSpPr>
+        <p:spPr>
+          <a:xfrm>
+            <a:off x="1196434" y="2686119"/>
+            <a:ext cx="3445934" cy="400110"/>
+          </a:xfrm>
+          <a:prstGeom prst="rect">
+            <a:avLst/>
+          </a:prstGeom>
+          <a:noFill/>
+        </p:spPr>
+        <p:txBody>
+          <a:bodyPr wrap="square" rtlCol="0">
+            <a:spAutoFit/>
+          </a:bodyPr>
+          <a:lstStyle/>
+          <a:p>
+            <a:r>
+              <a:rPr kumimoji="1" lang="en-US" altLang="ja-JP" sz="1000"/>
+              <a:t>Lorem Ipsum is simply dummy text of the printing and typesetting industry. Lorem Ipsum has been the</a:t>
+            </a:r>
+            <a:endParaRPr kumimoji="1" lang="ja-JP" altLang="en-US" sz="1000"/>
+          </a:p>
+        </p:txBody>
+      </p:sp>
+      <p:sp>
+        <p:nvSpPr>
+          <p:cNvPr id="38" name="TextBox 37"/>
+          <p:cNvSpPr txBox="1"/>
+          <p:nvPr/>
+        </p:nvSpPr>
+        <p:spPr>
+          <a:xfrm>
+            <a:off x="3778899" y="2848673"/>
+            <a:ext cx="392430" cy="246221"/>
+          </a:xfrm>
+          <a:prstGeom prst="rect">
+            <a:avLst/>
+          </a:prstGeom>
+          <a:noFill/>
+        </p:spPr>
+        <p:txBody>
+          <a:bodyPr wrap="none" rtlCol="0">
+            <a:spAutoFit/>
+          </a:bodyPr>
+          <a:lstStyle/>
+          <a:p>
+            <a:r>
+              <a:rPr kumimoji="1" lang="en-US" altLang="ja-JP" sz="1000">
+                <a:solidFill>
+                  <a:srgbClr val="FF0000"/>
+                </a:solidFill>
+              </a:rPr>
+              <a:t>(10)</a:t>
+            </a:r>
+            <a:endParaRPr kumimoji="1" lang="ja-JP" altLang="en-US" sz="1000">
+              <a:solidFill>
+                <a:srgbClr val="FF0000"/>
+              </a:solidFill>
+            </a:endParaRPr>
+          </a:p>
+        </p:txBody>
+      </p:sp>
+      <p:sp>
+        <p:nvSpPr>
+          <p:cNvPr id="39" name="Rectangle 38"/>
+          <p:cNvSpPr/>
+          <p:nvPr/>
+        </p:nvSpPr>
+        <p:spPr>
+          <a:xfrm>
+            <a:off x="622319" y="3137032"/>
+            <a:ext cx="557218" cy="531168"/>
+          </a:xfrm>
+          <a:prstGeom prst="rect">
+            <a:avLst/>
+          </a:prstGeom>
+          <a:ln>
+            <a:solidFill>
+              <a:schemeClr val="tx1"/>
+            </a:solidFill>
+          </a:ln>
+          <a:effectLst/>
+        </p:spPr>
+        <p:style>
+          <a:lnRef idx="1">
+            <a:schemeClr val="accent1"/>
+          </a:lnRef>
+          <a:fillRef idx="3">
+            <a:schemeClr val="accent1"/>
+          </a:fillRef>
+          <a:effectRef idx="2">
+            <a:schemeClr val="accent1"/>
+          </a:effectRef>
+          <a:fontRef idx="minor">
+            <a:schemeClr val="lt1"/>
+          </a:fontRef>
+        </p:style>
+        <p:txBody>
+          <a:bodyPr rtlCol="0" anchor="ctr"/>
+          <a:lstStyle/>
+          <a:p>
+            <a:pPr algn="ctr"/>
+            <a:r>
+              <a:rPr kumimoji="1" lang="en-US" altLang="ja-JP" sz="900">
+                <a:solidFill>
+                  <a:schemeClr val="tx1"/>
+                </a:solidFill>
+              </a:rPr>
+              <a:t>Image</a:t>
+            </a:r>
+            <a:endParaRPr kumimoji="1" lang="ja-JP" altLang="en-US" sz="900">
+              <a:solidFill>
+                <a:schemeClr val="tx1"/>
+              </a:solidFill>
+            </a:endParaRPr>
+          </a:p>
+        </p:txBody>
+      </p:sp>
+      <p:sp>
+        <p:nvSpPr>
+          <p:cNvPr id="40" name="TextBox 39"/>
+          <p:cNvSpPr txBox="1"/>
+          <p:nvPr/>
+        </p:nvSpPr>
+        <p:spPr>
+          <a:xfrm>
+            <a:off x="1181119" y="3052362"/>
+            <a:ext cx="505830" cy="246221"/>
+          </a:xfrm>
+          <a:prstGeom prst="rect">
+            <a:avLst/>
+          </a:prstGeom>
+          <a:noFill/>
+        </p:spPr>
+        <p:txBody>
+          <a:bodyPr wrap="none" rtlCol="0">
+            <a:spAutoFit/>
+          </a:bodyPr>
+          <a:lstStyle/>
+          <a:p>
+            <a:r>
+              <a:rPr kumimoji="1" lang="en-US" altLang="ja-JP" sz="1000"/>
+              <a:t>Blog 1</a:t>
+            </a:r>
+            <a:endParaRPr kumimoji="1" lang="ja-JP" altLang="en-US" sz="1000"/>
+          </a:p>
+        </p:txBody>
+      </p:sp>
+      <p:sp>
+        <p:nvSpPr>
+          <p:cNvPr id="41" name="TextBox 40"/>
+          <p:cNvSpPr txBox="1"/>
+          <p:nvPr/>
+        </p:nvSpPr>
+        <p:spPr>
+          <a:xfrm>
+            <a:off x="1204938" y="3184025"/>
+            <a:ext cx="2096678" cy="215444"/>
+          </a:xfrm>
+          <a:prstGeom prst="rect">
+            <a:avLst/>
+          </a:prstGeom>
+          <a:noFill/>
+        </p:spPr>
+        <p:txBody>
+          <a:bodyPr wrap="none" rtlCol="0">
+            <a:spAutoFit/>
+          </a:bodyPr>
+          <a:lstStyle/>
+          <a:p>
+            <a:r>
+              <a:rPr kumimoji="1" lang="en-US" altLang="ja-JP" sz="800" i="1">
+                <a:solidFill>
+                  <a:schemeClr val="bg1">
+                    <a:lumMod val="65000"/>
+                  </a:schemeClr>
+                </a:solidFill>
+              </a:rPr>
+              <a:t>Date: 08/12/2015 12:40 | Author: Tam Pham</a:t>
+            </a:r>
+            <a:endParaRPr kumimoji="1" lang="ja-JP" altLang="en-US" sz="800" i="1">
+              <a:solidFill>
+                <a:schemeClr val="bg1">
+                  <a:lumMod val="65000"/>
+                </a:schemeClr>
+              </a:solidFill>
+            </a:endParaRPr>
+          </a:p>
+        </p:txBody>
+      </p:sp>
+      <p:sp>
+        <p:nvSpPr>
+          <p:cNvPr id="42" name="TextBox 41"/>
+          <p:cNvSpPr txBox="1"/>
+          <p:nvPr/>
+        </p:nvSpPr>
+        <p:spPr>
+          <a:xfrm>
+            <a:off x="1200686" y="3331733"/>
+            <a:ext cx="3445934" cy="400110"/>
+          </a:xfrm>
+          <a:prstGeom prst="rect">
+            <a:avLst/>
+          </a:prstGeom>
+          <a:noFill/>
+        </p:spPr>
+        <p:txBody>
+          <a:bodyPr wrap="square" rtlCol="0">
+            <a:spAutoFit/>
+          </a:bodyPr>
+          <a:lstStyle/>
+          <a:p>
+            <a:r>
+              <a:rPr kumimoji="1" lang="en-US" altLang="ja-JP" sz="1000"/>
+              <a:t>Lorem Ipsum is simply dummy text of the printing and typesetting industry. Lorem Ipsum has been the</a:t>
+            </a:r>
+            <a:endParaRPr kumimoji="1" lang="ja-JP" altLang="en-US" sz="1000"/>
+          </a:p>
+        </p:txBody>
+      </p:sp>
+      <p:sp>
+        <p:nvSpPr>
+          <p:cNvPr id="43" name="Rectangle 42"/>
+          <p:cNvSpPr/>
+          <p:nvPr/>
+        </p:nvSpPr>
+        <p:spPr>
+          <a:xfrm>
+            <a:off x="613815" y="3896856"/>
+            <a:ext cx="557218" cy="531168"/>
+          </a:xfrm>
+          <a:prstGeom prst="rect">
+            <a:avLst/>
+          </a:prstGeom>
+          <a:ln>
+            <a:solidFill>
+              <a:schemeClr val="tx1"/>
+            </a:solidFill>
+          </a:ln>
+          <a:effectLst/>
+        </p:spPr>
+        <p:style>
+          <a:lnRef idx="1">
+            <a:schemeClr val="accent1"/>
+          </a:lnRef>
+          <a:fillRef idx="3">
+            <a:schemeClr val="accent1"/>
+          </a:fillRef>
+          <a:effectRef idx="2">
+            <a:schemeClr val="accent1"/>
+          </a:effectRef>
+          <a:fontRef idx="minor">
+            <a:schemeClr val="lt1"/>
+          </a:fontRef>
+        </p:style>
+        <p:txBody>
+          <a:bodyPr rtlCol="0" anchor="ctr"/>
+          <a:lstStyle/>
+          <a:p>
+            <a:pPr algn="ctr"/>
+            <a:r>
+              <a:rPr kumimoji="1" lang="en-US" altLang="ja-JP" sz="900">
+                <a:solidFill>
+                  <a:schemeClr val="tx1"/>
+                </a:solidFill>
+              </a:rPr>
+              <a:t>Image</a:t>
+            </a:r>
+            <a:endParaRPr kumimoji="1" lang="ja-JP" altLang="en-US" sz="900">
+              <a:solidFill>
+                <a:schemeClr val="tx1"/>
+              </a:solidFill>
+            </a:endParaRPr>
+          </a:p>
+        </p:txBody>
+      </p:sp>
+      <p:sp>
+        <p:nvSpPr>
+          <p:cNvPr id="44" name="TextBox 43"/>
+          <p:cNvSpPr txBox="1"/>
+          <p:nvPr/>
+        </p:nvSpPr>
+        <p:spPr>
+          <a:xfrm>
+            <a:off x="1172615" y="3812186"/>
+            <a:ext cx="505830" cy="246221"/>
+          </a:xfrm>
+          <a:prstGeom prst="rect">
+            <a:avLst/>
+          </a:prstGeom>
+          <a:noFill/>
+        </p:spPr>
+        <p:txBody>
+          <a:bodyPr wrap="none" rtlCol="0">
+            <a:spAutoFit/>
+          </a:bodyPr>
+          <a:lstStyle/>
+          <a:p>
+            <a:r>
+              <a:rPr kumimoji="1" lang="en-US" altLang="ja-JP" sz="1000"/>
+              <a:t>Blog 1</a:t>
+            </a:r>
+            <a:endParaRPr kumimoji="1" lang="ja-JP" altLang="en-US" sz="1000"/>
+          </a:p>
+        </p:txBody>
+      </p:sp>
+      <p:sp>
+        <p:nvSpPr>
+          <p:cNvPr id="45" name="TextBox 44"/>
+          <p:cNvSpPr txBox="1"/>
+          <p:nvPr/>
+        </p:nvSpPr>
+        <p:spPr>
+          <a:xfrm>
+            <a:off x="1196434" y="3943849"/>
+            <a:ext cx="2096678" cy="215444"/>
+          </a:xfrm>
+          <a:prstGeom prst="rect">
+            <a:avLst/>
+          </a:prstGeom>
+          <a:noFill/>
+        </p:spPr>
+        <p:txBody>
+          <a:bodyPr wrap="none" rtlCol="0">
+            <a:spAutoFit/>
+          </a:bodyPr>
+          <a:lstStyle/>
+          <a:p>
+            <a:r>
+              <a:rPr kumimoji="1" lang="en-US" altLang="ja-JP" sz="800" i="1">
+                <a:solidFill>
+                  <a:schemeClr val="bg1">
+                    <a:lumMod val="65000"/>
+                  </a:schemeClr>
+                </a:solidFill>
+              </a:rPr>
+              <a:t>Date: 08/12/2015 12:40 | Author: Tam Pham</a:t>
+            </a:r>
+            <a:endParaRPr kumimoji="1" lang="ja-JP" altLang="en-US" sz="800" i="1">
+              <a:solidFill>
+                <a:schemeClr val="bg1">
+                  <a:lumMod val="65000"/>
+                </a:schemeClr>
+              </a:solidFill>
+            </a:endParaRPr>
+          </a:p>
+        </p:txBody>
+      </p:sp>
+      <p:sp>
+        <p:nvSpPr>
+          <p:cNvPr id="46" name="TextBox 45"/>
+          <p:cNvSpPr txBox="1"/>
+          <p:nvPr/>
+        </p:nvSpPr>
+        <p:spPr>
+          <a:xfrm>
+            <a:off x="1192182" y="4091557"/>
+            <a:ext cx="3445934" cy="400110"/>
+          </a:xfrm>
+          <a:prstGeom prst="rect">
+            <a:avLst/>
+          </a:prstGeom>
+          <a:noFill/>
+        </p:spPr>
+        <p:txBody>
+          <a:bodyPr wrap="square" rtlCol="0">
+            <a:spAutoFit/>
+          </a:bodyPr>
+          <a:lstStyle/>
+          <a:p>
+            <a:r>
+              <a:rPr kumimoji="1" lang="en-US" altLang="ja-JP" sz="1000"/>
+              <a:t>Lorem Ipsum is simply dummy text of the printing and typesetting industry. Lorem Ipsum has been the</a:t>
+            </a:r>
+            <a:endParaRPr kumimoji="1" lang="ja-JP" altLang="en-US" sz="1000"/>
           </a:p>
         </p:txBody>
       </p:sp>
@@ -12002,7 +13032,7 @@
         <p:spPr>
           <a:xfrm>
             <a:off x="384739" y="1668018"/>
-            <a:ext cx="919665" cy="253916"/>
+            <a:ext cx="514130" cy="253916"/>
           </a:xfrm>
           <a:prstGeom prst="rect">
             <a:avLst/>
@@ -12028,7 +13058,7 @@
             </a:r>
             <a:r>
               <a:rPr kumimoji="1" lang="en-US" altLang="ja-JP" sz="1050"/>
-              <a:t> / Login</a:t>
+              <a:t> </a:t>
             </a:r>
             <a:endParaRPr kumimoji="1" lang="ja-JP" altLang="en-US" sz="1050"/>
           </a:p>
@@ -12043,7 +13073,7 @@
           <p:nvPr>
             <p:extLst>
               <p:ext uri="{D42A27DB-BD31-4B8C-83A1-F6EECF244321}">
-                <p14:modId xmlns:p14="http://schemas.microsoft.com/office/powerpoint/2010/main" val="2164747788"/>
+                <p14:modId xmlns:p14="http://schemas.microsoft.com/office/powerpoint/2010/main" val="1649632661"/>
               </p:ext>
             </p:extLst>
           </p:nvPr>
@@ -12279,7 +13309,7 @@
                     <a:p>
                       <a:r>
                         <a:rPr kumimoji="1" lang="en-US" altLang="ja-JP" sz="1000"/>
-                        <a:t>Manager Post</a:t>
+                        <a:t>Manage Post</a:t>
                       </a:r>
                       <a:endParaRPr kumimoji="1" lang="ja-JP" altLang="en-US" sz="1000"/>
                     </a:p>
@@ -12730,7 +13760,7 @@
           <a:p>
             <a:r>
               <a:rPr kumimoji="1" lang="en-US" altLang="ja-JP" sz="1000"/>
-              <a:t>Manager Post</a:t>
+              <a:t>Manage Post</a:t>
             </a:r>
           </a:p>
           <a:p>

</xml_diff>

<commit_message>
remove sitemap and update change password, update info
</commit_message>
<xml_diff>
--- a/php/tam-v.anh/doc/detail_design/frontend/wireframe/MiniBlog_Wireframe_Ver_0.1.0.pptx
+++ b/php/tam-v.anh/doc/detail_design/frontend/wireframe/MiniBlog_Wireframe_Ver_0.1.0.pptx
@@ -7388,116 +7388,6 @@
       </p:sp>
       <p:cxnSp>
         <p:nvCxnSpPr>
-          <p:cNvPr id="38" name="Straight Arrow Connector 37"/>
-          <p:cNvCxnSpPr/>
-          <p:nvPr/>
-        </p:nvCxnSpPr>
-        <p:spPr>
-          <a:xfrm>
-            <a:off x="1193699" y="6127448"/>
-            <a:ext cx="557784" cy="0"/>
-          </a:xfrm>
-          <a:prstGeom prst="straightConnector1">
-            <a:avLst/>
-          </a:prstGeom>
-          <a:ln>
-            <a:solidFill>
-              <a:schemeClr val="tx1"/>
-            </a:solidFill>
-            <a:tailEnd type="arrow"/>
-          </a:ln>
-          <a:effectLst/>
-        </p:spPr>
-        <p:style>
-          <a:lnRef idx="2">
-            <a:schemeClr val="accent1"/>
-          </a:lnRef>
-          <a:fillRef idx="0">
-            <a:schemeClr val="accent1"/>
-          </a:fillRef>
-          <a:effectRef idx="1">
-            <a:schemeClr val="accent1"/>
-          </a:effectRef>
-          <a:fontRef idx="minor">
-            <a:schemeClr val="tx1"/>
-          </a:fontRef>
-        </p:style>
-      </p:cxnSp>
-      <p:sp useBgFill="1">
-        <p:nvSpPr>
-          <p:cNvPr id="39" name="Rectangle 38"/>
-          <p:cNvSpPr/>
-          <p:nvPr/>
-        </p:nvSpPr>
-        <p:spPr>
-          <a:xfrm>
-            <a:off x="1751483" y="5982305"/>
-            <a:ext cx="598646" cy="290286"/>
-          </a:xfrm>
-          <a:prstGeom prst="rect">
-            <a:avLst/>
-          </a:prstGeom>
-          <a:ln/>
-        </p:spPr>
-        <p:style>
-          <a:lnRef idx="2">
-            <a:schemeClr val="dk1"/>
-          </a:lnRef>
-          <a:fillRef idx="1">
-            <a:schemeClr val="lt1"/>
-          </a:fillRef>
-          <a:effectRef idx="0">
-            <a:schemeClr val="dk1"/>
-          </a:effectRef>
-          <a:fontRef idx="minor">
-            <a:schemeClr val="dk1"/>
-          </a:fontRef>
-        </p:style>
-        <p:txBody>
-          <a:bodyPr rtlCol="0" anchor="ctr"/>
-          <a:lstStyle/>
-          <a:p>
-            <a:pPr algn="ctr"/>
-            <a:r>
-              <a:rPr kumimoji="1" lang="en-US" altLang="ja-JP" sz="1000"/>
-              <a:t>S-6-1</a:t>
-            </a:r>
-            <a:endParaRPr kumimoji="1" lang="ja-JP" altLang="en-US" sz="1000"/>
-          </a:p>
-        </p:txBody>
-      </p:sp>
-      <p:sp>
-        <p:nvSpPr>
-          <p:cNvPr id="40" name="TextBox 39"/>
-          <p:cNvSpPr txBox="1"/>
-          <p:nvPr/>
-        </p:nvSpPr>
-        <p:spPr>
-          <a:xfrm>
-            <a:off x="1748076" y="6272591"/>
-            <a:ext cx="611027" cy="246221"/>
-          </a:xfrm>
-          <a:prstGeom prst="rect">
-            <a:avLst/>
-          </a:prstGeom>
-          <a:noFill/>
-        </p:spPr>
-        <p:txBody>
-          <a:bodyPr wrap="none" rtlCol="0">
-            <a:spAutoFit/>
-          </a:bodyPr>
-          <a:lstStyle/>
-          <a:p>
-            <a:r>
-              <a:rPr kumimoji="1" lang="en-US" altLang="ja-JP" sz="1000"/>
-              <a:t>Sitemap</a:t>
-            </a:r>
-            <a:endParaRPr kumimoji="1" lang="ja-JP" altLang="en-US" sz="1000"/>
-          </a:p>
-        </p:txBody>
-      </p:sp>
-      <p:cxnSp>
-        <p:nvCxnSpPr>
           <p:cNvPr id="41" name="Straight Arrow Connector 40"/>
           <p:cNvCxnSpPr/>
           <p:nvPr/>
@@ -9450,7 +9340,7 @@
             <a:pPr algn="r"/>
             <a:r>
               <a:rPr kumimoji="1" lang="en-US" altLang="ja-JP" sz="1000"/>
-              <a:t>  Blog | Sitemap | </a:t>
+              <a:t>  Blog | </a:t>
             </a:r>
             <a:r>
               <a:rPr kumimoji="1" lang="en-US" altLang="ja-JP" sz="1000">
@@ -9556,14 +9446,14 @@
           <p:nvPr>
             <p:extLst>
               <p:ext uri="{D42A27DB-BD31-4B8C-83A1-F6EECF244321}">
-                <p14:modId xmlns:p14="http://schemas.microsoft.com/office/powerpoint/2010/main" val="228039505"/>
+                <p14:modId xmlns:p14="http://schemas.microsoft.com/office/powerpoint/2010/main" val="2582084822"/>
               </p:ext>
             </p:extLst>
           </p:nvPr>
         </p:nvGraphicFramePr>
         <p:xfrm>
           <a:off x="4478866" y="876073"/>
-          <a:ext cx="4461935" cy="4132458"/>
+          <a:ext cx="4461935" cy="3805376"/>
         </p:xfrm>
         <a:graphic>
           <a:graphicData uri="http://schemas.openxmlformats.org/drawingml/2006/table">
@@ -9740,74 +9630,6 @@
                     <a:p>
                       <a:r>
                         <a:rPr kumimoji="1" lang="en-US" altLang="ja-JP" sz="1000"/>
-                        <a:t>Sitemap</a:t>
-                      </a:r>
-                      <a:endParaRPr kumimoji="1" lang="ja-JP" altLang="en-US" sz="1000"/>
-                    </a:p>
-                  </a:txBody>
-                  <a:tcPr/>
-                </a:tc>
-                <a:tc>
-                  <a:txBody>
-                    <a:bodyPr/>
-                    <a:lstStyle/>
-                    <a:p>
-                      <a:endParaRPr kumimoji="1" lang="ja-JP" altLang="en-US" sz="1000"/>
-                    </a:p>
-                  </a:txBody>
-                  <a:tcPr/>
-                </a:tc>
-                <a:tc>
-                  <a:txBody>
-                    <a:bodyPr/>
-                    <a:lstStyle/>
-                    <a:p>
-                      <a:r>
-                        <a:rPr kumimoji="1" lang="en-US" altLang="ja-JP" sz="1000"/>
-                        <a:t>Show sitemap</a:t>
-                      </a:r>
-                      <a:endParaRPr kumimoji="1" lang="ja-JP" altLang="en-US" sz="1000"/>
-                    </a:p>
-                  </a:txBody>
-                  <a:tcPr/>
-                </a:tc>
-                <a:tc>
-                  <a:txBody>
-                    <a:bodyPr/>
-                    <a:lstStyle/>
-                    <a:p>
-                      <a:r>
-                        <a:rPr kumimoji="1" lang="vi-VN" altLang="ja-JP" sz="1000"/>
-                        <a:t>S-6-1</a:t>
-                      </a:r>
-                      <a:endParaRPr kumimoji="1" lang="ja-JP" altLang="en-US" sz="1000"/>
-                    </a:p>
-                  </a:txBody>
-                  <a:tcPr/>
-                </a:tc>
-              </a:tr>
-              <a:tr h="327082">
-                <a:tc>
-                  <a:txBody>
-                    <a:bodyPr/>
-                    <a:lstStyle/>
-                    <a:p>
-                      <a:r>
-                        <a:rPr kumimoji="1" lang="en-US" altLang="ja-JP" sz="1000"/>
-                        <a:t>3</a:t>
-                      </a:r>
-                      <a:endParaRPr kumimoji="1" lang="ja-JP" altLang="en-US" sz="1000"/>
-                    </a:p>
-                  </a:txBody>
-                  <a:tcPr/>
-                </a:tc>
-                <a:tc>
-                  <a:txBody>
-                    <a:bodyPr/>
-                    <a:lstStyle/>
-                    <a:p>
-                      <a:r>
-                        <a:rPr kumimoji="1" lang="en-US" altLang="ja-JP" sz="1000"/>
                         <a:t>Login</a:t>
                       </a:r>
                       <a:endParaRPr kumimoji="1" lang="ja-JP" altLang="en-US" sz="1000"/>
@@ -9862,7 +9684,7 @@
                     <a:p>
                       <a:r>
                         <a:rPr kumimoji="1" lang="en-US" altLang="ja-JP" sz="1000"/>
-                        <a:t>4</a:t>
+                        <a:t>3</a:t>
                       </a:r>
                       <a:endParaRPr kumimoji="1" lang="ja-JP" altLang="en-US" sz="1000"/>
                     </a:p>
@@ -9934,7 +9756,7 @@
                     <a:p>
                       <a:r>
                         <a:rPr kumimoji="1" lang="en-US" altLang="ja-JP" sz="1000"/>
-                        <a:t>5</a:t>
+                        <a:t>4</a:t>
                       </a:r>
                       <a:endParaRPr kumimoji="1" lang="ja-JP" altLang="en-US" sz="1000"/>
                     </a:p>
@@ -9994,7 +9816,7 @@
                     <a:p>
                       <a:r>
                         <a:rPr kumimoji="1" lang="en-US" altLang="ja-JP" sz="1000"/>
-                        <a:t>6</a:t>
+                        <a:t>5</a:t>
                       </a:r>
                       <a:endParaRPr kumimoji="1" lang="ja-JP" altLang="en-US" sz="1000"/>
                     </a:p>
@@ -10079,7 +9901,7 @@
                     <a:p>
                       <a:r>
                         <a:rPr kumimoji="1" lang="en-US" altLang="ja-JP" sz="1000"/>
-                        <a:t>7</a:t>
+                        <a:t>6</a:t>
                       </a:r>
                       <a:endParaRPr kumimoji="1" lang="ja-JP" altLang="en-US" sz="1000"/>
                     </a:p>
@@ -10147,7 +9969,7 @@
                     <a:p>
                       <a:r>
                         <a:rPr kumimoji="1" lang="en-US" altLang="ja-JP" sz="1000"/>
-                        <a:t>8</a:t>
+                        <a:t>7</a:t>
                       </a:r>
                       <a:endParaRPr kumimoji="1" lang="ja-JP" altLang="en-US" sz="1000"/>
                     </a:p>
@@ -10207,7 +10029,7 @@
                     <a:p>
                       <a:r>
                         <a:rPr kumimoji="1" lang="en-US" altLang="ja-JP" sz="1000"/>
-                        <a:t>9</a:t>
+                        <a:t>8</a:t>
                       </a:r>
                       <a:endParaRPr kumimoji="1" lang="ja-JP" altLang="en-US" sz="1000"/>
                     </a:p>
@@ -10292,7 +10114,7 @@
                     <a:p>
                       <a:r>
                         <a:rPr kumimoji="1" lang="en-US" altLang="ja-JP" sz="1000"/>
-                        <a:t>10</a:t>
+                        <a:t>9</a:t>
                       </a:r>
                       <a:endParaRPr kumimoji="1" lang="ja-JP" altLang="en-US" sz="1000"/>
                     </a:p>
@@ -10352,7 +10174,7 @@
                     <a:p>
                       <a:r>
                         <a:rPr kumimoji="1" lang="en-US" altLang="ja-JP" sz="1000"/>
-                        <a:t>11</a:t>
+                        <a:t>10</a:t>
                       </a:r>
                       <a:endParaRPr kumimoji="1" lang="ja-JP" altLang="en-US" sz="1000"/>
                     </a:p>
@@ -10436,7 +10258,7 @@
                   <a:srgbClr val="FF0000"/>
                 </a:solidFill>
               </a:rPr>
-              <a:t>(4)</a:t>
+              <a:t>(3)</a:t>
             </a:r>
             <a:endParaRPr kumimoji="1" lang="ja-JP" altLang="en-US" sz="1000">
               <a:solidFill>
@@ -10478,13 +10300,13 @@
       </p:sp>
       <p:sp>
         <p:nvSpPr>
-          <p:cNvPr id="26" name="TextBox 25"/>
+          <p:cNvPr id="27" name="TextBox 26"/>
           <p:cNvSpPr txBox="1"/>
           <p:nvPr/>
         </p:nvSpPr>
         <p:spPr>
           <a:xfrm>
-            <a:off x="2836333" y="774097"/>
+            <a:off x="3255433" y="774097"/>
             <a:ext cx="327433" cy="246221"/>
           </a:xfrm>
           <a:prstGeom prst="rect">
@@ -10516,13 +10338,13 @@
       </p:sp>
       <p:sp>
         <p:nvSpPr>
-          <p:cNvPr id="27" name="TextBox 26"/>
+          <p:cNvPr id="28" name="TextBox 27"/>
           <p:cNvSpPr txBox="1"/>
           <p:nvPr/>
         </p:nvSpPr>
         <p:spPr>
           <a:xfrm>
-            <a:off x="3255433" y="774097"/>
+            <a:off x="3712633" y="774097"/>
             <a:ext cx="327433" cy="246221"/>
           </a:xfrm>
           <a:prstGeom prst="rect">
@@ -10554,13 +10376,13 @@
       </p:sp>
       <p:sp>
         <p:nvSpPr>
-          <p:cNvPr id="28" name="TextBox 27"/>
+          <p:cNvPr id="29" name="TextBox 28"/>
           <p:cNvSpPr txBox="1"/>
           <p:nvPr/>
         </p:nvSpPr>
         <p:spPr>
           <a:xfrm>
-            <a:off x="3712633" y="774097"/>
+            <a:off x="1768197" y="2184400"/>
             <a:ext cx="327433" cy="246221"/>
           </a:xfrm>
           <a:prstGeom prst="rect">
@@ -10580,7 +10402,7 @@
                   <a:srgbClr val="FF0000"/>
                 </a:solidFill>
               </a:rPr>
-              <a:t>(3)</a:t>
+              <a:t>(4)</a:t>
             </a:r>
             <a:endParaRPr kumimoji="1" lang="ja-JP" altLang="en-US" sz="1000">
               <a:solidFill>
@@ -10592,13 +10414,13 @@
       </p:sp>
       <p:sp>
         <p:nvSpPr>
-          <p:cNvPr id="29" name="TextBox 28"/>
+          <p:cNvPr id="31" name="TextBox 30"/>
           <p:cNvSpPr txBox="1"/>
           <p:nvPr/>
         </p:nvSpPr>
         <p:spPr>
           <a:xfrm>
-            <a:off x="1768197" y="2184400"/>
+            <a:off x="342827" y="2718445"/>
             <a:ext cx="327433" cy="246221"/>
           </a:xfrm>
           <a:prstGeom prst="rect">
@@ -10630,13 +10452,13 @@
       </p:sp>
       <p:sp>
         <p:nvSpPr>
-          <p:cNvPr id="31" name="TextBox 30"/>
+          <p:cNvPr id="32" name="TextBox 31"/>
           <p:cNvSpPr txBox="1"/>
           <p:nvPr/>
         </p:nvSpPr>
         <p:spPr>
           <a:xfrm>
-            <a:off x="342827" y="2718445"/>
+            <a:off x="1593164" y="2406748"/>
             <a:ext cx="327433" cy="246221"/>
           </a:xfrm>
           <a:prstGeom prst="rect">
@@ -10668,13 +10490,13 @@
       </p:sp>
       <p:sp>
         <p:nvSpPr>
-          <p:cNvPr id="32" name="TextBox 31"/>
+          <p:cNvPr id="33" name="TextBox 32"/>
           <p:cNvSpPr txBox="1"/>
           <p:nvPr/>
         </p:nvSpPr>
         <p:spPr>
           <a:xfrm>
-            <a:off x="1593164" y="2406748"/>
+            <a:off x="2034277" y="2406748"/>
             <a:ext cx="327433" cy="246221"/>
           </a:xfrm>
           <a:prstGeom prst="rect">
@@ -10706,13 +10528,13 @@
       </p:sp>
       <p:sp>
         <p:nvSpPr>
-          <p:cNvPr id="33" name="TextBox 32"/>
+          <p:cNvPr id="34" name="TextBox 33"/>
           <p:cNvSpPr txBox="1"/>
           <p:nvPr/>
         </p:nvSpPr>
         <p:spPr>
           <a:xfrm>
-            <a:off x="2034277" y="2406748"/>
+            <a:off x="3173699" y="2538411"/>
             <a:ext cx="327433" cy="246221"/>
           </a:xfrm>
           <a:prstGeom prst="rect">
@@ -10733,44 +10555,6 @@
                 </a:solidFill>
               </a:rPr>
               <a:t>(8)</a:t>
-            </a:r>
-            <a:endParaRPr kumimoji="1" lang="ja-JP" altLang="en-US" sz="1000">
-              <a:solidFill>
-                <a:srgbClr val="FF0000"/>
-              </a:solidFill>
-            </a:endParaRPr>
-          </a:p>
-        </p:txBody>
-      </p:sp>
-      <p:sp>
-        <p:nvSpPr>
-          <p:cNvPr id="34" name="TextBox 33"/>
-          <p:cNvSpPr txBox="1"/>
-          <p:nvPr/>
-        </p:nvSpPr>
-        <p:spPr>
-          <a:xfrm>
-            <a:off x="3173699" y="2538411"/>
-            <a:ext cx="327433" cy="246221"/>
-          </a:xfrm>
-          <a:prstGeom prst="rect">
-            <a:avLst/>
-          </a:prstGeom>
-          <a:noFill/>
-        </p:spPr>
-        <p:txBody>
-          <a:bodyPr wrap="none" rtlCol="0">
-            <a:spAutoFit/>
-          </a:bodyPr>
-          <a:lstStyle/>
-          <a:p>
-            <a:r>
-              <a:rPr kumimoji="1" lang="en-US" altLang="ja-JP" sz="1000">
-                <a:solidFill>
-                  <a:srgbClr val="FF0000"/>
-                </a:solidFill>
-              </a:rPr>
-              <a:t>(9)</a:t>
             </a:r>
             <a:endParaRPr kumimoji="1" lang="ja-JP" altLang="en-US" sz="1000">
               <a:solidFill>
@@ -10947,7 +10731,7 @@
         <p:spPr>
           <a:xfrm>
             <a:off x="3778899" y="2848673"/>
-            <a:ext cx="392430" cy="246221"/>
+            <a:ext cx="327433" cy="246221"/>
           </a:xfrm>
           <a:prstGeom prst="rect">
             <a:avLst/>
@@ -10966,7 +10750,7 @@
                   <a:srgbClr val="FF0000"/>
                 </a:solidFill>
               </a:rPr>
-              <a:t>(10)</a:t>
+              <a:t>(9)</a:t>
             </a:r>
             <a:endParaRPr kumimoji="1" lang="ja-JP" altLang="en-US" sz="1000">
               <a:solidFill>
@@ -11320,7 +11104,7 @@
                   <a:srgbClr val="FF0000"/>
                 </a:solidFill>
               </a:rPr>
-              <a:t>(11)</a:t>
+              <a:t>(10)</a:t>
             </a:r>
             <a:endParaRPr kumimoji="1" lang="ja-JP" altLang="en-US" sz="1000">
               <a:solidFill>
@@ -11702,7 +11486,7 @@
             <a:pPr algn="r"/>
             <a:r>
               <a:rPr kumimoji="1" lang="en-US" altLang="ja-JP" sz="1000"/>
-              <a:t>  Blog | Sitemap | </a:t>
+              <a:t>  Blog | </a:t>
             </a:r>
             <a:r>
               <a:rPr kumimoji="1" lang="en-US" altLang="ja-JP" sz="1000">
@@ -13148,7 +12932,7 @@
             <a:pPr algn="r"/>
             <a:r>
               <a:rPr kumimoji="1" lang="en-US" altLang="ja-JP" sz="1000"/>
-              <a:t>  Blog | Sitemap | </a:t>
+              <a:t>  Blog | </a:t>
             </a:r>
             <a:r>
               <a:rPr kumimoji="1" lang="en-US" altLang="ja-JP" sz="1000">
@@ -14198,19 +13982,8 @@
                 <a:latin typeface="Calibri (Body)"/>
                 <a:cs typeface="Calibri (Body)"/>
               </a:rPr>
-              <a:t>Update </a:t>
-            </a:r>
-            <a:r>
-              <a:rPr lang="en-US" altLang="ja-JP" b="1" dirty="0">
-                <a:latin typeface="Calibri (Body)"/>
-                <a:cs typeface="Calibri (Body)"/>
-              </a:rPr>
-              <a:t>user info</a:t>
-            </a:r>
-            <a:endParaRPr lang="en-US" altLang="ja-JP" b="1" dirty="0">
-              <a:latin typeface="Calibri (Body)"/>
-              <a:cs typeface="Calibri (Body)"/>
-            </a:endParaRPr>
+              <a:t>Update user info</a:t>
+            </a:r>
           </a:p>
           <a:p>
             <a:endParaRPr kumimoji="1" lang="ja-JP" altLang="en-US"/>
@@ -14492,7 +14265,7 @@
             <a:pPr algn="r"/>
             <a:r>
               <a:rPr kumimoji="1" lang="en-US" altLang="ja-JP" sz="1000"/>
-              <a:t>  Blog | Sitemap | </a:t>
+              <a:t>  Blog | </a:t>
             </a:r>
             <a:r>
               <a:rPr kumimoji="1" lang="en-US" altLang="ja-JP" sz="1000">
@@ -15033,21 +14806,7 @@
                           <a:latin typeface="Calibri (Body)"/>
                           <a:cs typeface="Calibri (Body)"/>
                         </a:rPr>
-                        <a:t>birth</a:t>
-                      </a:r>
-                      <a:r>
-                        <a:rPr lang="en-GB" altLang="ja-JP" sz="1000" baseline="0" dirty="0" err="1" smtClean="0">
-                          <a:latin typeface="Calibri (Body)"/>
-                          <a:cs typeface="Calibri (Body)"/>
-                        </a:rPr>
-                        <a:t>d</a:t>
-                      </a:r>
-                      <a:r>
-                        <a:rPr lang="en-GB" altLang="ja-JP" sz="1000" baseline="0" dirty="0" err="1" smtClean="0">
-                          <a:latin typeface="Calibri (Body)"/>
-                          <a:cs typeface="Calibri (Body)"/>
-                        </a:rPr>
-                        <a:t>ay</a:t>
+                        <a:t>birthday</a:t>
                       </a:r>
                       <a:endParaRPr lang="en-US" altLang="ja-JP" sz="1000" dirty="0">
                         <a:latin typeface="Calibri (Body)"/>
@@ -15594,14 +15353,7 @@
                           <a:latin typeface="Calibri (Body)"/>
                           <a:cs typeface="Calibri (Body)"/>
                         </a:rPr>
-                        <a:t> user’s current </a:t>
-                      </a:r>
-                      <a:r>
-                        <a:rPr lang="en-GB" altLang="ja-JP" sz="1000" baseline="0" dirty="0" smtClean="0">
-                          <a:latin typeface="Calibri (Body)"/>
-                          <a:cs typeface="Calibri (Body)"/>
-                        </a:rPr>
-                        <a:t>email</a:t>
+                        <a:t> user’s current email</a:t>
                       </a:r>
                       <a:endParaRPr lang="en-US" altLang="ja-JP" sz="1000" dirty="0" smtClean="0">
                         <a:latin typeface="Calibri (Body)"/>
@@ -15721,14 +15473,7 @@
                           <a:latin typeface="Calibri (Body)"/>
                           <a:cs typeface="Calibri (Body)"/>
                         </a:rPr>
-                        <a:t> user’s current </a:t>
-                      </a:r>
-                      <a:r>
-                        <a:rPr lang="en-GB" altLang="ja-JP" sz="1000" baseline="0" dirty="0" smtClean="0">
-                          <a:latin typeface="Calibri (Body)"/>
-                          <a:cs typeface="Calibri (Body)"/>
-                        </a:rPr>
-                        <a:t>mobile</a:t>
+                        <a:t> user’s current mobile</a:t>
                       </a:r>
                       <a:endParaRPr lang="en-US" altLang="ja-JP" sz="1000" dirty="0" smtClean="0">
                         <a:latin typeface="Calibri (Body)"/>
@@ -17075,15 +16820,7 @@
                   <a:srgbClr val="000000"/>
                 </a:solidFill>
               </a:rPr>
-              <a:t>090.</a:t>
-            </a:r>
-            <a:r>
-              <a:rPr kumimoji="1" lang="en-US" altLang="ja-JP" sz="800" i="1">
-                <a:solidFill>
-                  <a:srgbClr val="000000"/>
-                </a:solidFill>
-              </a:rPr>
-              <a:t>xxx.xxx</a:t>
+              <a:t>090.xxxx.xxx</a:t>
             </a:r>
             <a:endParaRPr kumimoji="1" lang="ja-JP" altLang="en-US" sz="800" i="1">
               <a:solidFill>
@@ -17176,18 +16913,7 @@
                 <a:ea typeface="Times New Roman" panose="02020603050405020304" pitchFamily="18" charset="0"/>
                 <a:cs typeface="Calibri (Body)"/>
               </a:rPr>
-              <a:t>Contact </a:t>
-            </a:r>
-            <a:r>
-              <a:rPr lang="en-GB" altLang="ja-JP" sz="1000" b="1">
-                <a:solidFill>
-                  <a:srgbClr val="000000"/>
-                </a:solidFill>
-                <a:latin typeface="Calibri (Body)"/>
-                <a:ea typeface="Times New Roman" panose="02020603050405020304" pitchFamily="18" charset="0"/>
-                <a:cs typeface="Calibri (Body)"/>
-              </a:rPr>
-              <a:t>info</a:t>
+              <a:t>Contact info</a:t>
             </a:r>
             <a:endParaRPr lang="en-US" altLang="ja-JP" sz="1000" b="1">
               <a:solidFill>
@@ -18258,6 +17984,168 @@
               <a:solidFill>
                 <a:srgbClr val="FF0000"/>
               </a:solidFill>
+              <a:latin typeface="Calibri (Body)"/>
+              <a:cs typeface="Calibri (Body)"/>
+            </a:endParaRPr>
+          </a:p>
+        </p:txBody>
+      </p:sp>
+      <p:sp>
+        <p:nvSpPr>
+          <p:cNvPr id="63" name="Isosceles Triangle 62"/>
+          <p:cNvSpPr/>
+          <p:nvPr/>
+        </p:nvSpPr>
+        <p:spPr>
+          <a:xfrm rot="10800000">
+            <a:off x="1386371" y="2964521"/>
+            <a:ext cx="51843" cy="46967"/>
+          </a:xfrm>
+          <a:prstGeom prst="triangle">
+            <a:avLst/>
+          </a:prstGeom>
+          <a:ln>
+            <a:solidFill>
+              <a:schemeClr val="accent1">
+                <a:lumMod val="75000"/>
+              </a:schemeClr>
+            </a:solidFill>
+          </a:ln>
+        </p:spPr>
+        <p:style>
+          <a:lnRef idx="2">
+            <a:schemeClr val="accent1">
+              <a:shade val="50000"/>
+            </a:schemeClr>
+          </a:lnRef>
+          <a:fillRef idx="1">
+            <a:schemeClr val="accent1"/>
+          </a:fillRef>
+          <a:effectRef idx="0">
+            <a:schemeClr val="accent1"/>
+          </a:effectRef>
+          <a:fontRef idx="minor">
+            <a:schemeClr val="lt1"/>
+          </a:fontRef>
+        </p:style>
+        <p:txBody>
+          <a:bodyPr rot="0" spcFirstLastPara="0" vert="horz" wrap="square" lIns="91440" tIns="45720" rIns="91440" bIns="45720" numCol="1" spcCol="0" rtlCol="0" fromWordArt="0" anchor="ctr" anchorCtr="0" forceAA="0" compatLnSpc="1">
+            <a:prstTxWarp prst="textNoShape">
+              <a:avLst/>
+            </a:prstTxWarp>
+            <a:noAutofit/>
+          </a:bodyPr>
+          <a:lstStyle/>
+          <a:p>
+            <a:endParaRPr lang="en-US" sz="1000">
+              <a:latin typeface="Calibri (Body)"/>
+              <a:cs typeface="Calibri (Body)"/>
+            </a:endParaRPr>
+          </a:p>
+        </p:txBody>
+      </p:sp>
+      <p:sp>
+        <p:nvSpPr>
+          <p:cNvPr id="64" name="Isosceles Triangle 63"/>
+          <p:cNvSpPr/>
+          <p:nvPr/>
+        </p:nvSpPr>
+        <p:spPr>
+          <a:xfrm rot="10800000">
+            <a:off x="1816207" y="2974290"/>
+            <a:ext cx="51843" cy="46967"/>
+          </a:xfrm>
+          <a:prstGeom prst="triangle">
+            <a:avLst/>
+          </a:prstGeom>
+          <a:ln>
+            <a:solidFill>
+              <a:schemeClr val="accent1">
+                <a:lumMod val="75000"/>
+              </a:schemeClr>
+            </a:solidFill>
+          </a:ln>
+        </p:spPr>
+        <p:style>
+          <a:lnRef idx="2">
+            <a:schemeClr val="accent1">
+              <a:shade val="50000"/>
+            </a:schemeClr>
+          </a:lnRef>
+          <a:fillRef idx="1">
+            <a:schemeClr val="accent1"/>
+          </a:fillRef>
+          <a:effectRef idx="0">
+            <a:schemeClr val="accent1"/>
+          </a:effectRef>
+          <a:fontRef idx="minor">
+            <a:schemeClr val="lt1"/>
+          </a:fontRef>
+        </p:style>
+        <p:txBody>
+          <a:bodyPr rot="0" spcFirstLastPara="0" vert="horz" wrap="square" lIns="91440" tIns="45720" rIns="91440" bIns="45720" numCol="1" spcCol="0" rtlCol="0" fromWordArt="0" anchor="ctr" anchorCtr="0" forceAA="0" compatLnSpc="1">
+            <a:prstTxWarp prst="textNoShape">
+              <a:avLst/>
+            </a:prstTxWarp>
+            <a:noAutofit/>
+          </a:bodyPr>
+          <a:lstStyle/>
+          <a:p>
+            <a:endParaRPr lang="en-US" sz="1000">
+              <a:latin typeface="Calibri (Body)"/>
+              <a:cs typeface="Calibri (Body)"/>
+            </a:endParaRPr>
+          </a:p>
+        </p:txBody>
+      </p:sp>
+      <p:sp>
+        <p:nvSpPr>
+          <p:cNvPr id="67" name="Isosceles Triangle 66"/>
+          <p:cNvSpPr/>
+          <p:nvPr/>
+        </p:nvSpPr>
+        <p:spPr>
+          <a:xfrm rot="10800000">
+            <a:off x="2353502" y="2954752"/>
+            <a:ext cx="51843" cy="46967"/>
+          </a:xfrm>
+          <a:prstGeom prst="triangle">
+            <a:avLst/>
+          </a:prstGeom>
+          <a:ln>
+            <a:solidFill>
+              <a:schemeClr val="accent1">
+                <a:lumMod val="75000"/>
+              </a:schemeClr>
+            </a:solidFill>
+          </a:ln>
+        </p:spPr>
+        <p:style>
+          <a:lnRef idx="2">
+            <a:schemeClr val="accent1">
+              <a:shade val="50000"/>
+            </a:schemeClr>
+          </a:lnRef>
+          <a:fillRef idx="1">
+            <a:schemeClr val="accent1"/>
+          </a:fillRef>
+          <a:effectRef idx="0">
+            <a:schemeClr val="accent1"/>
+          </a:effectRef>
+          <a:fontRef idx="minor">
+            <a:schemeClr val="lt1"/>
+          </a:fontRef>
+        </p:style>
+        <p:txBody>
+          <a:bodyPr rot="0" spcFirstLastPara="0" vert="horz" wrap="square" lIns="91440" tIns="45720" rIns="91440" bIns="45720" numCol="1" spcCol="0" rtlCol="0" fromWordArt="0" anchor="ctr" anchorCtr="0" forceAA="0" compatLnSpc="1">
+            <a:prstTxWarp prst="textNoShape">
+              <a:avLst/>
+            </a:prstTxWarp>
+            <a:noAutofit/>
+          </a:bodyPr>
+          <a:lstStyle/>
+          <a:p>
+            <a:endParaRPr lang="en-US" sz="1000">
               <a:latin typeface="Calibri (Body)"/>
               <a:cs typeface="Calibri (Body)"/>
             </a:endParaRPr>
@@ -18355,11 +18243,7 @@
           <a:p>
             <a:r>
               <a:rPr kumimoji="1" lang="en-US" altLang="ja-JP"/>
-              <a:t>S-5-1 </a:t>
-            </a:r>
-            <a:r>
-              <a:rPr kumimoji="1" lang="en-US" altLang="ja-JP"/>
-              <a:t>Search User</a:t>
+              <a:t>S-5-1 Search User</a:t>
             </a:r>
             <a:endParaRPr kumimoji="1" lang="ja-JP" altLang="en-US"/>
           </a:p>
@@ -18636,7 +18520,7 @@
             <a:pPr algn="r"/>
             <a:r>
               <a:rPr kumimoji="1" lang="en-US" altLang="ja-JP" sz="1000"/>
-              <a:t>  Blog | Sitemap | </a:t>
+              <a:t>  Blog | </a:t>
             </a:r>
             <a:r>
               <a:rPr kumimoji="1" lang="en-US" altLang="ja-JP" sz="1000">
@@ -18738,11 +18622,7 @@
             </a:r>
             <a:r>
               <a:rPr kumimoji="1" lang="en-US" altLang="ja-JP" sz="1050"/>
-              <a:t>Search User</a:t>
-            </a:r>
-            <a:r>
-              <a:rPr kumimoji="1" lang="en-US" altLang="ja-JP" sz="1050"/>
-              <a:t> </a:t>
+              <a:t>Search User </a:t>
             </a:r>
             <a:endParaRPr kumimoji="1" lang="ja-JP" altLang="en-US" sz="1050"/>
           </a:p>
@@ -18757,14 +18637,14 @@
           <p:nvPr>
             <p:extLst>
               <p:ext uri="{D42A27DB-BD31-4B8C-83A1-F6EECF244321}">
-                <p14:modId xmlns:p14="http://schemas.microsoft.com/office/powerpoint/2010/main" val="927375012"/>
+                <p14:modId xmlns:p14="http://schemas.microsoft.com/office/powerpoint/2010/main" val="1345530861"/>
               </p:ext>
             </p:extLst>
           </p:nvPr>
         </p:nvGraphicFramePr>
         <p:xfrm>
           <a:off x="4478866" y="740601"/>
-          <a:ext cx="4461935" cy="4717464"/>
+          <a:ext cx="4461935" cy="4390382"/>
         </p:xfrm>
         <a:graphic>
           <a:graphicData uri="http://schemas.openxmlformats.org/drawingml/2006/table">
@@ -18941,7 +18821,7 @@
                     <a:p>
                       <a:r>
                         <a:rPr kumimoji="1" lang="en-US" altLang="ja-JP" sz="1000"/>
-                        <a:t>Sitemap</a:t>
+                        <a:t>Login</a:t>
                       </a:r>
                       <a:endParaRPr kumimoji="1" lang="ja-JP" altLang="en-US" sz="1000"/>
                     </a:p>
@@ -18965,7 +18845,7 @@
                     <a:p>
                       <a:r>
                         <a:rPr kumimoji="1" lang="en-US" altLang="ja-JP" sz="1000"/>
-                        <a:t>Show sitemap</a:t>
+                        <a:t>Go to page login</a:t>
                       </a:r>
                       <a:endParaRPr kumimoji="1" lang="ja-JP" altLang="en-US" sz="1000"/>
                     </a:p>
@@ -18979,7 +18859,7 @@
                     <a:p>
                       <a:r>
                         <a:rPr kumimoji="1" lang="vi-VN" altLang="ja-JP" sz="1000"/>
-                        <a:t>S-6-1</a:t>
+                        <a:t>S-2-1</a:t>
                       </a:r>
                       <a:endParaRPr kumimoji="1" lang="ja-JP" altLang="en-US" sz="1000"/>
                     </a:p>
@@ -19009,7 +18889,7 @@
                     <a:p>
                       <a:r>
                         <a:rPr kumimoji="1" lang="en-US" altLang="ja-JP" sz="1000"/>
-                        <a:t>Login</a:t>
+                        <a:t>Search</a:t>
                       </a:r>
                       <a:endParaRPr kumimoji="1" lang="ja-JP" altLang="en-US" sz="1000"/>
                     </a:p>
@@ -19033,7 +18913,7 @@
                     <a:p>
                       <a:r>
                         <a:rPr kumimoji="1" lang="en-US" altLang="ja-JP" sz="1000"/>
-                        <a:t>Go to page login</a:t>
+                        <a:t>Search by firstname, lastname, username</a:t>
                       </a:r>
                       <a:endParaRPr kumimoji="1" lang="ja-JP" altLang="en-US" sz="1000"/>
                     </a:p>
@@ -19047,7 +18927,7 @@
                     <a:p>
                       <a:r>
                         <a:rPr kumimoji="1" lang="vi-VN" altLang="ja-JP" sz="1000"/>
-                        <a:t>S-2-1</a:t>
+                        <a:t>S-5-2</a:t>
                       </a:r>
                       <a:endParaRPr kumimoji="1" lang="ja-JP" altLang="en-US" sz="1000"/>
                     </a:p>
@@ -19077,74 +18957,6 @@
                     <a:p>
                       <a:r>
                         <a:rPr kumimoji="1" lang="en-US" altLang="ja-JP" sz="1000"/>
-                        <a:t>Search</a:t>
-                      </a:r>
-                      <a:endParaRPr kumimoji="1" lang="ja-JP" altLang="en-US" sz="1000"/>
-                    </a:p>
-                  </a:txBody>
-                  <a:tcPr/>
-                </a:tc>
-                <a:tc>
-                  <a:txBody>
-                    <a:bodyPr/>
-                    <a:lstStyle/>
-                    <a:p>
-                      <a:endParaRPr kumimoji="1" lang="ja-JP" altLang="en-US" sz="1000"/>
-                    </a:p>
-                  </a:txBody>
-                  <a:tcPr/>
-                </a:tc>
-                <a:tc>
-                  <a:txBody>
-                    <a:bodyPr/>
-                    <a:lstStyle/>
-                    <a:p>
-                      <a:r>
-                        <a:rPr kumimoji="1" lang="en-US" altLang="ja-JP" sz="1000"/>
-                        <a:t>Search by firstname, lastname, username</a:t>
-                      </a:r>
-                      <a:endParaRPr kumimoji="1" lang="ja-JP" altLang="en-US" sz="1000"/>
-                    </a:p>
-                  </a:txBody>
-                  <a:tcPr/>
-                </a:tc>
-                <a:tc>
-                  <a:txBody>
-                    <a:bodyPr/>
-                    <a:lstStyle/>
-                    <a:p>
-                      <a:r>
-                        <a:rPr kumimoji="1" lang="vi-VN" altLang="ja-JP" sz="1000"/>
-                        <a:t>S-5-2</a:t>
-                      </a:r>
-                      <a:endParaRPr kumimoji="1" lang="ja-JP" altLang="en-US" sz="1000"/>
-                    </a:p>
-                  </a:txBody>
-                  <a:tcPr/>
-                </a:tc>
-              </a:tr>
-              <a:tr h="327082">
-                <a:tc>
-                  <a:txBody>
-                    <a:bodyPr/>
-                    <a:lstStyle/>
-                    <a:p>
-                      <a:r>
-                        <a:rPr kumimoji="1" lang="en-US" altLang="ja-JP" sz="1000"/>
-                        <a:t>5</a:t>
-                      </a:r>
-                      <a:endParaRPr kumimoji="1" lang="ja-JP" altLang="en-US" sz="1000"/>
-                    </a:p>
-                  </a:txBody>
-                  <a:tcPr/>
-                </a:tc>
-                <a:tc>
-                  <a:txBody>
-                    <a:bodyPr/>
-                    <a:lstStyle/>
-                    <a:p>
-                      <a:r>
-                        <a:rPr kumimoji="1" lang="en-US" altLang="ja-JP" sz="1000"/>
                         <a:t>Message</a:t>
                       </a:r>
                       <a:endParaRPr kumimoji="1" lang="ja-JP" altLang="en-US" sz="1000"/>
@@ -19195,7 +19007,7 @@
                     <a:p>
                       <a:r>
                         <a:rPr kumimoji="1" lang="en-US" altLang="ja-JP" sz="1000"/>
-                        <a:t>6</a:t>
+                        <a:t>5</a:t>
                       </a:r>
                       <a:endParaRPr kumimoji="1" lang="ja-JP" altLang="en-US" sz="1000"/>
                     </a:p>
@@ -19272,7 +19084,7 @@
                     <a:p>
                       <a:r>
                         <a:rPr kumimoji="1" lang="en-US" altLang="ja-JP" sz="1000"/>
-                        <a:t>7</a:t>
+                        <a:t>6</a:t>
                       </a:r>
                       <a:endParaRPr kumimoji="1" lang="ja-JP" altLang="en-US" sz="1000"/>
                     </a:p>
@@ -19332,7 +19144,7 @@
                     <a:p>
                       <a:r>
                         <a:rPr kumimoji="1" lang="en-US" altLang="ja-JP" sz="1000"/>
-                        <a:t>8</a:t>
+                        <a:t>7</a:t>
                       </a:r>
                       <a:endParaRPr kumimoji="1" lang="ja-JP" altLang="en-US" sz="1000"/>
                     </a:p>
@@ -19346,57 +19158,53 @@
                     <a:p>
                       <a:r>
                         <a:rPr kumimoji="1" lang="en-US" altLang="ja-JP" sz="1000"/>
-                        <a:t>Date </a:t>
+                        <a:t>Date join</a:t>
                       </a:r>
+                      <a:endParaRPr kumimoji="1" lang="ja-JP" altLang="en-US" sz="1000"/>
+                    </a:p>
+                  </a:txBody>
+                  <a:tcPr/>
+                </a:tc>
+                <a:tc>
+                  <a:txBody>
+                    <a:bodyPr/>
+                    <a:lstStyle/>
+                    <a:p>
+                      <a:endParaRPr kumimoji="1" lang="ja-JP" altLang="en-US" sz="1000"/>
+                    </a:p>
+                  </a:txBody>
+                  <a:tcPr/>
+                </a:tc>
+                <a:tc>
+                  <a:txBody>
+                    <a:bodyPr/>
+                    <a:lstStyle/>
+                    <a:p>
+                      <a:endParaRPr kumimoji="1" lang="ja-JP" altLang="en-US" sz="1000"/>
+                    </a:p>
+                  </a:txBody>
+                  <a:tcPr/>
+                </a:tc>
+                <a:tc>
+                  <a:txBody>
+                    <a:bodyPr/>
+                    <a:lstStyle/>
+                    <a:p>
+                      <a:endParaRPr kumimoji="1" lang="ja-JP" altLang="en-US" sz="1000"/>
+                    </a:p>
+                  </a:txBody>
+                  <a:tcPr/>
+                </a:tc>
+              </a:tr>
+              <a:tr h="327082">
+                <a:tc>
+                  <a:txBody>
+                    <a:bodyPr/>
+                    <a:lstStyle/>
+                    <a:p>
                       <a:r>
                         <a:rPr kumimoji="1" lang="en-US" altLang="ja-JP" sz="1000"/>
-                        <a:t>join</a:t>
-                      </a:r>
-                      <a:endParaRPr kumimoji="1" lang="ja-JP" altLang="en-US" sz="1000"/>
-                    </a:p>
-                  </a:txBody>
-                  <a:tcPr/>
-                </a:tc>
-                <a:tc>
-                  <a:txBody>
-                    <a:bodyPr/>
-                    <a:lstStyle/>
-                    <a:p>
-                      <a:endParaRPr kumimoji="1" lang="ja-JP" altLang="en-US" sz="1000"/>
-                    </a:p>
-                  </a:txBody>
-                  <a:tcPr/>
-                </a:tc>
-                <a:tc>
-                  <a:txBody>
-                    <a:bodyPr/>
-                    <a:lstStyle/>
-                    <a:p>
-                      <a:endParaRPr kumimoji="1" lang="ja-JP" altLang="en-US" sz="1000"/>
-                    </a:p>
-                  </a:txBody>
-                  <a:tcPr/>
-                </a:tc>
-                <a:tc>
-                  <a:txBody>
-                    <a:bodyPr/>
-                    <a:lstStyle/>
-                    <a:p>
-                      <a:endParaRPr kumimoji="1" lang="ja-JP" altLang="en-US" sz="1000"/>
-                    </a:p>
-                  </a:txBody>
-                  <a:tcPr/>
-                </a:tc>
-              </a:tr>
-              <a:tr h="327082">
-                <a:tc>
-                  <a:txBody>
-                    <a:bodyPr/>
-                    <a:lstStyle/>
-                    <a:p>
-                      <a:r>
-                        <a:rPr kumimoji="1" lang="en-US" altLang="ja-JP" sz="1000"/>
-                        <a:t>9</a:t>
+                        <a:t>8</a:t>
                       </a:r>
                       <a:endParaRPr kumimoji="1" lang="ja-JP" altLang="en-US" sz="1000"/>
                     </a:p>
@@ -19473,7 +19281,7 @@
                     <a:p>
                       <a:r>
                         <a:rPr kumimoji="1" lang="en-US" altLang="ja-JP" sz="1000"/>
-                        <a:t>10</a:t>
+                        <a:t>9</a:t>
                       </a:r>
                       <a:endParaRPr kumimoji="1" lang="ja-JP" altLang="en-US" sz="1000"/>
                     </a:p>
@@ -19533,7 +19341,7 @@
                     <a:p>
                       <a:r>
                         <a:rPr kumimoji="1" lang="en-US" altLang="ja-JP" sz="1000"/>
-                        <a:t>11</a:t>
+                        <a:t>10</a:t>
                       </a:r>
                       <a:endParaRPr kumimoji="1" lang="ja-JP" altLang="en-US" sz="1000"/>
                     </a:p>
@@ -19618,7 +19426,7 @@
                     <a:p>
                       <a:r>
                         <a:rPr kumimoji="1" lang="en-US" altLang="ja-JP" sz="1000"/>
-                        <a:t>12</a:t>
+                        <a:t>11</a:t>
                       </a:r>
                       <a:endParaRPr kumimoji="1" lang="ja-JP" altLang="en-US" sz="1000"/>
                     </a:p>
@@ -19678,7 +19486,7 @@
                     <a:p>
                       <a:r>
                         <a:rPr kumimoji="1" lang="en-US" altLang="ja-JP" sz="1000"/>
-                        <a:t>13</a:t>
+                        <a:t>12</a:t>
                       </a:r>
                       <a:endParaRPr kumimoji="1" lang="ja-JP" altLang="en-US" sz="1000"/>
                     </a:p>
@@ -19762,7 +19570,7 @@
                   <a:srgbClr val="FF0000"/>
                 </a:solidFill>
               </a:rPr>
-              <a:t>(4)</a:t>
+              <a:t>(3)</a:t>
             </a:r>
             <a:endParaRPr kumimoji="1" lang="ja-JP" altLang="en-US" sz="1000">
               <a:solidFill>
@@ -19828,13 +19636,13 @@
       </p:sp>
       <p:sp>
         <p:nvSpPr>
-          <p:cNvPr id="15" name="TextBox 14"/>
+          <p:cNvPr id="16" name="TextBox 15"/>
           <p:cNvSpPr txBox="1"/>
           <p:nvPr/>
         </p:nvSpPr>
         <p:spPr>
           <a:xfrm>
-            <a:off x="2836333" y="774097"/>
+            <a:off x="3255433" y="774097"/>
             <a:ext cx="327433" cy="246221"/>
           </a:xfrm>
           <a:prstGeom prst="rect">
@@ -19866,13 +19674,13 @@
       </p:sp>
       <p:sp>
         <p:nvSpPr>
-          <p:cNvPr id="16" name="TextBox 15"/>
+          <p:cNvPr id="17" name="TextBox 16"/>
           <p:cNvSpPr txBox="1"/>
           <p:nvPr/>
         </p:nvSpPr>
         <p:spPr>
           <a:xfrm>
-            <a:off x="3255433" y="774097"/>
+            <a:off x="3712633" y="774097"/>
             <a:ext cx="327433" cy="246221"/>
           </a:xfrm>
           <a:prstGeom prst="rect">
@@ -19904,13 +19712,13 @@
       </p:sp>
       <p:sp>
         <p:nvSpPr>
-          <p:cNvPr id="17" name="TextBox 16"/>
+          <p:cNvPr id="18" name="TextBox 17"/>
           <p:cNvSpPr txBox="1"/>
           <p:nvPr/>
         </p:nvSpPr>
         <p:spPr>
           <a:xfrm>
-            <a:off x="3712633" y="774097"/>
+            <a:off x="2689143" y="2147668"/>
             <a:ext cx="327433" cy="246221"/>
           </a:xfrm>
           <a:prstGeom prst="rect">
@@ -19930,7 +19738,7 @@
                   <a:srgbClr val="FF0000"/>
                 </a:solidFill>
               </a:rPr>
-              <a:t>(3)</a:t>
+              <a:t>(4)</a:t>
             </a:r>
             <a:endParaRPr kumimoji="1" lang="ja-JP" altLang="en-US" sz="1000">
               <a:solidFill>
@@ -19942,13 +19750,13 @@
       </p:sp>
       <p:sp>
         <p:nvSpPr>
-          <p:cNvPr id="18" name="TextBox 17"/>
+          <p:cNvPr id="19" name="TextBox 18"/>
           <p:cNvSpPr txBox="1"/>
           <p:nvPr/>
         </p:nvSpPr>
         <p:spPr>
           <a:xfrm>
-            <a:off x="2689143" y="2147668"/>
+            <a:off x="571436" y="2769247"/>
             <a:ext cx="327433" cy="246221"/>
           </a:xfrm>
           <a:prstGeom prst="rect">
@@ -19968,7 +19776,7 @@
                   <a:srgbClr val="FF0000"/>
                 </a:solidFill>
               </a:rPr>
-              <a:t>(5)</a:t>
+              <a:t>(6)</a:t>
             </a:r>
             <a:endParaRPr kumimoji="1" lang="ja-JP" altLang="en-US" sz="1000">
               <a:solidFill>
@@ -19980,13 +19788,13 @@
       </p:sp>
       <p:sp>
         <p:nvSpPr>
-          <p:cNvPr id="19" name="TextBox 18"/>
+          <p:cNvPr id="20" name="TextBox 19"/>
           <p:cNvSpPr txBox="1"/>
           <p:nvPr/>
         </p:nvSpPr>
         <p:spPr>
           <a:xfrm>
-            <a:off x="571436" y="2769247"/>
+            <a:off x="2079507" y="2398282"/>
             <a:ext cx="327433" cy="246221"/>
           </a:xfrm>
           <a:prstGeom prst="rect">
@@ -20018,13 +19826,13 @@
       </p:sp>
       <p:sp>
         <p:nvSpPr>
-          <p:cNvPr id="20" name="TextBox 19"/>
+          <p:cNvPr id="21" name="TextBox 20"/>
           <p:cNvSpPr txBox="1"/>
           <p:nvPr/>
         </p:nvSpPr>
         <p:spPr>
           <a:xfrm>
-            <a:off x="2079507" y="2398282"/>
+            <a:off x="2186599" y="2555260"/>
             <a:ext cx="327433" cy="246221"/>
           </a:xfrm>
           <a:prstGeom prst="rect">
@@ -20056,13 +19864,13 @@
       </p:sp>
       <p:sp>
         <p:nvSpPr>
-          <p:cNvPr id="21" name="TextBox 20"/>
+          <p:cNvPr id="22" name="TextBox 21"/>
           <p:cNvSpPr txBox="1"/>
           <p:nvPr/>
         </p:nvSpPr>
         <p:spPr>
           <a:xfrm>
-            <a:off x="2176830" y="2555260"/>
+            <a:off x="2145979" y="2722283"/>
             <a:ext cx="327433" cy="246221"/>
           </a:xfrm>
           <a:prstGeom prst="rect">
@@ -20083,44 +19891,6 @@
                 </a:solidFill>
               </a:rPr>
               <a:t>(8)</a:t>
-            </a:r>
-            <a:endParaRPr kumimoji="1" lang="ja-JP" altLang="en-US" sz="1000">
-              <a:solidFill>
-                <a:srgbClr val="FF0000"/>
-              </a:solidFill>
-            </a:endParaRPr>
-          </a:p>
-        </p:txBody>
-      </p:sp>
-      <p:sp>
-        <p:nvSpPr>
-          <p:cNvPr id="22" name="TextBox 21"/>
-          <p:cNvSpPr txBox="1"/>
-          <p:nvPr/>
-        </p:nvSpPr>
-        <p:spPr>
-          <a:xfrm>
-            <a:off x="2145979" y="2722283"/>
-            <a:ext cx="327433" cy="246221"/>
-          </a:xfrm>
-          <a:prstGeom prst="rect">
-            <a:avLst/>
-          </a:prstGeom>
-          <a:noFill/>
-        </p:spPr>
-        <p:txBody>
-          <a:bodyPr wrap="none" rtlCol="0">
-            <a:spAutoFit/>
-          </a:bodyPr>
-          <a:lstStyle/>
-          <a:p>
-            <a:r>
-              <a:rPr kumimoji="1" lang="en-US" altLang="ja-JP" sz="1000">
-                <a:solidFill>
-                  <a:srgbClr val="FF0000"/>
-                </a:solidFill>
-              </a:rPr>
-              <a:t>(9)</a:t>
             </a:r>
             <a:endParaRPr kumimoji="1" lang="ja-JP" altLang="en-US" sz="1000">
               <a:solidFill>
@@ -20246,27 +20016,7 @@
                   </a:schemeClr>
                 </a:solidFill>
               </a:rPr>
-              <a:t>Date </a:t>
-            </a:r>
-            <a:r>
-              <a:rPr kumimoji="1" lang="en-US" altLang="ja-JP" sz="800" i="1">
-                <a:solidFill>
-                  <a:schemeClr val="bg1">
-                    <a:lumMod val="65000"/>
-                  </a:schemeClr>
-                </a:solidFill>
-              </a:rPr>
-              <a:t>join</a:t>
-            </a:r>
-            <a:r>
-              <a:rPr kumimoji="1" lang="en-US" altLang="ja-JP" sz="800" i="1">
-                <a:solidFill>
-                  <a:schemeClr val="bg1">
-                    <a:lumMod val="65000"/>
-                  </a:schemeClr>
-                </a:solidFill>
-              </a:rPr>
-              <a:t>: 08/12/2015</a:t>
+              <a:t>Date join: 08/12/2015</a:t>
             </a:r>
             <a:endParaRPr kumimoji="1" lang="ja-JP" altLang="en-US" sz="800" i="1">
               <a:solidFill>
@@ -20286,8 +20036,8 @@
         </p:nvSpPr>
         <p:spPr>
           <a:xfrm>
-            <a:off x="2096773" y="2866956"/>
-            <a:ext cx="392430" cy="246221"/>
+            <a:off x="2155387" y="2857187"/>
+            <a:ext cx="327433" cy="246221"/>
           </a:xfrm>
           <a:prstGeom prst="rect">
             <a:avLst/>
@@ -20306,7 +20056,7 @@
                   <a:srgbClr val="FF0000"/>
                 </a:solidFill>
               </a:rPr>
-              <a:t>(10)</a:t>
+              <a:t>(9)</a:t>
             </a:r>
             <a:endParaRPr kumimoji="1" lang="ja-JP" altLang="en-US" sz="1000">
               <a:solidFill>
@@ -20488,27 +20238,7 @@
                   </a:schemeClr>
                 </a:solidFill>
               </a:rPr>
-              <a:t>Date </a:t>
-            </a:r>
-            <a:r>
-              <a:rPr kumimoji="1" lang="en-US" altLang="ja-JP" sz="800" i="1">
-                <a:solidFill>
-                  <a:schemeClr val="bg1">
-                    <a:lumMod val="65000"/>
-                  </a:schemeClr>
-                </a:solidFill>
-              </a:rPr>
-              <a:t>join</a:t>
-            </a:r>
-            <a:r>
-              <a:rPr kumimoji="1" lang="en-US" altLang="ja-JP" sz="800" i="1">
-                <a:solidFill>
-                  <a:schemeClr val="bg1">
-                    <a:lumMod val="65000"/>
-                  </a:schemeClr>
-                </a:solidFill>
-              </a:rPr>
-              <a:t>: 08/12/2015</a:t>
+              <a:t>Date join: 08/12/2015</a:t>
             </a:r>
             <a:endParaRPr kumimoji="1" lang="ja-JP" altLang="en-US" sz="800" i="1">
               <a:solidFill>
@@ -20686,27 +20416,7 @@
                   </a:schemeClr>
                 </a:solidFill>
               </a:rPr>
-              <a:t>Date </a:t>
-            </a:r>
-            <a:r>
-              <a:rPr kumimoji="1" lang="en-US" altLang="ja-JP" sz="800" i="1">
-                <a:solidFill>
-                  <a:schemeClr val="bg1">
-                    <a:lumMod val="65000"/>
-                  </a:schemeClr>
-                </a:solidFill>
-              </a:rPr>
-              <a:t>join</a:t>
-            </a:r>
-            <a:r>
-              <a:rPr kumimoji="1" lang="en-US" altLang="ja-JP" sz="800" i="1">
-                <a:solidFill>
-                  <a:schemeClr val="bg1">
-                    <a:lumMod val="65000"/>
-                  </a:schemeClr>
-                </a:solidFill>
-              </a:rPr>
-              <a:t>: 08/12/2015</a:t>
+              <a:t>Date join: 08/12/2015</a:t>
             </a:r>
             <a:endParaRPr kumimoji="1" lang="ja-JP" altLang="en-US" sz="800" i="1">
               <a:solidFill>
@@ -20884,27 +20594,7 @@
                   </a:schemeClr>
                 </a:solidFill>
               </a:rPr>
-              <a:t>Date </a:t>
-            </a:r>
-            <a:r>
-              <a:rPr kumimoji="1" lang="en-US" altLang="ja-JP" sz="800" i="1">
-                <a:solidFill>
-                  <a:schemeClr val="bg1">
-                    <a:lumMod val="65000"/>
-                  </a:schemeClr>
-                </a:solidFill>
-              </a:rPr>
-              <a:t>join</a:t>
-            </a:r>
-            <a:r>
-              <a:rPr kumimoji="1" lang="en-US" altLang="ja-JP" sz="800" i="1">
-                <a:solidFill>
-                  <a:schemeClr val="bg1">
-                    <a:lumMod val="65000"/>
-                  </a:schemeClr>
-                </a:solidFill>
-              </a:rPr>
-              <a:t>: 08/12/2015</a:t>
+              <a:t>Date join: 08/12/2015</a:t>
             </a:r>
             <a:endParaRPr kumimoji="1" lang="ja-JP" altLang="en-US" sz="800" i="1">
               <a:solidFill>
@@ -21204,7 +20894,7 @@
                   <a:srgbClr val="FF0000"/>
                 </a:solidFill>
               </a:rPr>
-              <a:t>(11)</a:t>
+              <a:t>(10)</a:t>
             </a:r>
             <a:endParaRPr kumimoji="1" lang="ja-JP" altLang="en-US" sz="1000">
               <a:solidFill>
@@ -21242,7 +20932,7 @@
                   <a:srgbClr val="FF0000"/>
                 </a:solidFill>
               </a:rPr>
-              <a:t>(12)</a:t>
+              <a:t>(11)</a:t>
             </a:r>
             <a:endParaRPr kumimoji="1" lang="ja-JP" altLang="en-US" sz="1000">
               <a:solidFill>
@@ -21280,7 +20970,7 @@
                   <a:srgbClr val="FF0000"/>
                 </a:solidFill>
               </a:rPr>
-              <a:t>(13)</a:t>
+              <a:t>(12)</a:t>
             </a:r>
             <a:endParaRPr kumimoji="1" lang="ja-JP" altLang="en-US" sz="1000">
               <a:solidFill>
@@ -21299,7 +20989,7 @@
         <p:spPr>
           <a:xfrm>
             <a:off x="1756319" y="1675713"/>
-            <a:ext cx="392430" cy="246221"/>
+            <a:ext cx="327433" cy="246221"/>
           </a:xfrm>
           <a:prstGeom prst="rect">
             <a:avLst/>
@@ -21318,7 +21008,7 @@
                   <a:srgbClr val="FF0000"/>
                 </a:solidFill>
               </a:rPr>
-              <a:t>(06)</a:t>
+              <a:t>(5)</a:t>
             </a:r>
             <a:endParaRPr kumimoji="1" lang="ja-JP" altLang="en-US" sz="1000">
               <a:solidFill>
@@ -22257,7 +21947,7 @@
               <a:pPr algn="r"/>
               <a:r>
                 <a:rPr kumimoji="1" lang="en-US" altLang="ja-JP" sz="1000"/>
-                <a:t>  Blog | Sitemap | </a:t>
+                <a:t>  Blog | </a:t>
               </a:r>
               <a:r>
                 <a:rPr kumimoji="1" lang="en-US" altLang="ja-JP" sz="1000">
@@ -22511,6 +22201,16 @@
           <a:bodyPr rtlCol="0" anchor="ctr"/>
           <a:lstStyle/>
           <a:p>
+            <a:r>
+              <a:rPr kumimoji="1" lang="en-US" altLang="ja-JP" sz="800" i="1" dirty="0">
+                <a:solidFill>
+                  <a:schemeClr val="bg1">
+                    <a:lumMod val="75000"/>
+                  </a:schemeClr>
+                </a:solidFill>
+              </a:rPr>
+              <a:t>********</a:t>
+            </a:r>
             <a:endParaRPr kumimoji="1" lang="ja-JP" altLang="en-US" sz="800" i="1" dirty="0">
               <a:solidFill>
                 <a:schemeClr val="bg1">
@@ -22590,6 +22290,16 @@
           <a:bodyPr rtlCol="0" anchor="ctr"/>
           <a:lstStyle/>
           <a:p>
+            <a:r>
+              <a:rPr kumimoji="1" lang="en-US" altLang="ja-JP" sz="800" i="1" dirty="0">
+                <a:solidFill>
+                  <a:schemeClr val="bg1">
+                    <a:lumMod val="75000"/>
+                  </a:schemeClr>
+                </a:solidFill>
+              </a:rPr>
+              <a:t>********</a:t>
+            </a:r>
             <a:endParaRPr kumimoji="1" lang="ja-JP" altLang="en-US" sz="800" i="1" dirty="0">
               <a:solidFill>
                 <a:schemeClr val="bg1">
@@ -22669,6 +22379,16 @@
           <a:bodyPr rtlCol="0" anchor="ctr"/>
           <a:lstStyle/>
           <a:p>
+            <a:r>
+              <a:rPr kumimoji="1" lang="en-US" altLang="ja-JP" sz="800" i="1" dirty="0">
+                <a:solidFill>
+                  <a:schemeClr val="bg1">
+                    <a:lumMod val="75000"/>
+                  </a:schemeClr>
+                </a:solidFill>
+              </a:rPr>
+              <a:t>********</a:t>
+            </a:r>
             <a:endParaRPr kumimoji="1" lang="ja-JP" altLang="en-US" sz="800" i="1" dirty="0">
               <a:solidFill>
                 <a:schemeClr val="bg1">

</xml_diff>

<commit_message>
update link for post title, edit text fill search user
</commit_message>
<xml_diff>
--- a/php/tam-v.anh/doc/detail_design/frontend/wireframe/MiniBlog_Wireframe_Ver_0.1.0.pptx
+++ b/php/tam-v.anh/doc/detail_design/frontend/wireframe/MiniBlog_Wireframe_Ver_0.1.0.pptx
@@ -7287,13 +7287,7 @@
                         <a:rPr kumimoji="1" lang="en-GB" altLang="ja-JP" sz="1000" dirty="0" smtClean="0">
                           <a:latin typeface="Calibri" panose="020F0502020204030204" pitchFamily="34" charset="0"/>
                         </a:rPr>
-                        <a:t>Number </a:t>
-                      </a:r>
-                      <a:r>
-                        <a:rPr kumimoji="1" lang="en-GB" altLang="ja-JP" sz="1000" dirty="0" smtClean="0">
-                          <a:latin typeface="Calibri" panose="020F0502020204030204" pitchFamily="34" charset="0"/>
-                        </a:rPr>
-                        <a:t>posts</a:t>
+                        <a:t>Number posts</a:t>
                       </a:r>
                       <a:r>
                         <a:rPr kumimoji="1" lang="en-GB" altLang="ja-JP" sz="1000" baseline="0" dirty="0" smtClean="0">
@@ -8090,7 +8084,7 @@
                     </a:schemeClr>
                   </a:solidFill>
                 </a:rPr>
-                <a:t>Username, firstname, lastname,…</a:t>
+                <a:t>Username, firstname, lastname</a:t>
               </a:r>
               <a:endParaRPr kumimoji="1" lang="ja-JP" altLang="en-US" sz="800" i="1">
                 <a:solidFill>
@@ -8498,7 +8492,7 @@
           <p:spPr>
             <a:xfrm>
               <a:off x="1176867" y="2406748"/>
-              <a:ext cx="505830" cy="246221"/>
+              <a:ext cx="456110" cy="207389"/>
             </a:xfrm>
             <a:prstGeom prst="rect">
               <a:avLst/>
@@ -8512,10 +8506,18 @@
             <a:lstStyle/>
             <a:p>
               <a:r>
-                <a:rPr kumimoji="1" lang="en-US" altLang="ja-JP" sz="1000" dirty="0"/>
+                <a:rPr kumimoji="1" lang="en-US" altLang="ja-JP" sz="1000" dirty="0">
+                  <a:solidFill>
+                    <a:srgbClr val="558ED5"/>
+                  </a:solidFill>
+                </a:rPr>
                 <a:t>Blog 1</a:t>
               </a:r>
-              <a:endParaRPr kumimoji="1" lang="ja-JP" altLang="en-US" sz="1000" dirty="0"/>
+              <a:endParaRPr kumimoji="1" lang="ja-JP" altLang="en-US" sz="1000" dirty="0">
+                <a:solidFill>
+                  <a:srgbClr val="558ED5"/>
+                </a:solidFill>
+              </a:endParaRPr>
             </a:p>
           </p:txBody>
         </p:sp>
@@ -8600,7 +8602,7 @@
           <p:spPr>
             <a:xfrm>
               <a:off x="1181119" y="3052362"/>
-              <a:ext cx="505830" cy="246221"/>
+              <a:ext cx="456110" cy="207389"/>
             </a:xfrm>
             <a:prstGeom prst="rect">
               <a:avLst/>
@@ -8614,10 +8616,18 @@
             <a:lstStyle/>
             <a:p>
               <a:r>
-                <a:rPr kumimoji="1" lang="en-US" altLang="ja-JP" sz="1000" dirty="0"/>
+                <a:rPr kumimoji="1" lang="en-US" altLang="ja-JP" sz="1000" dirty="0">
+                  <a:solidFill>
+                    <a:srgbClr val="558ED5"/>
+                  </a:solidFill>
+                </a:rPr>
                 <a:t>Blog 1</a:t>
               </a:r>
-              <a:endParaRPr kumimoji="1" lang="ja-JP" altLang="en-US" sz="1000" dirty="0"/>
+              <a:endParaRPr kumimoji="1" lang="ja-JP" altLang="en-US" sz="1000" dirty="0">
+                <a:solidFill>
+                  <a:srgbClr val="558ED5"/>
+                </a:solidFill>
+              </a:endParaRPr>
             </a:p>
           </p:txBody>
         </p:sp>
@@ -8649,15 +8659,7 @@
                     <a:srgbClr val="FF0000"/>
                   </a:solidFill>
                 </a:rPr>
-                <a:t>(</a:t>
-              </a:r>
-              <a:r>
-                <a:rPr kumimoji="1" lang="en-US" altLang="ja-JP" sz="1000" dirty="0">
-                  <a:solidFill>
-                    <a:srgbClr val="FF0000"/>
-                  </a:solidFill>
-                </a:rPr>
-                <a:t>9</a:t>
+                <a:t>(9</a:t>
               </a:r>
               <a:r>
                 <a:rPr kumimoji="1" lang="en-US" altLang="ja-JP" sz="1000" dirty="0" smtClean="0">
@@ -8868,7 +8870,7 @@
           <p:spPr>
             <a:xfrm>
               <a:off x="1172615" y="3812186"/>
-              <a:ext cx="505830" cy="246221"/>
+              <a:ext cx="456110" cy="207389"/>
             </a:xfrm>
             <a:prstGeom prst="rect">
               <a:avLst/>
@@ -8882,10 +8884,18 @@
             <a:lstStyle/>
             <a:p>
               <a:r>
-                <a:rPr kumimoji="1" lang="en-US" altLang="ja-JP" sz="1000"/>
+                <a:rPr kumimoji="1" lang="en-US" altLang="ja-JP" sz="1000">
+                  <a:solidFill>
+                    <a:srgbClr val="558ED5"/>
+                  </a:solidFill>
+                </a:rPr>
                 <a:t>Blog 1</a:t>
               </a:r>
-              <a:endParaRPr kumimoji="1" lang="ja-JP" altLang="en-US" sz="1000"/>
+              <a:endParaRPr kumimoji="1" lang="ja-JP" altLang="en-US" sz="1000">
+                <a:solidFill>
+                  <a:srgbClr val="558ED5"/>
+                </a:solidFill>
+              </a:endParaRPr>
             </a:p>
           </p:txBody>
         </p:sp>
@@ -13894,10 +13904,18 @@
           <a:lstStyle/>
           <a:p>
             <a:r>
-              <a:rPr kumimoji="1" lang="en-US" altLang="ja-JP" sz="1000"/>
+              <a:rPr kumimoji="1" lang="en-US" altLang="ja-JP" sz="1000">
+                <a:solidFill>
+                  <a:srgbClr val="558ED5"/>
+                </a:solidFill>
+              </a:rPr>
               <a:t>Blog 1</a:t>
             </a:r>
-            <a:endParaRPr kumimoji="1" lang="ja-JP" altLang="en-US" sz="1000"/>
+            <a:endParaRPr kumimoji="1" lang="ja-JP" altLang="en-US" sz="1000">
+              <a:solidFill>
+                <a:srgbClr val="558ED5"/>
+              </a:solidFill>
+            </a:endParaRPr>
           </a:p>
         </p:txBody>
       </p:sp>
@@ -14090,10 +14108,18 @@
           <a:lstStyle/>
           <a:p>
             <a:r>
-              <a:rPr kumimoji="1" lang="en-US" altLang="ja-JP" sz="1000"/>
+              <a:rPr kumimoji="1" lang="en-US" altLang="ja-JP" sz="1000">
+                <a:solidFill>
+                  <a:srgbClr val="558ED5"/>
+                </a:solidFill>
+              </a:rPr>
               <a:t>Blog 1</a:t>
             </a:r>
-            <a:endParaRPr kumimoji="1" lang="ja-JP" altLang="en-US" sz="1000"/>
+            <a:endParaRPr kumimoji="1" lang="ja-JP" altLang="en-US" sz="1000">
+              <a:solidFill>
+                <a:srgbClr val="558ED5"/>
+              </a:solidFill>
+            </a:endParaRPr>
           </a:p>
         </p:txBody>
       </p:sp>
@@ -14248,10 +14274,18 @@
           <a:lstStyle/>
           <a:p>
             <a:r>
-              <a:rPr kumimoji="1" lang="en-US" altLang="ja-JP" sz="1000"/>
+              <a:rPr kumimoji="1" lang="en-US" altLang="ja-JP" sz="1000">
+                <a:solidFill>
+                  <a:srgbClr val="558ED5"/>
+                </a:solidFill>
+              </a:rPr>
               <a:t>Blog 1</a:t>
             </a:r>
-            <a:endParaRPr kumimoji="1" lang="ja-JP" altLang="en-US" sz="1000"/>
+            <a:endParaRPr kumimoji="1" lang="ja-JP" altLang="en-US" sz="1000">
+              <a:solidFill>
+                <a:srgbClr val="558ED5"/>
+              </a:solidFill>
+            </a:endParaRPr>
           </a:p>
         </p:txBody>
       </p:sp>
@@ -25132,7 +25166,7 @@
                     </a:schemeClr>
                   </a:solidFill>
                 </a:rPr>
-                <a:t>Username, firstname, lastname,…</a:t>
+                <a:t>Username, firstname, lastname</a:t>
               </a:r>
               <a:endParaRPr kumimoji="1" lang="ja-JP" altLang="en-US" sz="800" i="1">
                 <a:solidFill>
@@ -26485,11 +26519,7 @@
             </a:r>
             <a:r>
               <a:rPr kumimoji="1" lang="en-US" altLang="ja-JP" sz="1050"/>
-              <a:t> /</a:t>
-            </a:r>
-            <a:r>
-              <a:rPr kumimoji="1" lang="en-US" altLang="ja-JP" sz="1050"/>
-              <a:t>List all post</a:t>
+              <a:t> /List all post</a:t>
             </a:r>
             <a:endParaRPr kumimoji="1" lang="ja-JP" altLang="en-US" sz="1050"/>
           </a:p>
@@ -28481,10 +28511,24 @@
           <a:lstStyle/>
           <a:p>
             <a:r>
-              <a:rPr kumimoji="1" lang="en-US" altLang="ja-JP" sz="1000"/>
+              <a:rPr kumimoji="1" lang="en-US" altLang="ja-JP" sz="1000">
+                <a:solidFill>
+                  <a:schemeClr val="tx2">
+                    <a:lumMod val="60000"/>
+                    <a:lumOff val="40000"/>
+                  </a:schemeClr>
+                </a:solidFill>
+              </a:rPr>
               <a:t>Blog 1</a:t>
             </a:r>
-            <a:endParaRPr kumimoji="1" lang="ja-JP" altLang="en-US" sz="1000"/>
+            <a:endParaRPr kumimoji="1" lang="ja-JP" altLang="en-US" sz="1000">
+              <a:solidFill>
+                <a:schemeClr val="tx2">
+                  <a:lumMod val="60000"/>
+                  <a:lumOff val="40000"/>
+                </a:schemeClr>
+              </a:solidFill>
+            </a:endParaRPr>
           </a:p>
         </p:txBody>
       </p:sp>
@@ -28639,10 +28683,18 @@
           <a:lstStyle/>
           <a:p>
             <a:r>
-              <a:rPr kumimoji="1" lang="en-US" altLang="ja-JP" sz="1000"/>
+              <a:rPr kumimoji="1" lang="en-US" altLang="ja-JP" sz="1000">
+                <a:solidFill>
+                  <a:srgbClr val="558ED5"/>
+                </a:solidFill>
+              </a:rPr>
               <a:t>Blog 1</a:t>
             </a:r>
-            <a:endParaRPr kumimoji="1" lang="ja-JP" altLang="en-US" sz="1000"/>
+            <a:endParaRPr kumimoji="1" lang="ja-JP" altLang="en-US" sz="1000">
+              <a:solidFill>
+                <a:srgbClr val="558ED5"/>
+              </a:solidFill>
+            </a:endParaRPr>
           </a:p>
         </p:txBody>
       </p:sp>

</xml_diff>